<commit_message>
casually master programming and poggerings out some grapharinos
</commit_message>
<xml_diff>
--- a/Presentations/Conviction X Consensus Short Presentation 3-7-25.pptx
+++ b/Presentations/Conviction X Consensus Short Presentation 3-7-25.pptx
@@ -5,25 +5,43 @@
     <p:sldMasterId id="2147483720" r:id="rId1"/>
   </p:sldMasterIdLst>
   <p:notesMasterIdLst>
-    <p:notesMasterId r:id="rId18"/>
+    <p:notesMasterId r:id="rId36"/>
   </p:notesMasterIdLst>
   <p:sldIdLst>
     <p:sldId id="256" r:id="rId2"/>
-    <p:sldId id="287" r:id="rId3"/>
-    <p:sldId id="257" r:id="rId4"/>
-    <p:sldId id="266" r:id="rId5"/>
-    <p:sldId id="267" r:id="rId6"/>
-    <p:sldId id="258" r:id="rId7"/>
-    <p:sldId id="289" r:id="rId8"/>
-    <p:sldId id="273" r:id="rId9"/>
-    <p:sldId id="274" r:id="rId10"/>
-    <p:sldId id="275" r:id="rId11"/>
-    <p:sldId id="276" r:id="rId12"/>
-    <p:sldId id="290" r:id="rId13"/>
-    <p:sldId id="278" r:id="rId14"/>
-    <p:sldId id="279" r:id="rId15"/>
-    <p:sldId id="280" r:id="rId16"/>
-    <p:sldId id="281" r:id="rId17"/>
+    <p:sldId id="291" r:id="rId3"/>
+    <p:sldId id="293" r:id="rId4"/>
+    <p:sldId id="294" r:id="rId5"/>
+    <p:sldId id="295" r:id="rId6"/>
+    <p:sldId id="296" r:id="rId7"/>
+    <p:sldId id="297" r:id="rId8"/>
+    <p:sldId id="298" r:id="rId9"/>
+    <p:sldId id="316" r:id="rId10"/>
+    <p:sldId id="317" r:id="rId11"/>
+    <p:sldId id="318" r:id="rId12"/>
+    <p:sldId id="319" r:id="rId13"/>
+    <p:sldId id="287" r:id="rId14"/>
+    <p:sldId id="312" r:id="rId15"/>
+    <p:sldId id="257" r:id="rId16"/>
+    <p:sldId id="300" r:id="rId17"/>
+    <p:sldId id="301" r:id="rId18"/>
+    <p:sldId id="306" r:id="rId19"/>
+    <p:sldId id="309" r:id="rId20"/>
+    <p:sldId id="289" r:id="rId21"/>
+    <p:sldId id="314" r:id="rId22"/>
+    <p:sldId id="273" r:id="rId23"/>
+    <p:sldId id="304" r:id="rId24"/>
+    <p:sldId id="302" r:id="rId25"/>
+    <p:sldId id="307" r:id="rId26"/>
+    <p:sldId id="310" r:id="rId27"/>
+    <p:sldId id="290" r:id="rId28"/>
+    <p:sldId id="315" r:id="rId29"/>
+    <p:sldId id="278" r:id="rId30"/>
+    <p:sldId id="303" r:id="rId31"/>
+    <p:sldId id="305" r:id="rId32"/>
+    <p:sldId id="308" r:id="rId33"/>
+    <p:sldId id="311" r:id="rId34"/>
+    <p:sldId id="320" r:id="rId35"/>
   </p:sldIdLst>
   <p:sldSz cx="12192000" cy="6858000"/>
   <p:notesSz cx="6858000" cy="9144000"/>
@@ -212,7 +230,7 @@
           <a:p>
             <a:fld id="{71A20F81-5DFF-444F-B8C1-423F3088DB3D}" type="datetimeFigureOut">
               <a:rPr lang="en-US" smtClean="0"/>
-              <a:t>3/4/2025</a:t>
+              <a:t>3/6/2025</a:t>
             </a:fld>
             <a:endParaRPr lang="en-US"/>
           </a:p>
@@ -563,6 +581,522 @@
 </p:notes>
 </file>
 
+<file path=ppt/notesSlides/notesSlide10.xml><?xml version="1.0" encoding="utf-8"?>
+<p:notes xmlns:a="http://schemas.openxmlformats.org/drawingml/2006/main" xmlns:r="http://schemas.openxmlformats.org/officeDocument/2006/relationships" xmlns:p="http://schemas.openxmlformats.org/presentationml/2006/main">
+  <p:cSld>
+    <p:spTree>
+      <p:nvGrpSpPr>
+        <p:cNvPr id="1" name="">
+          <a:extLst>
+            <a:ext uri="{FF2B5EF4-FFF2-40B4-BE49-F238E27FC236}">
+              <a16:creationId xmlns:a16="http://schemas.microsoft.com/office/drawing/2014/main" id="{3EC7B76A-7702-FECE-3D50-67B6C073D322}"/>
+            </a:ext>
+          </a:extLst>
+        </p:cNvPr>
+        <p:cNvGrpSpPr/>
+        <p:nvPr/>
+      </p:nvGrpSpPr>
+      <p:grpSpPr>
+        <a:xfrm>
+          <a:off x="0" y="0"/>
+          <a:ext cx="0" cy="0"/>
+          <a:chOff x="0" y="0"/>
+          <a:chExt cx="0" cy="0"/>
+        </a:xfrm>
+      </p:grpSpPr>
+      <p:sp>
+        <p:nvSpPr>
+          <p:cNvPr id="2" name="Slide Image Placeholder 1">
+            <a:extLst>
+              <a:ext uri="{FF2B5EF4-FFF2-40B4-BE49-F238E27FC236}">
+                <a16:creationId xmlns:a16="http://schemas.microsoft.com/office/drawing/2014/main" id="{0E1BD104-94CE-5279-C153-53D69301212E}"/>
+              </a:ext>
+            </a:extLst>
+          </p:cNvPr>
+          <p:cNvSpPr>
+            <a:spLocks noGrp="1" noRot="1" noChangeAspect="1"/>
+          </p:cNvSpPr>
+          <p:nvPr>
+            <p:ph type="sldImg"/>
+          </p:nvPr>
+        </p:nvSpPr>
+        <p:spPr/>
+      </p:sp>
+      <p:sp>
+        <p:nvSpPr>
+          <p:cNvPr id="3" name="Notes Placeholder 2">
+            <a:extLst>
+              <a:ext uri="{FF2B5EF4-FFF2-40B4-BE49-F238E27FC236}">
+                <a16:creationId xmlns:a16="http://schemas.microsoft.com/office/drawing/2014/main" id="{07AAE07B-56D0-D3BE-A9CE-61846E8E4994}"/>
+              </a:ext>
+            </a:extLst>
+          </p:cNvPr>
+          <p:cNvSpPr>
+            <a:spLocks noGrp="1"/>
+          </p:cNvSpPr>
+          <p:nvPr>
+            <p:ph type="body" idx="1"/>
+          </p:nvPr>
+        </p:nvSpPr>
+        <p:spPr/>
+        <p:txBody>
+          <a:bodyPr/>
+          <a:lstStyle/>
+          <a:p>
+            <a:endParaRPr lang="en-US" dirty="0"/>
+          </a:p>
+        </p:txBody>
+      </p:sp>
+      <p:sp>
+        <p:nvSpPr>
+          <p:cNvPr id="4" name="Slide Number Placeholder 3">
+            <a:extLst>
+              <a:ext uri="{FF2B5EF4-FFF2-40B4-BE49-F238E27FC236}">
+                <a16:creationId xmlns:a16="http://schemas.microsoft.com/office/drawing/2014/main" id="{589250E2-E027-AD0E-3B1C-DF4F31B3DF8A}"/>
+              </a:ext>
+            </a:extLst>
+          </p:cNvPr>
+          <p:cNvSpPr>
+            <a:spLocks noGrp="1"/>
+          </p:cNvSpPr>
+          <p:nvPr>
+            <p:ph type="sldNum" sz="quarter" idx="5"/>
+          </p:nvPr>
+        </p:nvSpPr>
+        <p:spPr/>
+        <p:txBody>
+          <a:bodyPr/>
+          <a:lstStyle/>
+          <a:p>
+            <a:fld id="{D4D91577-4789-46FD-BE71-8B4B9405DF5E}" type="slidenum">
+              <a:rPr lang="en-US" smtClean="0"/>
+              <a:t>25</a:t>
+            </a:fld>
+            <a:endParaRPr lang="en-US"/>
+          </a:p>
+        </p:txBody>
+      </p:sp>
+    </p:spTree>
+    <p:extLst>
+      <p:ext uri="{BB962C8B-B14F-4D97-AF65-F5344CB8AC3E}">
+        <p14:creationId xmlns:p14="http://schemas.microsoft.com/office/powerpoint/2010/main" val="3774028546"/>
+      </p:ext>
+    </p:extLst>
+  </p:cSld>
+  <p:clrMapOvr>
+    <a:masterClrMapping/>
+  </p:clrMapOvr>
+</p:notes>
+</file>
+
+<file path=ppt/notesSlides/notesSlide11.xml><?xml version="1.0" encoding="utf-8"?>
+<p:notes xmlns:a="http://schemas.openxmlformats.org/drawingml/2006/main" xmlns:r="http://schemas.openxmlformats.org/officeDocument/2006/relationships" xmlns:p="http://schemas.openxmlformats.org/presentationml/2006/main">
+  <p:cSld>
+    <p:spTree>
+      <p:nvGrpSpPr>
+        <p:cNvPr id="1" name=""/>
+        <p:cNvGrpSpPr/>
+        <p:nvPr/>
+      </p:nvGrpSpPr>
+      <p:grpSpPr>
+        <a:xfrm>
+          <a:off x="0" y="0"/>
+          <a:ext cx="0" cy="0"/>
+          <a:chOff x="0" y="0"/>
+          <a:chExt cx="0" cy="0"/>
+        </a:xfrm>
+      </p:grpSpPr>
+      <p:sp>
+        <p:nvSpPr>
+          <p:cNvPr id="2" name="Slide Image Placeholder 1"/>
+          <p:cNvSpPr>
+            <a:spLocks noGrp="1" noRot="1" noChangeAspect="1"/>
+          </p:cNvSpPr>
+          <p:nvPr>
+            <p:ph type="sldImg"/>
+          </p:nvPr>
+        </p:nvSpPr>
+        <p:spPr/>
+      </p:sp>
+      <p:sp>
+        <p:nvSpPr>
+          <p:cNvPr id="3" name="Notes Placeholder 2"/>
+          <p:cNvSpPr>
+            <a:spLocks noGrp="1"/>
+          </p:cNvSpPr>
+          <p:nvPr>
+            <p:ph type="body" idx="1"/>
+          </p:nvPr>
+        </p:nvSpPr>
+        <p:spPr/>
+        <p:txBody>
+          <a:bodyPr/>
+          <a:lstStyle/>
+          <a:p>
+            <a:endParaRPr lang="en-US" dirty="0"/>
+          </a:p>
+        </p:txBody>
+      </p:sp>
+      <p:sp>
+        <p:nvSpPr>
+          <p:cNvPr id="4" name="Slide Number Placeholder 3"/>
+          <p:cNvSpPr>
+            <a:spLocks noGrp="1"/>
+          </p:cNvSpPr>
+          <p:nvPr>
+            <p:ph type="sldNum" sz="quarter" idx="5"/>
+          </p:nvPr>
+        </p:nvSpPr>
+        <p:spPr/>
+        <p:txBody>
+          <a:bodyPr/>
+          <a:lstStyle/>
+          <a:p>
+            <a:fld id="{D4D91577-4789-46FD-BE71-8B4B9405DF5E}" type="slidenum">
+              <a:rPr lang="en-US" smtClean="0"/>
+              <a:t>28</a:t>
+            </a:fld>
+            <a:endParaRPr lang="en-US"/>
+          </a:p>
+        </p:txBody>
+      </p:sp>
+    </p:spTree>
+    <p:extLst>
+      <p:ext uri="{BB962C8B-B14F-4D97-AF65-F5344CB8AC3E}">
+        <p14:creationId xmlns:p14="http://schemas.microsoft.com/office/powerpoint/2010/main" val="2952110385"/>
+      </p:ext>
+    </p:extLst>
+  </p:cSld>
+  <p:clrMapOvr>
+    <a:masterClrMapping/>
+  </p:clrMapOvr>
+</p:notes>
+</file>
+
+<file path=ppt/notesSlides/notesSlide12.xml><?xml version="1.0" encoding="utf-8"?>
+<p:notes xmlns:a="http://schemas.openxmlformats.org/drawingml/2006/main" xmlns:r="http://schemas.openxmlformats.org/officeDocument/2006/relationships" xmlns:p="http://schemas.openxmlformats.org/presentationml/2006/main">
+  <p:cSld>
+    <p:spTree>
+      <p:nvGrpSpPr>
+        <p:cNvPr id="1" name="">
+          <a:extLst>
+            <a:ext uri="{FF2B5EF4-FFF2-40B4-BE49-F238E27FC236}">
+              <a16:creationId xmlns:a16="http://schemas.microsoft.com/office/drawing/2014/main" id="{F1326F01-32AF-FB55-299A-E8F7A5B38212}"/>
+            </a:ext>
+          </a:extLst>
+        </p:cNvPr>
+        <p:cNvGrpSpPr/>
+        <p:nvPr/>
+      </p:nvGrpSpPr>
+      <p:grpSpPr>
+        <a:xfrm>
+          <a:off x="0" y="0"/>
+          <a:ext cx="0" cy="0"/>
+          <a:chOff x="0" y="0"/>
+          <a:chExt cx="0" cy="0"/>
+        </a:xfrm>
+      </p:grpSpPr>
+      <p:sp>
+        <p:nvSpPr>
+          <p:cNvPr id="2" name="Slide Image Placeholder 1">
+            <a:extLst>
+              <a:ext uri="{FF2B5EF4-FFF2-40B4-BE49-F238E27FC236}">
+                <a16:creationId xmlns:a16="http://schemas.microsoft.com/office/drawing/2014/main" id="{62236847-2E21-CB6E-E73C-3AC018F004E3}"/>
+              </a:ext>
+            </a:extLst>
+          </p:cNvPr>
+          <p:cNvSpPr>
+            <a:spLocks noGrp="1" noRot="1" noChangeAspect="1"/>
+          </p:cNvSpPr>
+          <p:nvPr>
+            <p:ph type="sldImg"/>
+          </p:nvPr>
+        </p:nvSpPr>
+        <p:spPr/>
+      </p:sp>
+      <p:sp>
+        <p:nvSpPr>
+          <p:cNvPr id="3" name="Notes Placeholder 2">
+            <a:extLst>
+              <a:ext uri="{FF2B5EF4-FFF2-40B4-BE49-F238E27FC236}">
+                <a16:creationId xmlns:a16="http://schemas.microsoft.com/office/drawing/2014/main" id="{E017CEBC-4B8B-539D-EE82-5ABB5E31616F}"/>
+              </a:ext>
+            </a:extLst>
+          </p:cNvPr>
+          <p:cNvSpPr>
+            <a:spLocks noGrp="1"/>
+          </p:cNvSpPr>
+          <p:nvPr>
+            <p:ph type="body" idx="1"/>
+          </p:nvPr>
+        </p:nvSpPr>
+        <p:spPr/>
+        <p:txBody>
+          <a:bodyPr/>
+          <a:lstStyle/>
+          <a:p>
+            <a:endParaRPr lang="en-US" dirty="0"/>
+          </a:p>
+        </p:txBody>
+      </p:sp>
+      <p:sp>
+        <p:nvSpPr>
+          <p:cNvPr id="4" name="Slide Number Placeholder 3">
+            <a:extLst>
+              <a:ext uri="{FF2B5EF4-FFF2-40B4-BE49-F238E27FC236}">
+                <a16:creationId xmlns:a16="http://schemas.microsoft.com/office/drawing/2014/main" id="{62CBE311-540A-672A-2482-49D1E29BEF1B}"/>
+              </a:ext>
+            </a:extLst>
+          </p:cNvPr>
+          <p:cNvSpPr>
+            <a:spLocks noGrp="1"/>
+          </p:cNvSpPr>
+          <p:nvPr>
+            <p:ph type="sldNum" sz="quarter" idx="5"/>
+          </p:nvPr>
+        </p:nvSpPr>
+        <p:spPr/>
+        <p:txBody>
+          <a:bodyPr/>
+          <a:lstStyle/>
+          <a:p>
+            <a:fld id="{D4D91577-4789-46FD-BE71-8B4B9405DF5E}" type="slidenum">
+              <a:rPr lang="en-US" smtClean="0"/>
+              <a:t>30</a:t>
+            </a:fld>
+            <a:endParaRPr lang="en-US"/>
+          </a:p>
+        </p:txBody>
+      </p:sp>
+    </p:spTree>
+    <p:extLst>
+      <p:ext uri="{BB962C8B-B14F-4D97-AF65-F5344CB8AC3E}">
+        <p14:creationId xmlns:p14="http://schemas.microsoft.com/office/powerpoint/2010/main" val="3229591188"/>
+      </p:ext>
+    </p:extLst>
+  </p:cSld>
+  <p:clrMapOvr>
+    <a:masterClrMapping/>
+  </p:clrMapOvr>
+</p:notes>
+</file>
+
+<file path=ppt/notesSlides/notesSlide13.xml><?xml version="1.0" encoding="utf-8"?>
+<p:notes xmlns:a="http://schemas.openxmlformats.org/drawingml/2006/main" xmlns:r="http://schemas.openxmlformats.org/officeDocument/2006/relationships" xmlns:p="http://schemas.openxmlformats.org/presentationml/2006/main">
+  <p:cSld>
+    <p:spTree>
+      <p:nvGrpSpPr>
+        <p:cNvPr id="1" name="">
+          <a:extLst>
+            <a:ext uri="{FF2B5EF4-FFF2-40B4-BE49-F238E27FC236}">
+              <a16:creationId xmlns:a16="http://schemas.microsoft.com/office/drawing/2014/main" id="{BF67010F-DF6E-6CCF-8A90-76645C84611B}"/>
+            </a:ext>
+          </a:extLst>
+        </p:cNvPr>
+        <p:cNvGrpSpPr/>
+        <p:nvPr/>
+      </p:nvGrpSpPr>
+      <p:grpSpPr>
+        <a:xfrm>
+          <a:off x="0" y="0"/>
+          <a:ext cx="0" cy="0"/>
+          <a:chOff x="0" y="0"/>
+          <a:chExt cx="0" cy="0"/>
+        </a:xfrm>
+      </p:grpSpPr>
+      <p:sp>
+        <p:nvSpPr>
+          <p:cNvPr id="2" name="Slide Image Placeholder 1">
+            <a:extLst>
+              <a:ext uri="{FF2B5EF4-FFF2-40B4-BE49-F238E27FC236}">
+                <a16:creationId xmlns:a16="http://schemas.microsoft.com/office/drawing/2014/main" id="{A44B43C5-11E2-FA32-5A79-32DF9790ECBA}"/>
+              </a:ext>
+            </a:extLst>
+          </p:cNvPr>
+          <p:cNvSpPr>
+            <a:spLocks noGrp="1" noRot="1" noChangeAspect="1"/>
+          </p:cNvSpPr>
+          <p:nvPr>
+            <p:ph type="sldImg"/>
+          </p:nvPr>
+        </p:nvSpPr>
+        <p:spPr/>
+      </p:sp>
+      <p:sp>
+        <p:nvSpPr>
+          <p:cNvPr id="3" name="Notes Placeholder 2">
+            <a:extLst>
+              <a:ext uri="{FF2B5EF4-FFF2-40B4-BE49-F238E27FC236}">
+                <a16:creationId xmlns:a16="http://schemas.microsoft.com/office/drawing/2014/main" id="{2AEFAAAB-66ED-174E-E6DB-ADB857E0E43A}"/>
+              </a:ext>
+            </a:extLst>
+          </p:cNvPr>
+          <p:cNvSpPr>
+            <a:spLocks noGrp="1"/>
+          </p:cNvSpPr>
+          <p:nvPr>
+            <p:ph type="body" idx="1"/>
+          </p:nvPr>
+        </p:nvSpPr>
+        <p:spPr/>
+        <p:txBody>
+          <a:bodyPr/>
+          <a:lstStyle/>
+          <a:p>
+            <a:endParaRPr lang="en-US" dirty="0"/>
+          </a:p>
+        </p:txBody>
+      </p:sp>
+      <p:sp>
+        <p:nvSpPr>
+          <p:cNvPr id="4" name="Slide Number Placeholder 3">
+            <a:extLst>
+              <a:ext uri="{FF2B5EF4-FFF2-40B4-BE49-F238E27FC236}">
+                <a16:creationId xmlns:a16="http://schemas.microsoft.com/office/drawing/2014/main" id="{D28C3593-70C1-75EA-ACF5-927C69860582}"/>
+              </a:ext>
+            </a:extLst>
+          </p:cNvPr>
+          <p:cNvSpPr>
+            <a:spLocks noGrp="1"/>
+          </p:cNvSpPr>
+          <p:nvPr>
+            <p:ph type="sldNum" sz="quarter" idx="5"/>
+          </p:nvPr>
+        </p:nvSpPr>
+        <p:spPr/>
+        <p:txBody>
+          <a:bodyPr/>
+          <a:lstStyle/>
+          <a:p>
+            <a:fld id="{D4D91577-4789-46FD-BE71-8B4B9405DF5E}" type="slidenum">
+              <a:rPr lang="en-US" smtClean="0"/>
+              <a:t>31</a:t>
+            </a:fld>
+            <a:endParaRPr lang="en-US"/>
+          </a:p>
+        </p:txBody>
+      </p:sp>
+    </p:spTree>
+    <p:extLst>
+      <p:ext uri="{BB962C8B-B14F-4D97-AF65-F5344CB8AC3E}">
+        <p14:creationId xmlns:p14="http://schemas.microsoft.com/office/powerpoint/2010/main" val="2483357646"/>
+      </p:ext>
+    </p:extLst>
+  </p:cSld>
+  <p:clrMapOvr>
+    <a:masterClrMapping/>
+  </p:clrMapOvr>
+</p:notes>
+</file>
+
+<file path=ppt/notesSlides/notesSlide14.xml><?xml version="1.0" encoding="utf-8"?>
+<p:notes xmlns:a="http://schemas.openxmlformats.org/drawingml/2006/main" xmlns:r="http://schemas.openxmlformats.org/officeDocument/2006/relationships" xmlns:p="http://schemas.openxmlformats.org/presentationml/2006/main">
+  <p:cSld>
+    <p:spTree>
+      <p:nvGrpSpPr>
+        <p:cNvPr id="1" name="">
+          <a:extLst>
+            <a:ext uri="{FF2B5EF4-FFF2-40B4-BE49-F238E27FC236}">
+              <a16:creationId xmlns:a16="http://schemas.microsoft.com/office/drawing/2014/main" id="{BF81561C-BAC3-20FB-3783-5F73AD5C3050}"/>
+            </a:ext>
+          </a:extLst>
+        </p:cNvPr>
+        <p:cNvGrpSpPr/>
+        <p:nvPr/>
+      </p:nvGrpSpPr>
+      <p:grpSpPr>
+        <a:xfrm>
+          <a:off x="0" y="0"/>
+          <a:ext cx="0" cy="0"/>
+          <a:chOff x="0" y="0"/>
+          <a:chExt cx="0" cy="0"/>
+        </a:xfrm>
+      </p:grpSpPr>
+      <p:sp>
+        <p:nvSpPr>
+          <p:cNvPr id="2" name="Slide Image Placeholder 1">
+            <a:extLst>
+              <a:ext uri="{FF2B5EF4-FFF2-40B4-BE49-F238E27FC236}">
+                <a16:creationId xmlns:a16="http://schemas.microsoft.com/office/drawing/2014/main" id="{E5B8A08D-7B15-345B-174E-0137119726DD}"/>
+              </a:ext>
+            </a:extLst>
+          </p:cNvPr>
+          <p:cNvSpPr>
+            <a:spLocks noGrp="1" noRot="1" noChangeAspect="1"/>
+          </p:cNvSpPr>
+          <p:nvPr>
+            <p:ph type="sldImg"/>
+          </p:nvPr>
+        </p:nvSpPr>
+        <p:spPr/>
+      </p:sp>
+      <p:sp>
+        <p:nvSpPr>
+          <p:cNvPr id="3" name="Notes Placeholder 2">
+            <a:extLst>
+              <a:ext uri="{FF2B5EF4-FFF2-40B4-BE49-F238E27FC236}">
+                <a16:creationId xmlns:a16="http://schemas.microsoft.com/office/drawing/2014/main" id="{87C36528-5C9F-6D3D-2878-1F6F63EF5EF6}"/>
+              </a:ext>
+            </a:extLst>
+          </p:cNvPr>
+          <p:cNvSpPr>
+            <a:spLocks noGrp="1"/>
+          </p:cNvSpPr>
+          <p:nvPr>
+            <p:ph type="body" idx="1"/>
+          </p:nvPr>
+        </p:nvSpPr>
+        <p:spPr/>
+        <p:txBody>
+          <a:bodyPr/>
+          <a:lstStyle/>
+          <a:p>
+            <a:endParaRPr lang="en-US" dirty="0"/>
+          </a:p>
+        </p:txBody>
+      </p:sp>
+      <p:sp>
+        <p:nvSpPr>
+          <p:cNvPr id="4" name="Slide Number Placeholder 3">
+            <a:extLst>
+              <a:ext uri="{FF2B5EF4-FFF2-40B4-BE49-F238E27FC236}">
+                <a16:creationId xmlns:a16="http://schemas.microsoft.com/office/drawing/2014/main" id="{8434CCF3-D8C3-1026-F89D-21DAB863A7FE}"/>
+              </a:ext>
+            </a:extLst>
+          </p:cNvPr>
+          <p:cNvSpPr>
+            <a:spLocks noGrp="1"/>
+          </p:cNvSpPr>
+          <p:nvPr>
+            <p:ph type="sldNum" sz="quarter" idx="5"/>
+          </p:nvPr>
+        </p:nvSpPr>
+        <p:spPr/>
+        <p:txBody>
+          <a:bodyPr/>
+          <a:lstStyle/>
+          <a:p>
+            <a:fld id="{D4D91577-4789-46FD-BE71-8B4B9405DF5E}" type="slidenum">
+              <a:rPr lang="en-US" smtClean="0"/>
+              <a:t>32</a:t>
+            </a:fld>
+            <a:endParaRPr lang="en-US"/>
+          </a:p>
+        </p:txBody>
+      </p:sp>
+    </p:spTree>
+    <p:extLst>
+      <p:ext uri="{BB962C8B-B14F-4D97-AF65-F5344CB8AC3E}">
+        <p14:creationId xmlns:p14="http://schemas.microsoft.com/office/powerpoint/2010/main" val="3631287574"/>
+      </p:ext>
+    </p:extLst>
+  </p:cSld>
+  <p:clrMapOvr>
+    <a:masterClrMapping/>
+  </p:clrMapOvr>
+</p:notes>
+</file>
+
 <file path=ppt/notesSlides/notesSlide2.xml><?xml version="1.0" encoding="utf-8"?>
 <p:notes xmlns:a="http://schemas.openxmlformats.org/drawingml/2006/main" xmlns:r="http://schemas.openxmlformats.org/officeDocument/2006/relationships" xmlns:p="http://schemas.openxmlformats.org/presentationml/2006/main">
   <p:cSld>
@@ -628,7 +1162,7 @@
           <a:p>
             <a:fld id="{D4D91577-4789-46FD-BE71-8B4B9405DF5E}" type="slidenum">
               <a:rPr lang="en-US" smtClean="0"/>
-              <a:t>3</a:t>
+              <a:t>7</a:t>
             </a:fld>
             <a:endParaRPr lang="en-US"/>
           </a:p>
@@ -637,7 +1171,7 @@
     </p:spTree>
     <p:extLst>
       <p:ext uri="{BB962C8B-B14F-4D97-AF65-F5344CB8AC3E}">
-        <p14:creationId xmlns:p14="http://schemas.microsoft.com/office/powerpoint/2010/main" val="3500403069"/>
+        <p14:creationId xmlns:p14="http://schemas.microsoft.com/office/powerpoint/2010/main" val="3594344913"/>
       </p:ext>
     </p:extLst>
   </p:cSld>
@@ -712,7 +1246,7 @@
           <a:p>
             <a:fld id="{D4D91577-4789-46FD-BE71-8B4B9405DF5E}" type="slidenum">
               <a:rPr lang="en-US" smtClean="0"/>
-              <a:t>9</a:t>
+              <a:t>8</a:t>
             </a:fld>
             <a:endParaRPr lang="en-US"/>
           </a:p>
@@ -721,7 +1255,631 @@
     </p:spTree>
     <p:extLst>
       <p:ext uri="{BB962C8B-B14F-4D97-AF65-F5344CB8AC3E}">
-        <p14:creationId xmlns:p14="http://schemas.microsoft.com/office/powerpoint/2010/main" val="3282203130"/>
+        <p14:creationId xmlns:p14="http://schemas.microsoft.com/office/powerpoint/2010/main" val="648714299"/>
+      </p:ext>
+    </p:extLst>
+  </p:cSld>
+  <p:clrMapOvr>
+    <a:masterClrMapping/>
+  </p:clrMapOvr>
+</p:notes>
+</file>
+
+<file path=ppt/notesSlides/notesSlide4.xml><?xml version="1.0" encoding="utf-8"?>
+<p:notes xmlns:a="http://schemas.openxmlformats.org/drawingml/2006/main" xmlns:r="http://schemas.openxmlformats.org/officeDocument/2006/relationships" xmlns:p="http://schemas.openxmlformats.org/presentationml/2006/main">
+  <p:cSld>
+    <p:spTree>
+      <p:nvGrpSpPr>
+        <p:cNvPr id="1" name=""/>
+        <p:cNvGrpSpPr/>
+        <p:nvPr/>
+      </p:nvGrpSpPr>
+      <p:grpSpPr>
+        <a:xfrm>
+          <a:off x="0" y="0"/>
+          <a:ext cx="0" cy="0"/>
+          <a:chOff x="0" y="0"/>
+          <a:chExt cx="0" cy="0"/>
+        </a:xfrm>
+      </p:grpSpPr>
+      <p:sp>
+        <p:nvSpPr>
+          <p:cNvPr id="2" name="Slide Image Placeholder 1"/>
+          <p:cNvSpPr>
+            <a:spLocks noGrp="1" noRot="1" noChangeAspect="1"/>
+          </p:cNvSpPr>
+          <p:nvPr>
+            <p:ph type="sldImg"/>
+          </p:nvPr>
+        </p:nvSpPr>
+        <p:spPr/>
+      </p:sp>
+      <p:sp>
+        <p:nvSpPr>
+          <p:cNvPr id="3" name="Notes Placeholder 2"/>
+          <p:cNvSpPr>
+            <a:spLocks noGrp="1"/>
+          </p:cNvSpPr>
+          <p:nvPr>
+            <p:ph type="body" idx="1"/>
+          </p:nvPr>
+        </p:nvSpPr>
+        <p:spPr/>
+        <p:txBody>
+          <a:bodyPr/>
+          <a:lstStyle/>
+          <a:p>
+            <a:endParaRPr lang="en-US" dirty="0"/>
+          </a:p>
+        </p:txBody>
+      </p:sp>
+      <p:sp>
+        <p:nvSpPr>
+          <p:cNvPr id="4" name="Slide Number Placeholder 3"/>
+          <p:cNvSpPr>
+            <a:spLocks noGrp="1"/>
+          </p:cNvSpPr>
+          <p:nvPr>
+            <p:ph type="sldNum" sz="quarter" idx="5"/>
+          </p:nvPr>
+        </p:nvSpPr>
+        <p:spPr/>
+        <p:txBody>
+          <a:bodyPr/>
+          <a:lstStyle/>
+          <a:p>
+            <a:fld id="{D4D91577-4789-46FD-BE71-8B4B9405DF5E}" type="slidenum">
+              <a:rPr lang="en-US" smtClean="0"/>
+              <a:t>15</a:t>
+            </a:fld>
+            <a:endParaRPr lang="en-US"/>
+          </a:p>
+        </p:txBody>
+      </p:sp>
+    </p:spTree>
+    <p:extLst>
+      <p:ext uri="{BB962C8B-B14F-4D97-AF65-F5344CB8AC3E}">
+        <p14:creationId xmlns:p14="http://schemas.microsoft.com/office/powerpoint/2010/main" val="3500403069"/>
+      </p:ext>
+    </p:extLst>
+  </p:cSld>
+  <p:clrMapOvr>
+    <a:masterClrMapping/>
+  </p:clrMapOvr>
+</p:notes>
+</file>
+
+<file path=ppt/notesSlides/notesSlide5.xml><?xml version="1.0" encoding="utf-8"?>
+<p:notes xmlns:a="http://schemas.openxmlformats.org/drawingml/2006/main" xmlns:r="http://schemas.openxmlformats.org/officeDocument/2006/relationships" xmlns:p="http://schemas.openxmlformats.org/presentationml/2006/main">
+  <p:cSld>
+    <p:spTree>
+      <p:nvGrpSpPr>
+        <p:cNvPr id="1" name="">
+          <a:extLst>
+            <a:ext uri="{FF2B5EF4-FFF2-40B4-BE49-F238E27FC236}">
+              <a16:creationId xmlns:a16="http://schemas.microsoft.com/office/drawing/2014/main" id="{F86EE3F9-76B5-A30E-2EA8-6503E8DC86A0}"/>
+            </a:ext>
+          </a:extLst>
+        </p:cNvPr>
+        <p:cNvGrpSpPr/>
+        <p:nvPr/>
+      </p:nvGrpSpPr>
+      <p:grpSpPr>
+        <a:xfrm>
+          <a:off x="0" y="0"/>
+          <a:ext cx="0" cy="0"/>
+          <a:chOff x="0" y="0"/>
+          <a:chExt cx="0" cy="0"/>
+        </a:xfrm>
+      </p:grpSpPr>
+      <p:sp>
+        <p:nvSpPr>
+          <p:cNvPr id="2" name="Slide Image Placeholder 1">
+            <a:extLst>
+              <a:ext uri="{FF2B5EF4-FFF2-40B4-BE49-F238E27FC236}">
+                <a16:creationId xmlns:a16="http://schemas.microsoft.com/office/drawing/2014/main" id="{2C75B621-CED2-74DD-A427-280618A4E0CD}"/>
+              </a:ext>
+            </a:extLst>
+          </p:cNvPr>
+          <p:cNvSpPr>
+            <a:spLocks noGrp="1" noRot="1" noChangeAspect="1"/>
+          </p:cNvSpPr>
+          <p:nvPr>
+            <p:ph type="sldImg"/>
+          </p:nvPr>
+        </p:nvSpPr>
+        <p:spPr/>
+      </p:sp>
+      <p:sp>
+        <p:nvSpPr>
+          <p:cNvPr id="3" name="Notes Placeholder 2">
+            <a:extLst>
+              <a:ext uri="{FF2B5EF4-FFF2-40B4-BE49-F238E27FC236}">
+                <a16:creationId xmlns:a16="http://schemas.microsoft.com/office/drawing/2014/main" id="{A0FEA91C-C6DC-F717-7D7D-9BBEA09EDFD2}"/>
+              </a:ext>
+            </a:extLst>
+          </p:cNvPr>
+          <p:cNvSpPr>
+            <a:spLocks noGrp="1"/>
+          </p:cNvSpPr>
+          <p:nvPr>
+            <p:ph type="body" idx="1"/>
+          </p:nvPr>
+        </p:nvSpPr>
+        <p:spPr/>
+        <p:txBody>
+          <a:bodyPr/>
+          <a:lstStyle/>
+          <a:p>
+            <a:endParaRPr lang="en-US" dirty="0"/>
+          </a:p>
+        </p:txBody>
+      </p:sp>
+      <p:sp>
+        <p:nvSpPr>
+          <p:cNvPr id="4" name="Slide Number Placeholder 3">
+            <a:extLst>
+              <a:ext uri="{FF2B5EF4-FFF2-40B4-BE49-F238E27FC236}">
+                <a16:creationId xmlns:a16="http://schemas.microsoft.com/office/drawing/2014/main" id="{80A73565-F369-6D5F-6B91-D9C08A7714A5}"/>
+              </a:ext>
+            </a:extLst>
+          </p:cNvPr>
+          <p:cNvSpPr>
+            <a:spLocks noGrp="1"/>
+          </p:cNvSpPr>
+          <p:nvPr>
+            <p:ph type="sldNum" sz="quarter" idx="5"/>
+          </p:nvPr>
+        </p:nvSpPr>
+        <p:spPr/>
+        <p:txBody>
+          <a:bodyPr/>
+          <a:lstStyle/>
+          <a:p>
+            <a:fld id="{D4D91577-4789-46FD-BE71-8B4B9405DF5E}" type="slidenum">
+              <a:rPr lang="en-US" smtClean="0"/>
+              <a:t>16</a:t>
+            </a:fld>
+            <a:endParaRPr lang="en-US"/>
+          </a:p>
+        </p:txBody>
+      </p:sp>
+    </p:spTree>
+    <p:extLst>
+      <p:ext uri="{BB962C8B-B14F-4D97-AF65-F5344CB8AC3E}">
+        <p14:creationId xmlns:p14="http://schemas.microsoft.com/office/powerpoint/2010/main" val="1196867198"/>
+      </p:ext>
+    </p:extLst>
+  </p:cSld>
+  <p:clrMapOvr>
+    <a:masterClrMapping/>
+  </p:clrMapOvr>
+</p:notes>
+</file>
+
+<file path=ppt/notesSlides/notesSlide6.xml><?xml version="1.0" encoding="utf-8"?>
+<p:notes xmlns:a="http://schemas.openxmlformats.org/drawingml/2006/main" xmlns:r="http://schemas.openxmlformats.org/officeDocument/2006/relationships" xmlns:p="http://schemas.openxmlformats.org/presentationml/2006/main">
+  <p:cSld>
+    <p:spTree>
+      <p:nvGrpSpPr>
+        <p:cNvPr id="1" name="">
+          <a:extLst>
+            <a:ext uri="{FF2B5EF4-FFF2-40B4-BE49-F238E27FC236}">
+              <a16:creationId xmlns:a16="http://schemas.microsoft.com/office/drawing/2014/main" id="{8BC046EF-150F-320A-A2A5-F42C2037AFC6}"/>
+            </a:ext>
+          </a:extLst>
+        </p:cNvPr>
+        <p:cNvGrpSpPr/>
+        <p:nvPr/>
+      </p:nvGrpSpPr>
+      <p:grpSpPr>
+        <a:xfrm>
+          <a:off x="0" y="0"/>
+          <a:ext cx="0" cy="0"/>
+          <a:chOff x="0" y="0"/>
+          <a:chExt cx="0" cy="0"/>
+        </a:xfrm>
+      </p:grpSpPr>
+      <p:sp>
+        <p:nvSpPr>
+          <p:cNvPr id="2" name="Slide Image Placeholder 1">
+            <a:extLst>
+              <a:ext uri="{FF2B5EF4-FFF2-40B4-BE49-F238E27FC236}">
+                <a16:creationId xmlns:a16="http://schemas.microsoft.com/office/drawing/2014/main" id="{78F22CDA-BCDE-AA34-72B0-DB514CC7F084}"/>
+              </a:ext>
+            </a:extLst>
+          </p:cNvPr>
+          <p:cNvSpPr>
+            <a:spLocks noGrp="1" noRot="1" noChangeAspect="1"/>
+          </p:cNvSpPr>
+          <p:nvPr>
+            <p:ph type="sldImg"/>
+          </p:nvPr>
+        </p:nvSpPr>
+        <p:spPr/>
+      </p:sp>
+      <p:sp>
+        <p:nvSpPr>
+          <p:cNvPr id="3" name="Notes Placeholder 2">
+            <a:extLst>
+              <a:ext uri="{FF2B5EF4-FFF2-40B4-BE49-F238E27FC236}">
+                <a16:creationId xmlns:a16="http://schemas.microsoft.com/office/drawing/2014/main" id="{3375FBAF-762C-AB4D-98FC-C9303A27FF1A}"/>
+              </a:ext>
+            </a:extLst>
+          </p:cNvPr>
+          <p:cNvSpPr>
+            <a:spLocks noGrp="1"/>
+          </p:cNvSpPr>
+          <p:nvPr>
+            <p:ph type="body" idx="1"/>
+          </p:nvPr>
+        </p:nvSpPr>
+        <p:spPr/>
+        <p:txBody>
+          <a:bodyPr/>
+          <a:lstStyle/>
+          <a:p>
+            <a:endParaRPr lang="en-US" dirty="0"/>
+          </a:p>
+        </p:txBody>
+      </p:sp>
+      <p:sp>
+        <p:nvSpPr>
+          <p:cNvPr id="4" name="Slide Number Placeholder 3">
+            <a:extLst>
+              <a:ext uri="{FF2B5EF4-FFF2-40B4-BE49-F238E27FC236}">
+                <a16:creationId xmlns:a16="http://schemas.microsoft.com/office/drawing/2014/main" id="{B2079AF7-5EFD-4E2C-D79E-CA97D4DA05B9}"/>
+              </a:ext>
+            </a:extLst>
+          </p:cNvPr>
+          <p:cNvSpPr>
+            <a:spLocks noGrp="1"/>
+          </p:cNvSpPr>
+          <p:nvPr>
+            <p:ph type="sldNum" sz="quarter" idx="5"/>
+          </p:nvPr>
+        </p:nvSpPr>
+        <p:spPr/>
+        <p:txBody>
+          <a:bodyPr/>
+          <a:lstStyle/>
+          <a:p>
+            <a:fld id="{D4D91577-4789-46FD-BE71-8B4B9405DF5E}" type="slidenum">
+              <a:rPr lang="en-US" smtClean="0"/>
+              <a:t>17</a:t>
+            </a:fld>
+            <a:endParaRPr lang="en-US"/>
+          </a:p>
+        </p:txBody>
+      </p:sp>
+    </p:spTree>
+    <p:extLst>
+      <p:ext uri="{BB962C8B-B14F-4D97-AF65-F5344CB8AC3E}">
+        <p14:creationId xmlns:p14="http://schemas.microsoft.com/office/powerpoint/2010/main" val="2646239276"/>
+      </p:ext>
+    </p:extLst>
+  </p:cSld>
+  <p:clrMapOvr>
+    <a:masterClrMapping/>
+  </p:clrMapOvr>
+</p:notes>
+</file>
+
+<file path=ppt/notesSlides/notesSlide7.xml><?xml version="1.0" encoding="utf-8"?>
+<p:notes xmlns:a="http://schemas.openxmlformats.org/drawingml/2006/main" xmlns:r="http://schemas.openxmlformats.org/officeDocument/2006/relationships" xmlns:p="http://schemas.openxmlformats.org/presentationml/2006/main">
+  <p:cSld>
+    <p:spTree>
+      <p:nvGrpSpPr>
+        <p:cNvPr id="1" name="">
+          <a:extLst>
+            <a:ext uri="{FF2B5EF4-FFF2-40B4-BE49-F238E27FC236}">
+              <a16:creationId xmlns:a16="http://schemas.microsoft.com/office/drawing/2014/main" id="{AA17E1CA-BD06-3DBC-555F-E3F06F861E54}"/>
+            </a:ext>
+          </a:extLst>
+        </p:cNvPr>
+        <p:cNvGrpSpPr/>
+        <p:nvPr/>
+      </p:nvGrpSpPr>
+      <p:grpSpPr>
+        <a:xfrm>
+          <a:off x="0" y="0"/>
+          <a:ext cx="0" cy="0"/>
+          <a:chOff x="0" y="0"/>
+          <a:chExt cx="0" cy="0"/>
+        </a:xfrm>
+      </p:grpSpPr>
+      <p:sp>
+        <p:nvSpPr>
+          <p:cNvPr id="2" name="Slide Image Placeholder 1">
+            <a:extLst>
+              <a:ext uri="{FF2B5EF4-FFF2-40B4-BE49-F238E27FC236}">
+                <a16:creationId xmlns:a16="http://schemas.microsoft.com/office/drawing/2014/main" id="{A5AB245E-75F6-F287-F1B7-444C69CF6857}"/>
+              </a:ext>
+            </a:extLst>
+          </p:cNvPr>
+          <p:cNvSpPr>
+            <a:spLocks noGrp="1" noRot="1" noChangeAspect="1"/>
+          </p:cNvSpPr>
+          <p:nvPr>
+            <p:ph type="sldImg"/>
+          </p:nvPr>
+        </p:nvSpPr>
+        <p:spPr/>
+      </p:sp>
+      <p:sp>
+        <p:nvSpPr>
+          <p:cNvPr id="3" name="Notes Placeholder 2">
+            <a:extLst>
+              <a:ext uri="{FF2B5EF4-FFF2-40B4-BE49-F238E27FC236}">
+                <a16:creationId xmlns:a16="http://schemas.microsoft.com/office/drawing/2014/main" id="{F8735BDF-8DC9-539F-FB8E-2A958C9562A9}"/>
+              </a:ext>
+            </a:extLst>
+          </p:cNvPr>
+          <p:cNvSpPr>
+            <a:spLocks noGrp="1"/>
+          </p:cNvSpPr>
+          <p:nvPr>
+            <p:ph type="body" idx="1"/>
+          </p:nvPr>
+        </p:nvSpPr>
+        <p:spPr/>
+        <p:txBody>
+          <a:bodyPr/>
+          <a:lstStyle/>
+          <a:p>
+            <a:endParaRPr lang="en-US" dirty="0"/>
+          </a:p>
+        </p:txBody>
+      </p:sp>
+      <p:sp>
+        <p:nvSpPr>
+          <p:cNvPr id="4" name="Slide Number Placeholder 3">
+            <a:extLst>
+              <a:ext uri="{FF2B5EF4-FFF2-40B4-BE49-F238E27FC236}">
+                <a16:creationId xmlns:a16="http://schemas.microsoft.com/office/drawing/2014/main" id="{BA37B41D-59A9-4B5B-8285-E96EFC06B073}"/>
+              </a:ext>
+            </a:extLst>
+          </p:cNvPr>
+          <p:cNvSpPr>
+            <a:spLocks noGrp="1"/>
+          </p:cNvSpPr>
+          <p:nvPr>
+            <p:ph type="sldNum" sz="quarter" idx="5"/>
+          </p:nvPr>
+        </p:nvSpPr>
+        <p:spPr/>
+        <p:txBody>
+          <a:bodyPr/>
+          <a:lstStyle/>
+          <a:p>
+            <a:fld id="{D4D91577-4789-46FD-BE71-8B4B9405DF5E}" type="slidenum">
+              <a:rPr lang="en-US" smtClean="0"/>
+              <a:t>18</a:t>
+            </a:fld>
+            <a:endParaRPr lang="en-US"/>
+          </a:p>
+        </p:txBody>
+      </p:sp>
+    </p:spTree>
+    <p:extLst>
+      <p:ext uri="{BB962C8B-B14F-4D97-AF65-F5344CB8AC3E}">
+        <p14:creationId xmlns:p14="http://schemas.microsoft.com/office/powerpoint/2010/main" val="197615513"/>
+      </p:ext>
+    </p:extLst>
+  </p:cSld>
+  <p:clrMapOvr>
+    <a:masterClrMapping/>
+  </p:clrMapOvr>
+</p:notes>
+</file>
+
+<file path=ppt/notesSlides/notesSlide8.xml><?xml version="1.0" encoding="utf-8"?>
+<p:notes xmlns:a="http://schemas.openxmlformats.org/drawingml/2006/main" xmlns:r="http://schemas.openxmlformats.org/officeDocument/2006/relationships" xmlns:p="http://schemas.openxmlformats.org/presentationml/2006/main">
+  <p:cSld>
+    <p:spTree>
+      <p:nvGrpSpPr>
+        <p:cNvPr id="1" name="">
+          <a:extLst>
+            <a:ext uri="{FF2B5EF4-FFF2-40B4-BE49-F238E27FC236}">
+              <a16:creationId xmlns:a16="http://schemas.microsoft.com/office/drawing/2014/main" id="{52569183-84A1-A021-7C53-6323464DDBC0}"/>
+            </a:ext>
+          </a:extLst>
+        </p:cNvPr>
+        <p:cNvGrpSpPr/>
+        <p:nvPr/>
+      </p:nvGrpSpPr>
+      <p:grpSpPr>
+        <a:xfrm>
+          <a:off x="0" y="0"/>
+          <a:ext cx="0" cy="0"/>
+          <a:chOff x="0" y="0"/>
+          <a:chExt cx="0" cy="0"/>
+        </a:xfrm>
+      </p:grpSpPr>
+      <p:sp>
+        <p:nvSpPr>
+          <p:cNvPr id="2" name="Slide Image Placeholder 1">
+            <a:extLst>
+              <a:ext uri="{FF2B5EF4-FFF2-40B4-BE49-F238E27FC236}">
+                <a16:creationId xmlns:a16="http://schemas.microsoft.com/office/drawing/2014/main" id="{80958145-1DF5-41E8-70F5-B36399765EBD}"/>
+              </a:ext>
+            </a:extLst>
+          </p:cNvPr>
+          <p:cNvSpPr>
+            <a:spLocks noGrp="1" noRot="1" noChangeAspect="1"/>
+          </p:cNvSpPr>
+          <p:nvPr>
+            <p:ph type="sldImg"/>
+          </p:nvPr>
+        </p:nvSpPr>
+        <p:spPr/>
+      </p:sp>
+      <p:sp>
+        <p:nvSpPr>
+          <p:cNvPr id="3" name="Notes Placeholder 2">
+            <a:extLst>
+              <a:ext uri="{FF2B5EF4-FFF2-40B4-BE49-F238E27FC236}">
+                <a16:creationId xmlns:a16="http://schemas.microsoft.com/office/drawing/2014/main" id="{BE91302A-298B-0B4B-E4CC-CD6A7FD714C7}"/>
+              </a:ext>
+            </a:extLst>
+          </p:cNvPr>
+          <p:cNvSpPr>
+            <a:spLocks noGrp="1"/>
+          </p:cNvSpPr>
+          <p:nvPr>
+            <p:ph type="body" idx="1"/>
+          </p:nvPr>
+        </p:nvSpPr>
+        <p:spPr/>
+        <p:txBody>
+          <a:bodyPr/>
+          <a:lstStyle/>
+          <a:p>
+            <a:endParaRPr lang="en-US" dirty="0"/>
+          </a:p>
+        </p:txBody>
+      </p:sp>
+      <p:sp>
+        <p:nvSpPr>
+          <p:cNvPr id="4" name="Slide Number Placeholder 3">
+            <a:extLst>
+              <a:ext uri="{FF2B5EF4-FFF2-40B4-BE49-F238E27FC236}">
+                <a16:creationId xmlns:a16="http://schemas.microsoft.com/office/drawing/2014/main" id="{10B91F62-B57C-3415-DC11-0AB5E385821A}"/>
+              </a:ext>
+            </a:extLst>
+          </p:cNvPr>
+          <p:cNvSpPr>
+            <a:spLocks noGrp="1"/>
+          </p:cNvSpPr>
+          <p:nvPr>
+            <p:ph type="sldNum" sz="quarter" idx="5"/>
+          </p:nvPr>
+        </p:nvSpPr>
+        <p:spPr/>
+        <p:txBody>
+          <a:bodyPr/>
+          <a:lstStyle/>
+          <a:p>
+            <a:fld id="{D4D91577-4789-46FD-BE71-8B4B9405DF5E}" type="slidenum">
+              <a:rPr lang="en-US" smtClean="0"/>
+              <a:t>23</a:t>
+            </a:fld>
+            <a:endParaRPr lang="en-US"/>
+          </a:p>
+        </p:txBody>
+      </p:sp>
+    </p:spTree>
+    <p:extLst>
+      <p:ext uri="{BB962C8B-B14F-4D97-AF65-F5344CB8AC3E}">
+        <p14:creationId xmlns:p14="http://schemas.microsoft.com/office/powerpoint/2010/main" val="2913361218"/>
+      </p:ext>
+    </p:extLst>
+  </p:cSld>
+  <p:clrMapOvr>
+    <a:masterClrMapping/>
+  </p:clrMapOvr>
+</p:notes>
+</file>
+
+<file path=ppt/notesSlides/notesSlide9.xml><?xml version="1.0" encoding="utf-8"?>
+<p:notes xmlns:a="http://schemas.openxmlformats.org/drawingml/2006/main" xmlns:r="http://schemas.openxmlformats.org/officeDocument/2006/relationships" xmlns:p="http://schemas.openxmlformats.org/presentationml/2006/main">
+  <p:cSld>
+    <p:spTree>
+      <p:nvGrpSpPr>
+        <p:cNvPr id="1" name="">
+          <a:extLst>
+            <a:ext uri="{FF2B5EF4-FFF2-40B4-BE49-F238E27FC236}">
+              <a16:creationId xmlns:a16="http://schemas.microsoft.com/office/drawing/2014/main" id="{37C6F2CE-411C-EC78-1B5F-377ED46A88B6}"/>
+            </a:ext>
+          </a:extLst>
+        </p:cNvPr>
+        <p:cNvGrpSpPr/>
+        <p:nvPr/>
+      </p:nvGrpSpPr>
+      <p:grpSpPr>
+        <a:xfrm>
+          <a:off x="0" y="0"/>
+          <a:ext cx="0" cy="0"/>
+          <a:chOff x="0" y="0"/>
+          <a:chExt cx="0" cy="0"/>
+        </a:xfrm>
+      </p:grpSpPr>
+      <p:sp>
+        <p:nvSpPr>
+          <p:cNvPr id="2" name="Slide Image Placeholder 1">
+            <a:extLst>
+              <a:ext uri="{FF2B5EF4-FFF2-40B4-BE49-F238E27FC236}">
+                <a16:creationId xmlns:a16="http://schemas.microsoft.com/office/drawing/2014/main" id="{A2BABC63-440E-C4A8-B757-B6CFB74271EC}"/>
+              </a:ext>
+            </a:extLst>
+          </p:cNvPr>
+          <p:cNvSpPr>
+            <a:spLocks noGrp="1" noRot="1" noChangeAspect="1"/>
+          </p:cNvSpPr>
+          <p:nvPr>
+            <p:ph type="sldImg"/>
+          </p:nvPr>
+        </p:nvSpPr>
+        <p:spPr/>
+      </p:sp>
+      <p:sp>
+        <p:nvSpPr>
+          <p:cNvPr id="3" name="Notes Placeholder 2">
+            <a:extLst>
+              <a:ext uri="{FF2B5EF4-FFF2-40B4-BE49-F238E27FC236}">
+                <a16:creationId xmlns:a16="http://schemas.microsoft.com/office/drawing/2014/main" id="{B8A8AC56-5DCE-57A3-3D22-AE47FADE3235}"/>
+              </a:ext>
+            </a:extLst>
+          </p:cNvPr>
+          <p:cNvSpPr>
+            <a:spLocks noGrp="1"/>
+          </p:cNvSpPr>
+          <p:nvPr>
+            <p:ph type="body" idx="1"/>
+          </p:nvPr>
+        </p:nvSpPr>
+        <p:spPr/>
+        <p:txBody>
+          <a:bodyPr/>
+          <a:lstStyle/>
+          <a:p>
+            <a:endParaRPr lang="en-US" dirty="0"/>
+          </a:p>
+        </p:txBody>
+      </p:sp>
+      <p:sp>
+        <p:nvSpPr>
+          <p:cNvPr id="4" name="Slide Number Placeholder 3">
+            <a:extLst>
+              <a:ext uri="{FF2B5EF4-FFF2-40B4-BE49-F238E27FC236}">
+                <a16:creationId xmlns:a16="http://schemas.microsoft.com/office/drawing/2014/main" id="{96B7EDEC-B407-CD9B-8C77-1EEED4F65561}"/>
+              </a:ext>
+            </a:extLst>
+          </p:cNvPr>
+          <p:cNvSpPr>
+            <a:spLocks noGrp="1"/>
+          </p:cNvSpPr>
+          <p:nvPr>
+            <p:ph type="sldNum" sz="quarter" idx="5"/>
+          </p:nvPr>
+        </p:nvSpPr>
+        <p:spPr/>
+        <p:txBody>
+          <a:bodyPr/>
+          <a:lstStyle/>
+          <a:p>
+            <a:fld id="{D4D91577-4789-46FD-BE71-8B4B9405DF5E}" type="slidenum">
+              <a:rPr lang="en-US" smtClean="0"/>
+              <a:t>24</a:t>
+            </a:fld>
+            <a:endParaRPr lang="en-US"/>
+          </a:p>
+        </p:txBody>
+      </p:sp>
+    </p:spTree>
+    <p:extLst>
+      <p:ext uri="{BB962C8B-B14F-4D97-AF65-F5344CB8AC3E}">
+        <p14:creationId xmlns:p14="http://schemas.microsoft.com/office/powerpoint/2010/main" val="2303670254"/>
       </p:ext>
     </p:extLst>
   </p:cSld>
@@ -899,7 +2057,7 @@
           <a:p>
             <a:fld id="{A8475C7E-A18D-4A37-80F0-92085AF4C701}" type="datetimeFigureOut">
               <a:rPr lang="en-US" smtClean="0"/>
-              <a:t>3/4/2025</a:t>
+              <a:t>3/6/2025</a:t>
             </a:fld>
             <a:endParaRPr lang="en-US"/>
           </a:p>
@@ -1127,7 +2285,7 @@
           <a:p>
             <a:fld id="{A8475C7E-A18D-4A37-80F0-92085AF4C701}" type="datetimeFigureOut">
               <a:rPr lang="en-US" smtClean="0"/>
-              <a:t>3/4/2025</a:t>
+              <a:t>3/6/2025</a:t>
             </a:fld>
             <a:endParaRPr lang="en-US"/>
           </a:p>
@@ -1307,7 +2465,7 @@
           <a:p>
             <a:fld id="{A8475C7E-A18D-4A37-80F0-92085AF4C701}" type="datetimeFigureOut">
               <a:rPr lang="en-US" smtClean="0"/>
-              <a:t>3/4/2025</a:t>
+              <a:t>3/6/2025</a:t>
             </a:fld>
             <a:endParaRPr lang="en-US"/>
           </a:p>
@@ -1477,7 +2635,7 @@
           <a:p>
             <a:fld id="{A8475C7E-A18D-4A37-80F0-92085AF4C701}" type="datetimeFigureOut">
               <a:rPr lang="en-US" smtClean="0"/>
-              <a:t>3/4/2025</a:t>
+              <a:t>3/6/2025</a:t>
             </a:fld>
             <a:endParaRPr lang="en-US"/>
           </a:p>
@@ -1731,7 +2889,7 @@
           <a:p>
             <a:fld id="{A8475C7E-A18D-4A37-80F0-92085AF4C701}" type="datetimeFigureOut">
               <a:rPr lang="en-US" smtClean="0"/>
-              <a:t>3/4/2025</a:t>
+              <a:t>3/6/2025</a:t>
             </a:fld>
             <a:endParaRPr lang="en-US"/>
           </a:p>
@@ -2057,7 +3215,7 @@
           <a:p>
             <a:fld id="{A8475C7E-A18D-4A37-80F0-92085AF4C701}" type="datetimeFigureOut">
               <a:rPr lang="en-US" smtClean="0"/>
-              <a:t>3/4/2025</a:t>
+              <a:t>3/6/2025</a:t>
             </a:fld>
             <a:endParaRPr lang="en-US"/>
           </a:p>
@@ -2508,7 +3666,7 @@
           <a:p>
             <a:fld id="{A8475C7E-A18D-4A37-80F0-92085AF4C701}" type="datetimeFigureOut">
               <a:rPr lang="en-US" smtClean="0"/>
-              <a:t>3/4/2025</a:t>
+              <a:t>3/6/2025</a:t>
             </a:fld>
             <a:endParaRPr lang="en-US"/>
           </a:p>
@@ -2626,7 +3784,7 @@
           <a:p>
             <a:fld id="{A8475C7E-A18D-4A37-80F0-92085AF4C701}" type="datetimeFigureOut">
               <a:rPr lang="en-US" smtClean="0"/>
-              <a:t>3/4/2025</a:t>
+              <a:t>3/6/2025</a:t>
             </a:fld>
             <a:endParaRPr lang="en-US"/>
           </a:p>
@@ -2721,7 +3879,7 @@
           <a:p>
             <a:fld id="{A8475C7E-A18D-4A37-80F0-92085AF4C701}" type="datetimeFigureOut">
               <a:rPr lang="en-US" smtClean="0"/>
-              <a:t>3/4/2025</a:t>
+              <a:t>3/6/2025</a:t>
             </a:fld>
             <a:endParaRPr lang="en-US"/>
           </a:p>
@@ -3008,7 +4166,7 @@
           <a:p>
             <a:fld id="{A8475C7E-A18D-4A37-80F0-92085AF4C701}" type="datetimeFigureOut">
               <a:rPr lang="en-US" smtClean="0"/>
-              <a:t>3/4/2025</a:t>
+              <a:t>3/6/2025</a:t>
             </a:fld>
             <a:endParaRPr lang="en-US"/>
           </a:p>
@@ -3330,7 +4488,7 @@
           <a:p>
             <a:fld id="{A8475C7E-A18D-4A37-80F0-92085AF4C701}" type="datetimeFigureOut">
               <a:rPr lang="en-US" smtClean="0"/>
-              <a:t>3/4/2025</a:t>
+              <a:t>3/6/2025</a:t>
             </a:fld>
             <a:endParaRPr lang="en-US"/>
           </a:p>
@@ -3584,7 +4742,7 @@
           <a:p>
             <a:fld id="{A8475C7E-A18D-4A37-80F0-92085AF4C701}" type="datetimeFigureOut">
               <a:rPr lang="en-US" smtClean="0"/>
-              <a:t>3/4/2025</a:t>
+              <a:t>3/6/2025</a:t>
             </a:fld>
             <a:endParaRPr lang="en-US"/>
           </a:p>
@@ -4115,7 +5273,7 @@
             </a:r>
             <a:r>
               <a:rPr lang="en-US" dirty="0"/>
-              <a:t>Preliminary Report</a:t>
+              <a:t>Study 3 Initial Report</a:t>
             </a:r>
           </a:p>
         </p:txBody>
@@ -4180,10 +5338,10 @@
       </p:grpSpPr>
       <p:pic>
         <p:nvPicPr>
-          <p:cNvPr id="3" name="Picture 2">
+          <p:cNvPr id="2" name="Picture 1" descr="A diagram with red green and blue squares&#10;&#10;AI-generated content may be incorrect.">
             <a:extLst>
               <a:ext uri="{FF2B5EF4-FFF2-40B4-BE49-F238E27FC236}">
-                <a16:creationId xmlns:a16="http://schemas.microsoft.com/office/drawing/2014/main" id="{914E5819-0934-5054-CFD4-312DEAA5F23C}"/>
+                <a16:creationId xmlns:a16="http://schemas.microsoft.com/office/drawing/2014/main" id="{CBEF4ED3-AEC9-3434-4758-3432BDD49E42}"/>
               </a:ext>
             </a:extLst>
           </p:cNvPr>
@@ -4193,55 +5351,36 @@
           <p:nvPr/>
         </p:nvPicPr>
         <p:blipFill>
-          <a:blip r:embed="rId2"/>
+          <a:blip r:embed="rId2">
+            <a:extLst>
+              <a:ext uri="{28A0092B-C50C-407E-A947-70E740481C1C}">
+                <a14:useLocalDpi xmlns:a14="http://schemas.microsoft.com/office/drawing/2010/main" val="0"/>
+              </a:ext>
+            </a:extLst>
+          </a:blip>
+          <a:srcRect/>
           <a:stretch>
             <a:fillRect/>
           </a:stretch>
         </p:blipFill>
-        <p:spPr>
+        <p:spPr bwMode="auto">
           <a:xfrm>
-            <a:off x="1172750" y="0"/>
-            <a:ext cx="9846499" cy="6858000"/>
+            <a:off x="824865" y="0"/>
+            <a:ext cx="10673832" cy="6858000"/>
           </a:xfrm>
           <a:prstGeom prst="rect">
             <a:avLst/>
           </a:prstGeom>
-        </p:spPr>
-      </p:pic>
-      <p:pic>
-        <p:nvPicPr>
-          <p:cNvPr id="4" name="Picture 3">
-            <a:extLst>
-              <a:ext uri="{FF2B5EF4-FFF2-40B4-BE49-F238E27FC236}">
-                <a16:creationId xmlns:a16="http://schemas.microsoft.com/office/drawing/2014/main" id="{539DC509-6737-3BEA-8C2F-E80112A032EF}"/>
-              </a:ext>
-            </a:extLst>
-          </p:cNvPr>
-          <p:cNvPicPr>
-            <a:picLocks noChangeAspect="1"/>
-          </p:cNvPicPr>
-          <p:nvPr/>
-        </p:nvPicPr>
-        <p:blipFill>
-          <a:blip r:embed="rId3"/>
-          <a:stretch>
-            <a:fillRect/>
-          </a:stretch>
-        </p:blipFill>
-        <p:spPr>
-          <a:xfrm>
-            <a:off x="1172750" y="0"/>
-            <a:ext cx="9846499" cy="6858000"/>
-          </a:xfrm>
-          <a:prstGeom prst="rect">
-            <a:avLst/>
-          </a:prstGeom>
+          <a:noFill/>
+          <a:ln>
+            <a:noFill/>
+          </a:ln>
         </p:spPr>
       </p:pic>
     </p:spTree>
     <p:extLst>
       <p:ext uri="{BB962C8B-B14F-4D97-AF65-F5344CB8AC3E}">
-        <p14:creationId xmlns:p14="http://schemas.microsoft.com/office/powerpoint/2010/main" val="1077731970"/>
+        <p14:creationId xmlns:p14="http://schemas.microsoft.com/office/powerpoint/2010/main" val="1297615311"/>
       </p:ext>
     </p:extLst>
   </p:cSld>
@@ -4256,7 +5395,13 @@
   <p:cSld>
     <p:spTree>
       <p:nvGrpSpPr>
-        <p:cNvPr id="1" name=""/>
+        <p:cNvPr id="1" name="">
+          <a:extLst>
+            <a:ext uri="{FF2B5EF4-FFF2-40B4-BE49-F238E27FC236}">
+              <a16:creationId xmlns:a16="http://schemas.microsoft.com/office/drawing/2014/main" id="{5E6B17C0-0BB1-8B08-8A1D-6C7EEB300A38}"/>
+            </a:ext>
+          </a:extLst>
+        </p:cNvPr>
         <p:cNvGrpSpPr/>
         <p:nvPr/>
       </p:nvGrpSpPr>
@@ -4270,10 +5415,10 @@
       </p:grpSpPr>
       <p:pic>
         <p:nvPicPr>
-          <p:cNvPr id="3" name="Picture 2">
+          <p:cNvPr id="2" name="Picture 1">
             <a:extLst>
               <a:ext uri="{FF2B5EF4-FFF2-40B4-BE49-F238E27FC236}">
-                <a16:creationId xmlns:a16="http://schemas.microsoft.com/office/drawing/2014/main" id="{3BCC1479-8CF7-BBA6-0320-72BC3A1470E0}"/>
+                <a16:creationId xmlns:a16="http://schemas.microsoft.com/office/drawing/2014/main" id="{0E54B38A-BC30-7F4C-CF47-AA603EA5462F}"/>
               </a:ext>
             </a:extLst>
           </p:cNvPr>
@@ -4283,55 +5428,34 @@
           <p:nvPr/>
         </p:nvPicPr>
         <p:blipFill>
-          <a:blip r:embed="rId2"/>
-          <a:stretch>
-            <a:fillRect/>
-          </a:stretch>
+          <a:blip r:embed="rId2">
+            <a:extLst>
+              <a:ext uri="{28A0092B-C50C-407E-A947-70E740481C1C}">
+                <a14:useLocalDpi xmlns:a14="http://schemas.microsoft.com/office/drawing/2010/main" val="0"/>
+              </a:ext>
+            </a:extLst>
+          </a:blip>
+          <a:srcRect/>
+          <a:stretch/>
         </p:blipFill>
-        <p:spPr>
+        <p:spPr bwMode="auto">
           <a:xfrm>
-            <a:off x="1172750" y="0"/>
-            <a:ext cx="9846499" cy="6858000"/>
+            <a:off x="826564" y="0"/>
+            <a:ext cx="10670434" cy="6858000"/>
           </a:xfrm>
           <a:prstGeom prst="rect">
             <a:avLst/>
           </a:prstGeom>
-        </p:spPr>
-      </p:pic>
-      <p:pic>
-        <p:nvPicPr>
-          <p:cNvPr id="4" name="Picture 3">
-            <a:extLst>
-              <a:ext uri="{FF2B5EF4-FFF2-40B4-BE49-F238E27FC236}">
-                <a16:creationId xmlns:a16="http://schemas.microsoft.com/office/drawing/2014/main" id="{79D4629A-6BCD-5048-5661-D9174AA29A21}"/>
-              </a:ext>
-            </a:extLst>
-          </p:cNvPr>
-          <p:cNvPicPr>
-            <a:picLocks noChangeAspect="1"/>
-          </p:cNvPicPr>
-          <p:nvPr/>
-        </p:nvPicPr>
-        <p:blipFill>
-          <a:blip r:embed="rId3"/>
-          <a:stretch>
-            <a:fillRect/>
-          </a:stretch>
-        </p:blipFill>
-        <p:spPr>
-          <a:xfrm>
-            <a:off x="1172750" y="0"/>
-            <a:ext cx="9846499" cy="6858000"/>
-          </a:xfrm>
-          <a:prstGeom prst="rect">
-            <a:avLst/>
-          </a:prstGeom>
+          <a:noFill/>
+          <a:ln>
+            <a:noFill/>
+          </a:ln>
         </p:spPr>
       </p:pic>
     </p:spTree>
     <p:extLst>
       <p:ext uri="{BB962C8B-B14F-4D97-AF65-F5344CB8AC3E}">
-        <p14:creationId xmlns:p14="http://schemas.microsoft.com/office/powerpoint/2010/main" val="3846215047"/>
+        <p14:creationId xmlns:p14="http://schemas.microsoft.com/office/powerpoint/2010/main" val="999285538"/>
       </p:ext>
     </p:extLst>
   </p:cSld>
@@ -4349,7 +5473,7 @@
         <p:cNvPr id="1" name="">
           <a:extLst>
             <a:ext uri="{FF2B5EF4-FFF2-40B4-BE49-F238E27FC236}">
-              <a16:creationId xmlns:a16="http://schemas.microsoft.com/office/drawing/2014/main" id="{D3C9A42D-D98E-C85D-557E-2BCE10B5CE90}"/>
+              <a16:creationId xmlns:a16="http://schemas.microsoft.com/office/drawing/2014/main" id="{A3E098F0-A5B3-28DB-2185-7F0C6995B378}"/>
             </a:ext>
           </a:extLst>
         </p:cNvPr>
@@ -4364,63 +5488,49 @@
           <a:chExt cx="0" cy="0"/>
         </a:xfrm>
       </p:grpSpPr>
-      <p:sp>
-        <p:nvSpPr>
-          <p:cNvPr id="2" name="Title 1">
+      <p:pic>
+        <p:nvPicPr>
+          <p:cNvPr id="2" name="Picture 1">
             <a:extLst>
               <a:ext uri="{FF2B5EF4-FFF2-40B4-BE49-F238E27FC236}">
-                <a16:creationId xmlns:a16="http://schemas.microsoft.com/office/drawing/2014/main" id="{6893F0A8-2333-7336-A0FE-37D3E342422E}"/>
+                <a16:creationId xmlns:a16="http://schemas.microsoft.com/office/drawing/2014/main" id="{8660C8F7-0614-73C3-93CF-BEFA29B2E5FC}"/>
               </a:ext>
             </a:extLst>
           </p:cNvPr>
-          <p:cNvSpPr>
-            <a:spLocks noGrp="1"/>
-          </p:cNvSpPr>
-          <p:nvPr>
-            <p:ph type="title"/>
-          </p:nvPr>
-        </p:nvSpPr>
-        <p:spPr/>
-        <p:txBody>
-          <a:bodyPr/>
-          <a:lstStyle/>
-          <a:p>
-            <a:r>
-              <a:rPr lang="en-US" dirty="0"/>
-              <a:t>Support for Usage of AI in the Workplace</a:t>
-            </a:r>
-          </a:p>
-        </p:txBody>
-      </p:sp>
-      <p:sp>
-        <p:nvSpPr>
-          <p:cNvPr id="3" name="Text Placeholder 2">
-            <a:extLst>
-              <a:ext uri="{FF2B5EF4-FFF2-40B4-BE49-F238E27FC236}">
-                <a16:creationId xmlns:a16="http://schemas.microsoft.com/office/drawing/2014/main" id="{94425E17-CF21-6BE9-68D6-8843F87968E5}"/>
-              </a:ext>
-            </a:extLst>
-          </p:cNvPr>
-          <p:cNvSpPr>
-            <a:spLocks noGrp="1"/>
-          </p:cNvSpPr>
-          <p:nvPr>
-            <p:ph type="body" idx="1"/>
-          </p:nvPr>
-        </p:nvSpPr>
-        <p:spPr/>
-        <p:txBody>
-          <a:bodyPr/>
-          <a:lstStyle/>
-          <a:p>
-            <a:endParaRPr lang="en-US"/>
-          </a:p>
-        </p:txBody>
-      </p:sp>
+          <p:cNvPicPr>
+            <a:picLocks noChangeAspect="1"/>
+          </p:cNvPicPr>
+          <p:nvPr/>
+        </p:nvPicPr>
+        <p:blipFill>
+          <a:blip r:embed="rId2">
+            <a:extLst>
+              <a:ext uri="{28A0092B-C50C-407E-A947-70E740481C1C}">
+                <a14:useLocalDpi xmlns:a14="http://schemas.microsoft.com/office/drawing/2010/main" val="0"/>
+              </a:ext>
+            </a:extLst>
+          </a:blip>
+          <a:srcRect/>
+          <a:stretch/>
+        </p:blipFill>
+        <p:spPr bwMode="auto">
+          <a:xfrm>
+            <a:off x="826564" y="0"/>
+            <a:ext cx="10670434" cy="6857999"/>
+          </a:xfrm>
+          <a:prstGeom prst="rect">
+            <a:avLst/>
+          </a:prstGeom>
+          <a:noFill/>
+          <a:ln>
+            <a:noFill/>
+          </a:ln>
+        </p:spPr>
+      </p:pic>
     </p:spTree>
     <p:extLst>
       <p:ext uri="{BB962C8B-B14F-4D97-AF65-F5344CB8AC3E}">
-        <p14:creationId xmlns:p14="http://schemas.microsoft.com/office/powerpoint/2010/main" val="1842140826"/>
+        <p14:creationId xmlns:p14="http://schemas.microsoft.com/office/powerpoint/2010/main" val="1921417523"/>
       </p:ext>
     </p:extLst>
   </p:cSld>
@@ -4447,45 +5557,73 @@
           <a:chExt cx="0" cy="0"/>
         </a:xfrm>
       </p:grpSpPr>
-      <p:pic>
-        <p:nvPicPr>
-          <p:cNvPr id="4" name="Picture 3">
+      <p:sp>
+        <p:nvSpPr>
+          <p:cNvPr id="2" name="Title 1">
             <a:extLst>
               <a:ext uri="{FF2B5EF4-FFF2-40B4-BE49-F238E27FC236}">
-                <a16:creationId xmlns:a16="http://schemas.microsoft.com/office/drawing/2014/main" id="{FA224250-4E44-991B-998C-E30E59D4D447}"/>
+                <a16:creationId xmlns:a16="http://schemas.microsoft.com/office/drawing/2014/main" id="{23587355-91CF-D269-0718-C38BEFF84B2C}"/>
               </a:ext>
             </a:extLst>
           </p:cNvPr>
-          <p:cNvPicPr>
-            <a:picLocks noChangeAspect="1"/>
-          </p:cNvPicPr>
-          <p:nvPr/>
-        </p:nvPicPr>
-        <p:blipFill>
-          <a:blip r:embed="rId2">
-            <a:extLst>
-              <a:ext uri="{28A0092B-C50C-407E-A947-70E740481C1C}">
-                <a14:useLocalDpi xmlns:a14="http://schemas.microsoft.com/office/drawing/2010/main" val="0"/>
-              </a:ext>
-            </a:extLst>
-          </a:blip>
-          <a:srcRect/>
-          <a:stretch/>
-        </p:blipFill>
-        <p:spPr>
-          <a:xfrm>
-            <a:off x="1523999" y="0"/>
-            <a:ext cx="9144000" cy="6858000"/>
-          </a:xfrm>
-          <a:prstGeom prst="rect">
-            <a:avLst/>
-          </a:prstGeom>
-        </p:spPr>
-      </p:pic>
+          <p:cNvSpPr>
+            <a:spLocks noGrp="1"/>
+          </p:cNvSpPr>
+          <p:nvPr>
+            <p:ph type="title"/>
+          </p:nvPr>
+        </p:nvSpPr>
+        <p:spPr/>
+        <p:txBody>
+          <a:bodyPr/>
+          <a:lstStyle/>
+          <a:p>
+            <a:r>
+              <a:rPr lang="en-US" dirty="0"/>
+              <a:t>Universal Health Care (UHC)</a:t>
+            </a:r>
+          </a:p>
+        </p:txBody>
+      </p:sp>
+      <p:sp>
+        <p:nvSpPr>
+          <p:cNvPr id="3" name="Text Placeholder 2">
+            <a:extLst>
+              <a:ext uri="{FF2B5EF4-FFF2-40B4-BE49-F238E27FC236}">
+                <a16:creationId xmlns:a16="http://schemas.microsoft.com/office/drawing/2014/main" id="{BC691987-E01E-3252-9622-601A7C69977A}"/>
+              </a:ext>
+            </a:extLst>
+          </p:cNvPr>
+          <p:cNvSpPr>
+            <a:spLocks noGrp="1"/>
+          </p:cNvSpPr>
+          <p:nvPr>
+            <p:ph type="body" idx="1"/>
+          </p:nvPr>
+        </p:nvSpPr>
+        <p:spPr/>
+        <p:txBody>
+          <a:bodyPr/>
+          <a:lstStyle/>
+          <a:p>
+            <a:r>
+              <a:rPr lang="en-US" b="0" i="0" dirty="0">
+                <a:solidFill>
+                  <a:srgbClr val="32363A"/>
+                </a:solidFill>
+                <a:effectLst/>
+                <a:latin typeface="72"/>
+              </a:rPr>
+              <a:t>"Our government needs to implement Universal Health Care because basic population needs are not being met"</a:t>
+            </a:r>
+            <a:endParaRPr lang="en-US" dirty="0"/>
+          </a:p>
+        </p:txBody>
+      </p:sp>
     </p:spTree>
     <p:extLst>
       <p:ext uri="{BB962C8B-B14F-4D97-AF65-F5344CB8AC3E}">
-        <p14:creationId xmlns:p14="http://schemas.microsoft.com/office/powerpoint/2010/main" val="3820399925"/>
+        <p14:creationId xmlns:p14="http://schemas.microsoft.com/office/powerpoint/2010/main" val="152534778"/>
       </p:ext>
     </p:extLst>
   </p:cSld>
@@ -4514,10 +5652,10 @@
       </p:grpSpPr>
       <p:pic>
         <p:nvPicPr>
-          <p:cNvPr id="3" name="Picture 2">
+          <p:cNvPr id="4" name="Picture 3" descr="A graph showing a support for universal health care&#10;&#10;AI-generated content may be incorrect.">
             <a:extLst>
               <a:ext uri="{FF2B5EF4-FFF2-40B4-BE49-F238E27FC236}">
-                <a16:creationId xmlns:a16="http://schemas.microsoft.com/office/drawing/2014/main" id="{B7FE5179-C428-03E5-6084-08BC032524B7}"/>
+                <a16:creationId xmlns:a16="http://schemas.microsoft.com/office/drawing/2014/main" id="{22C62B74-702F-DDC0-6A6C-A55291DE8240}"/>
               </a:ext>
             </a:extLst>
           </p:cNvPr>
@@ -4527,45 +5665,21 @@
           <p:nvPr/>
         </p:nvPicPr>
         <p:blipFill>
-          <a:blip r:embed="rId2"/>
+          <a:blip r:embed="rId2">
+            <a:extLst>
+              <a:ext uri="{28A0092B-C50C-407E-A947-70E740481C1C}">
+                <a14:useLocalDpi xmlns:a14="http://schemas.microsoft.com/office/drawing/2010/main" val="0"/>
+              </a:ext>
+            </a:extLst>
+          </a:blip>
           <a:stretch>
             <a:fillRect/>
           </a:stretch>
         </p:blipFill>
         <p:spPr>
           <a:xfrm>
-            <a:off x="1172750" y="0"/>
-            <a:ext cx="9846499" cy="6858000"/>
-          </a:xfrm>
-          <a:prstGeom prst="rect">
-            <a:avLst/>
-          </a:prstGeom>
-        </p:spPr>
-      </p:pic>
-      <p:pic>
-        <p:nvPicPr>
-          <p:cNvPr id="4" name="Picture 3">
-            <a:extLst>
-              <a:ext uri="{FF2B5EF4-FFF2-40B4-BE49-F238E27FC236}">
-                <a16:creationId xmlns:a16="http://schemas.microsoft.com/office/drawing/2014/main" id="{2C8D95AF-DF48-9D7F-4574-9E4FA3A2616E}"/>
-              </a:ext>
-            </a:extLst>
-          </p:cNvPr>
-          <p:cNvPicPr>
-            <a:picLocks noChangeAspect="1"/>
-          </p:cNvPicPr>
-          <p:nvPr/>
-        </p:nvPicPr>
-        <p:blipFill>
-          <a:blip r:embed="rId3"/>
-          <a:stretch>
-            <a:fillRect/>
-          </a:stretch>
-        </p:blipFill>
-        <p:spPr>
-          <a:xfrm>
-            <a:off x="1172750" y="0"/>
-            <a:ext cx="9846499" cy="6858000"/>
+            <a:off x="1177636" y="0"/>
+            <a:ext cx="9836727" cy="6858000"/>
           </a:xfrm>
           <a:prstGeom prst="rect">
             <a:avLst/>
@@ -4575,7 +5689,7 @@
     </p:spTree>
     <p:extLst>
       <p:ext uri="{BB962C8B-B14F-4D97-AF65-F5344CB8AC3E}">
-        <p14:creationId xmlns:p14="http://schemas.microsoft.com/office/powerpoint/2010/main" val="3421000894"/>
+        <p14:creationId xmlns:p14="http://schemas.microsoft.com/office/powerpoint/2010/main" val="434513719"/>
       </p:ext>
     </p:extLst>
   </p:cSld>
@@ -4604,269 +5718,6 @@
       </p:grpSpPr>
       <p:pic>
         <p:nvPicPr>
-          <p:cNvPr id="3" name="Picture 2">
-            <a:extLst>
-              <a:ext uri="{FF2B5EF4-FFF2-40B4-BE49-F238E27FC236}">
-                <a16:creationId xmlns:a16="http://schemas.microsoft.com/office/drawing/2014/main" id="{AE2C1AAB-B91D-BE8E-A3E8-F7E8CA75233B}"/>
-              </a:ext>
-            </a:extLst>
-          </p:cNvPr>
-          <p:cNvPicPr>
-            <a:picLocks noChangeAspect="1"/>
-          </p:cNvPicPr>
-          <p:nvPr/>
-        </p:nvPicPr>
-        <p:blipFill>
-          <a:blip r:embed="rId2"/>
-          <a:stretch>
-            <a:fillRect/>
-          </a:stretch>
-        </p:blipFill>
-        <p:spPr>
-          <a:xfrm>
-            <a:off x="1172750" y="0"/>
-            <a:ext cx="9846499" cy="6858000"/>
-          </a:xfrm>
-          <a:prstGeom prst="rect">
-            <a:avLst/>
-          </a:prstGeom>
-        </p:spPr>
-      </p:pic>
-      <p:pic>
-        <p:nvPicPr>
-          <p:cNvPr id="4" name="Picture 3">
-            <a:extLst>
-              <a:ext uri="{FF2B5EF4-FFF2-40B4-BE49-F238E27FC236}">
-                <a16:creationId xmlns:a16="http://schemas.microsoft.com/office/drawing/2014/main" id="{B3650635-4AE4-5F46-352E-0C56DB8CAFCF}"/>
-              </a:ext>
-            </a:extLst>
-          </p:cNvPr>
-          <p:cNvPicPr>
-            <a:picLocks noChangeAspect="1"/>
-          </p:cNvPicPr>
-          <p:nvPr/>
-        </p:nvPicPr>
-        <p:blipFill>
-          <a:blip r:embed="rId3"/>
-          <a:stretch>
-            <a:fillRect/>
-          </a:stretch>
-        </p:blipFill>
-        <p:spPr>
-          <a:xfrm>
-            <a:off x="1172750" y="0"/>
-            <a:ext cx="9846499" cy="6858000"/>
-          </a:xfrm>
-          <a:prstGeom prst="rect">
-            <a:avLst/>
-          </a:prstGeom>
-        </p:spPr>
-      </p:pic>
-    </p:spTree>
-    <p:extLst>
-      <p:ext uri="{BB962C8B-B14F-4D97-AF65-F5344CB8AC3E}">
-        <p14:creationId xmlns:p14="http://schemas.microsoft.com/office/powerpoint/2010/main" val="3299580149"/>
-      </p:ext>
-    </p:extLst>
-  </p:cSld>
-  <p:clrMapOvr>
-    <a:masterClrMapping/>
-  </p:clrMapOvr>
-</p:sld>
-</file>
-
-<file path=ppt/slides/slide16.xml><?xml version="1.0" encoding="utf-8"?>
-<p:sld xmlns:a="http://schemas.openxmlformats.org/drawingml/2006/main" xmlns:r="http://schemas.openxmlformats.org/officeDocument/2006/relationships" xmlns:p="http://schemas.openxmlformats.org/presentationml/2006/main">
-  <p:cSld>
-    <p:spTree>
-      <p:nvGrpSpPr>
-        <p:cNvPr id="1" name=""/>
-        <p:cNvGrpSpPr/>
-        <p:nvPr/>
-      </p:nvGrpSpPr>
-      <p:grpSpPr>
-        <a:xfrm>
-          <a:off x="0" y="0"/>
-          <a:ext cx="0" cy="0"/>
-          <a:chOff x="0" y="0"/>
-          <a:chExt cx="0" cy="0"/>
-        </a:xfrm>
-      </p:grpSpPr>
-      <p:pic>
-        <p:nvPicPr>
-          <p:cNvPr id="3" name="Picture 2">
-            <a:extLst>
-              <a:ext uri="{FF2B5EF4-FFF2-40B4-BE49-F238E27FC236}">
-                <a16:creationId xmlns:a16="http://schemas.microsoft.com/office/drawing/2014/main" id="{E265476D-15EA-623F-2227-0FDEF6643E26}"/>
-              </a:ext>
-            </a:extLst>
-          </p:cNvPr>
-          <p:cNvPicPr>
-            <a:picLocks noChangeAspect="1"/>
-          </p:cNvPicPr>
-          <p:nvPr/>
-        </p:nvPicPr>
-        <p:blipFill>
-          <a:blip r:embed="rId2"/>
-          <a:stretch>
-            <a:fillRect/>
-          </a:stretch>
-        </p:blipFill>
-        <p:spPr>
-          <a:xfrm>
-            <a:off x="1172750" y="0"/>
-            <a:ext cx="9846499" cy="6858000"/>
-          </a:xfrm>
-          <a:prstGeom prst="rect">
-            <a:avLst/>
-          </a:prstGeom>
-        </p:spPr>
-      </p:pic>
-      <p:pic>
-        <p:nvPicPr>
-          <p:cNvPr id="4" name="Picture 3">
-            <a:extLst>
-              <a:ext uri="{FF2B5EF4-FFF2-40B4-BE49-F238E27FC236}">
-                <a16:creationId xmlns:a16="http://schemas.microsoft.com/office/drawing/2014/main" id="{866ED31B-CDC6-8C3E-F50A-EF088E57CE55}"/>
-              </a:ext>
-            </a:extLst>
-          </p:cNvPr>
-          <p:cNvPicPr>
-            <a:picLocks noChangeAspect="1"/>
-          </p:cNvPicPr>
-          <p:nvPr/>
-        </p:nvPicPr>
-        <p:blipFill>
-          <a:blip r:embed="rId3"/>
-          <a:stretch>
-            <a:fillRect/>
-          </a:stretch>
-        </p:blipFill>
-        <p:spPr>
-          <a:xfrm>
-            <a:off x="1172750" y="0"/>
-            <a:ext cx="9846499" cy="6858000"/>
-          </a:xfrm>
-          <a:prstGeom prst="rect">
-            <a:avLst/>
-          </a:prstGeom>
-        </p:spPr>
-      </p:pic>
-    </p:spTree>
-    <p:extLst>
-      <p:ext uri="{BB962C8B-B14F-4D97-AF65-F5344CB8AC3E}">
-        <p14:creationId xmlns:p14="http://schemas.microsoft.com/office/powerpoint/2010/main" val="136680579"/>
-      </p:ext>
-    </p:extLst>
-  </p:cSld>
-  <p:clrMapOvr>
-    <a:masterClrMapping/>
-  </p:clrMapOvr>
-</p:sld>
-</file>
-
-<file path=ppt/slides/slide2.xml><?xml version="1.0" encoding="utf-8"?>
-<p:sld xmlns:a="http://schemas.openxmlformats.org/drawingml/2006/main" xmlns:r="http://schemas.openxmlformats.org/officeDocument/2006/relationships" xmlns:p="http://schemas.openxmlformats.org/presentationml/2006/main">
-  <p:cSld>
-    <p:spTree>
-      <p:nvGrpSpPr>
-        <p:cNvPr id="1" name=""/>
-        <p:cNvGrpSpPr/>
-        <p:nvPr/>
-      </p:nvGrpSpPr>
-      <p:grpSpPr>
-        <a:xfrm>
-          <a:off x="0" y="0"/>
-          <a:ext cx="0" cy="0"/>
-          <a:chOff x="0" y="0"/>
-          <a:chExt cx="0" cy="0"/>
-        </a:xfrm>
-      </p:grpSpPr>
-      <p:sp>
-        <p:nvSpPr>
-          <p:cNvPr id="2" name="Title 1">
-            <a:extLst>
-              <a:ext uri="{FF2B5EF4-FFF2-40B4-BE49-F238E27FC236}">
-                <a16:creationId xmlns:a16="http://schemas.microsoft.com/office/drawing/2014/main" id="{23587355-91CF-D269-0718-C38BEFF84B2C}"/>
-              </a:ext>
-            </a:extLst>
-          </p:cNvPr>
-          <p:cNvSpPr>
-            <a:spLocks noGrp="1"/>
-          </p:cNvSpPr>
-          <p:nvPr>
-            <p:ph type="title"/>
-          </p:nvPr>
-        </p:nvSpPr>
-        <p:spPr/>
-        <p:txBody>
-          <a:bodyPr/>
-          <a:lstStyle/>
-          <a:p>
-            <a:r>
-              <a:rPr lang="en-US" dirty="0"/>
-              <a:t>Support for Universal Health Care (UHC)</a:t>
-            </a:r>
-          </a:p>
-        </p:txBody>
-      </p:sp>
-      <p:sp>
-        <p:nvSpPr>
-          <p:cNvPr id="3" name="Text Placeholder 2">
-            <a:extLst>
-              <a:ext uri="{FF2B5EF4-FFF2-40B4-BE49-F238E27FC236}">
-                <a16:creationId xmlns:a16="http://schemas.microsoft.com/office/drawing/2014/main" id="{BC691987-E01E-3252-9622-601A7C69977A}"/>
-              </a:ext>
-            </a:extLst>
-          </p:cNvPr>
-          <p:cNvSpPr>
-            <a:spLocks noGrp="1"/>
-          </p:cNvSpPr>
-          <p:nvPr>
-            <p:ph type="body" idx="1"/>
-          </p:nvPr>
-        </p:nvSpPr>
-        <p:spPr/>
-        <p:txBody>
-          <a:bodyPr/>
-          <a:lstStyle/>
-          <a:p>
-            <a:endParaRPr lang="en-US"/>
-          </a:p>
-        </p:txBody>
-      </p:sp>
-    </p:spTree>
-    <p:extLst>
-      <p:ext uri="{BB962C8B-B14F-4D97-AF65-F5344CB8AC3E}">
-        <p14:creationId xmlns:p14="http://schemas.microsoft.com/office/powerpoint/2010/main" val="152534778"/>
-      </p:ext>
-    </p:extLst>
-  </p:cSld>
-  <p:clrMapOvr>
-    <a:masterClrMapping/>
-  </p:clrMapOvr>
-</p:sld>
-</file>
-
-<file path=ppt/slides/slide3.xml><?xml version="1.0" encoding="utf-8"?>
-<p:sld xmlns:a="http://schemas.openxmlformats.org/drawingml/2006/main" xmlns:r="http://schemas.openxmlformats.org/officeDocument/2006/relationships" xmlns:p="http://schemas.openxmlformats.org/presentationml/2006/main">
-  <p:cSld>
-    <p:spTree>
-      <p:nvGrpSpPr>
-        <p:cNvPr id="1" name=""/>
-        <p:cNvGrpSpPr/>
-        <p:nvPr/>
-      </p:nvGrpSpPr>
-      <p:grpSpPr>
-        <a:xfrm>
-          <a:off x="0" y="0"/>
-          <a:ext cx="0" cy="0"/>
-          <a:chOff x="0" y="0"/>
-          <a:chExt cx="0" cy="0"/>
-        </a:xfrm>
-      </p:grpSpPr>
-      <p:pic>
-        <p:nvPicPr>
           <p:cNvPr id="4" name="Picture 3">
             <a:extLst>
               <a:ext uri="{FF2B5EF4-FFF2-40B4-BE49-F238E27FC236}">
@@ -4913,7 +5764,220 @@
 </p:sld>
 </file>
 
-<file path=ppt/slides/slide4.xml><?xml version="1.0" encoding="utf-8"?>
+<file path=ppt/slides/slide16.xml><?xml version="1.0" encoding="utf-8"?>
+<p:sld xmlns:a="http://schemas.openxmlformats.org/drawingml/2006/main" xmlns:r="http://schemas.openxmlformats.org/officeDocument/2006/relationships" xmlns:p="http://schemas.openxmlformats.org/presentationml/2006/main">
+  <p:cSld>
+    <p:spTree>
+      <p:nvGrpSpPr>
+        <p:cNvPr id="1" name="">
+          <a:extLst>
+            <a:ext uri="{FF2B5EF4-FFF2-40B4-BE49-F238E27FC236}">
+              <a16:creationId xmlns:a16="http://schemas.microsoft.com/office/drawing/2014/main" id="{BF025AA0-DA26-F1B1-5B05-25C0705F06D4}"/>
+            </a:ext>
+          </a:extLst>
+        </p:cNvPr>
+        <p:cNvGrpSpPr/>
+        <p:nvPr/>
+      </p:nvGrpSpPr>
+      <p:grpSpPr>
+        <a:xfrm>
+          <a:off x="0" y="0"/>
+          <a:ext cx="0" cy="0"/>
+          <a:chOff x="0" y="0"/>
+          <a:chExt cx="0" cy="0"/>
+        </a:xfrm>
+      </p:grpSpPr>
+      <p:pic>
+        <p:nvPicPr>
+          <p:cNvPr id="4" name="Picture 3">
+            <a:extLst>
+              <a:ext uri="{FF2B5EF4-FFF2-40B4-BE49-F238E27FC236}">
+                <a16:creationId xmlns:a16="http://schemas.microsoft.com/office/drawing/2014/main" id="{C1E5B07F-A832-AE7D-89EB-951DC77244AB}"/>
+              </a:ext>
+            </a:extLst>
+          </p:cNvPr>
+          <p:cNvPicPr>
+            <a:picLocks noChangeAspect="1"/>
+          </p:cNvPicPr>
+          <p:nvPr/>
+        </p:nvPicPr>
+        <p:blipFill>
+          <a:blip r:embed="rId3">
+            <a:extLst>
+              <a:ext uri="{28A0092B-C50C-407E-A947-70E740481C1C}">
+                <a14:useLocalDpi xmlns:a14="http://schemas.microsoft.com/office/drawing/2010/main" val="0"/>
+              </a:ext>
+            </a:extLst>
+          </a:blip>
+          <a:srcRect/>
+          <a:stretch/>
+        </p:blipFill>
+        <p:spPr>
+          <a:xfrm>
+            <a:off x="1728281" y="0"/>
+            <a:ext cx="8735436" cy="6858000"/>
+          </a:xfrm>
+          <a:prstGeom prst="rect">
+            <a:avLst/>
+          </a:prstGeom>
+        </p:spPr>
+      </p:pic>
+    </p:spTree>
+    <p:extLst>
+      <p:ext uri="{BB962C8B-B14F-4D97-AF65-F5344CB8AC3E}">
+        <p14:creationId xmlns:p14="http://schemas.microsoft.com/office/powerpoint/2010/main" val="1039536684"/>
+      </p:ext>
+    </p:extLst>
+  </p:cSld>
+  <p:clrMapOvr>
+    <a:masterClrMapping/>
+  </p:clrMapOvr>
+</p:sld>
+</file>
+
+<file path=ppt/slides/slide17.xml><?xml version="1.0" encoding="utf-8"?>
+<p:sld xmlns:a="http://schemas.openxmlformats.org/drawingml/2006/main" xmlns:r="http://schemas.openxmlformats.org/officeDocument/2006/relationships" xmlns:p="http://schemas.openxmlformats.org/presentationml/2006/main">
+  <p:cSld>
+    <p:spTree>
+      <p:nvGrpSpPr>
+        <p:cNvPr id="1" name="">
+          <a:extLst>
+            <a:ext uri="{FF2B5EF4-FFF2-40B4-BE49-F238E27FC236}">
+              <a16:creationId xmlns:a16="http://schemas.microsoft.com/office/drawing/2014/main" id="{5C2D99B4-E290-B99F-7DEF-A9F68E27BF42}"/>
+            </a:ext>
+          </a:extLst>
+        </p:cNvPr>
+        <p:cNvGrpSpPr/>
+        <p:nvPr/>
+      </p:nvGrpSpPr>
+      <p:grpSpPr>
+        <a:xfrm>
+          <a:off x="0" y="0"/>
+          <a:ext cx="0" cy="0"/>
+          <a:chOff x="0" y="0"/>
+          <a:chExt cx="0" cy="0"/>
+        </a:xfrm>
+      </p:grpSpPr>
+      <p:pic>
+        <p:nvPicPr>
+          <p:cNvPr id="4" name="Picture 3">
+            <a:extLst>
+              <a:ext uri="{FF2B5EF4-FFF2-40B4-BE49-F238E27FC236}">
+                <a16:creationId xmlns:a16="http://schemas.microsoft.com/office/drawing/2014/main" id="{FE927228-C2E0-BB40-68C4-AC383230EA46}"/>
+              </a:ext>
+            </a:extLst>
+          </p:cNvPr>
+          <p:cNvPicPr>
+            <a:picLocks noChangeAspect="1"/>
+          </p:cNvPicPr>
+          <p:nvPr/>
+        </p:nvPicPr>
+        <p:blipFill>
+          <a:blip r:embed="rId3">
+            <a:extLst>
+              <a:ext uri="{28A0092B-C50C-407E-A947-70E740481C1C}">
+                <a14:useLocalDpi xmlns:a14="http://schemas.microsoft.com/office/drawing/2010/main" val="0"/>
+              </a:ext>
+            </a:extLst>
+          </a:blip>
+          <a:srcRect/>
+          <a:stretch/>
+        </p:blipFill>
+        <p:spPr>
+          <a:xfrm>
+            <a:off x="1523999" y="568569"/>
+            <a:ext cx="9144000" cy="5720861"/>
+          </a:xfrm>
+          <a:prstGeom prst="rect">
+            <a:avLst/>
+          </a:prstGeom>
+        </p:spPr>
+      </p:pic>
+    </p:spTree>
+    <p:extLst>
+      <p:ext uri="{BB962C8B-B14F-4D97-AF65-F5344CB8AC3E}">
+        <p14:creationId xmlns:p14="http://schemas.microsoft.com/office/powerpoint/2010/main" val="1694222324"/>
+      </p:ext>
+    </p:extLst>
+  </p:cSld>
+  <p:clrMapOvr>
+    <a:masterClrMapping/>
+  </p:clrMapOvr>
+</p:sld>
+</file>
+
+<file path=ppt/slides/slide18.xml><?xml version="1.0" encoding="utf-8"?>
+<p:sld xmlns:a="http://schemas.openxmlformats.org/drawingml/2006/main" xmlns:r="http://schemas.openxmlformats.org/officeDocument/2006/relationships" xmlns:p="http://schemas.openxmlformats.org/presentationml/2006/main">
+  <p:cSld>
+    <p:spTree>
+      <p:nvGrpSpPr>
+        <p:cNvPr id="1" name="">
+          <a:extLst>
+            <a:ext uri="{FF2B5EF4-FFF2-40B4-BE49-F238E27FC236}">
+              <a16:creationId xmlns:a16="http://schemas.microsoft.com/office/drawing/2014/main" id="{6E4B488A-E4B3-D9F8-B5D0-E1A0D53FE681}"/>
+            </a:ext>
+          </a:extLst>
+        </p:cNvPr>
+        <p:cNvGrpSpPr/>
+        <p:nvPr/>
+      </p:nvGrpSpPr>
+      <p:grpSpPr>
+        <a:xfrm>
+          <a:off x="0" y="0"/>
+          <a:ext cx="0" cy="0"/>
+          <a:chOff x="0" y="0"/>
+          <a:chExt cx="0" cy="0"/>
+        </a:xfrm>
+      </p:grpSpPr>
+      <p:pic>
+        <p:nvPicPr>
+          <p:cNvPr id="4" name="Picture 3">
+            <a:extLst>
+              <a:ext uri="{FF2B5EF4-FFF2-40B4-BE49-F238E27FC236}">
+                <a16:creationId xmlns:a16="http://schemas.microsoft.com/office/drawing/2014/main" id="{D4D9C1EC-D986-725B-CABD-7FDA71303980}"/>
+              </a:ext>
+            </a:extLst>
+          </p:cNvPr>
+          <p:cNvPicPr>
+            <a:picLocks noChangeAspect="1"/>
+          </p:cNvPicPr>
+          <p:nvPr/>
+        </p:nvPicPr>
+        <p:blipFill>
+          <a:blip r:embed="rId3">
+            <a:extLst>
+              <a:ext uri="{28A0092B-C50C-407E-A947-70E740481C1C}">
+                <a14:useLocalDpi xmlns:a14="http://schemas.microsoft.com/office/drawing/2010/main" val="0"/>
+              </a:ext>
+            </a:extLst>
+          </a:blip>
+          <a:srcRect/>
+          <a:stretch/>
+        </p:blipFill>
+        <p:spPr>
+          <a:xfrm>
+            <a:off x="2658194" y="568569"/>
+            <a:ext cx="6875610" cy="5720861"/>
+          </a:xfrm>
+          <a:prstGeom prst="rect">
+            <a:avLst/>
+          </a:prstGeom>
+        </p:spPr>
+      </p:pic>
+    </p:spTree>
+    <p:extLst>
+      <p:ext uri="{BB962C8B-B14F-4D97-AF65-F5344CB8AC3E}">
+        <p14:creationId xmlns:p14="http://schemas.microsoft.com/office/powerpoint/2010/main" val="2794177758"/>
+      </p:ext>
+    </p:extLst>
+  </p:cSld>
+  <p:clrMapOvr>
+    <a:masterClrMapping/>
+  </p:clrMapOvr>
+</p:sld>
+</file>
+
+<file path=ppt/slides/slide19.xml><?xml version="1.0" encoding="utf-8"?>
 <p:sld xmlns:a="http://schemas.openxmlformats.org/drawingml/2006/main" xmlns:r="http://schemas.openxmlformats.org/officeDocument/2006/relationships" xmlns:p="http://schemas.openxmlformats.org/presentationml/2006/main">
   <p:cSld>
     <p:spTree>
@@ -4932,10 +5996,10 @@
       </p:grpSpPr>
       <p:pic>
         <p:nvPicPr>
-          <p:cNvPr id="3" name="Picture 2">
+          <p:cNvPr id="5" name="Picture 4" descr="A graph of dots on a white background&#10;&#10;AI-generated content may be incorrect.">
             <a:extLst>
               <a:ext uri="{FF2B5EF4-FFF2-40B4-BE49-F238E27FC236}">
-                <a16:creationId xmlns:a16="http://schemas.microsoft.com/office/drawing/2014/main" id="{4307E5B0-F541-2765-85F9-4A357A552E63}"/>
+                <a16:creationId xmlns:a16="http://schemas.microsoft.com/office/drawing/2014/main" id="{F235E67E-9176-19BB-CD3B-D76A9FFFA95A}"/>
               </a:ext>
             </a:extLst>
           </p:cNvPr>
@@ -4945,45 +6009,21 @@
           <p:nvPr/>
         </p:nvPicPr>
         <p:blipFill>
-          <a:blip r:embed="rId2"/>
+          <a:blip r:embed="rId2">
+            <a:extLst>
+              <a:ext uri="{28A0092B-C50C-407E-A947-70E740481C1C}">
+                <a14:useLocalDpi xmlns:a14="http://schemas.microsoft.com/office/drawing/2010/main" val="0"/>
+              </a:ext>
+            </a:extLst>
+          </a:blip>
           <a:stretch>
             <a:fillRect/>
           </a:stretch>
         </p:blipFill>
         <p:spPr>
           <a:xfrm>
-            <a:off x="1172750" y="0"/>
-            <a:ext cx="9846499" cy="6858000"/>
-          </a:xfrm>
-          <a:prstGeom prst="rect">
-            <a:avLst/>
-          </a:prstGeom>
-        </p:spPr>
-      </p:pic>
-      <p:pic>
-        <p:nvPicPr>
-          <p:cNvPr id="4" name="Picture 3">
-            <a:extLst>
-              <a:ext uri="{FF2B5EF4-FFF2-40B4-BE49-F238E27FC236}">
-                <a16:creationId xmlns:a16="http://schemas.microsoft.com/office/drawing/2014/main" id="{16D79EC0-FA77-2185-C410-CC11A8F11837}"/>
-              </a:ext>
-            </a:extLst>
-          </p:cNvPr>
-          <p:cNvPicPr>
-            <a:picLocks noChangeAspect="1"/>
-          </p:cNvPicPr>
-          <p:nvPr/>
-        </p:nvPicPr>
-        <p:blipFill>
-          <a:blip r:embed="rId3"/>
-          <a:stretch>
-            <a:fillRect/>
-          </a:stretch>
-        </p:blipFill>
-        <p:spPr>
-          <a:xfrm>
-            <a:off x="1172750" y="0"/>
-            <a:ext cx="9846499" cy="6858000"/>
+            <a:off x="2285468" y="571101"/>
+            <a:ext cx="7621064" cy="5715798"/>
           </a:xfrm>
           <a:prstGeom prst="rect">
             <a:avLst/>
@@ -4993,7 +6033,7 @@
     </p:spTree>
     <p:extLst>
       <p:ext uri="{BB962C8B-B14F-4D97-AF65-F5344CB8AC3E}">
-        <p14:creationId xmlns:p14="http://schemas.microsoft.com/office/powerpoint/2010/main" val="60594171"/>
+        <p14:creationId xmlns:p14="http://schemas.microsoft.com/office/powerpoint/2010/main" val="1869332139"/>
       </p:ext>
     </p:extLst>
   </p:cSld>
@@ -5003,12 +6043,18 @@
 </p:sld>
 </file>
 
-<file path=ppt/slides/slide5.xml><?xml version="1.0" encoding="utf-8"?>
+<file path=ppt/slides/slide2.xml><?xml version="1.0" encoding="utf-8"?>
 <p:sld xmlns:a="http://schemas.openxmlformats.org/drawingml/2006/main" xmlns:r="http://schemas.openxmlformats.org/officeDocument/2006/relationships" xmlns:p="http://schemas.openxmlformats.org/presentationml/2006/main">
   <p:cSld>
     <p:spTree>
       <p:nvGrpSpPr>
-        <p:cNvPr id="1" name=""/>
+        <p:cNvPr id="1" name="">
+          <a:extLst>
+            <a:ext uri="{FF2B5EF4-FFF2-40B4-BE49-F238E27FC236}">
+              <a16:creationId xmlns:a16="http://schemas.microsoft.com/office/drawing/2014/main" id="{194BBA81-2A3A-2889-0FEC-CA82813261A4}"/>
+            </a:ext>
+          </a:extLst>
+        </p:cNvPr>
         <p:cNvGrpSpPr/>
         <p:nvPr/>
       </p:nvGrpSpPr>
@@ -5020,70 +6066,63 @@
           <a:chExt cx="0" cy="0"/>
         </a:xfrm>
       </p:grpSpPr>
-      <p:pic>
-        <p:nvPicPr>
-          <p:cNvPr id="9" name="Picture 8">
+      <p:sp>
+        <p:nvSpPr>
+          <p:cNvPr id="2" name="Title 1">
             <a:extLst>
               <a:ext uri="{FF2B5EF4-FFF2-40B4-BE49-F238E27FC236}">
-                <a16:creationId xmlns:a16="http://schemas.microsoft.com/office/drawing/2014/main" id="{871B2520-040D-23B4-9A16-E36E2FCA22F1}"/>
+                <a16:creationId xmlns:a16="http://schemas.microsoft.com/office/drawing/2014/main" id="{05FB8148-A64E-EE10-127B-26C0A279610B}"/>
               </a:ext>
             </a:extLst>
           </p:cNvPr>
-          <p:cNvPicPr>
-            <a:picLocks noChangeAspect="1"/>
-          </p:cNvPicPr>
-          <p:nvPr/>
-        </p:nvPicPr>
-        <p:blipFill>
-          <a:blip r:embed="rId2"/>
-          <a:stretch>
-            <a:fillRect/>
-          </a:stretch>
-        </p:blipFill>
-        <p:spPr>
-          <a:xfrm>
-            <a:off x="1172750" y="0"/>
-            <a:ext cx="9846499" cy="6858000"/>
-          </a:xfrm>
-          <a:prstGeom prst="rect">
-            <a:avLst/>
-          </a:prstGeom>
-        </p:spPr>
-      </p:pic>
-      <p:pic>
-        <p:nvPicPr>
-          <p:cNvPr id="3" name="Picture 2">
+          <p:cNvSpPr>
+            <a:spLocks noGrp="1"/>
+          </p:cNvSpPr>
+          <p:nvPr>
+            <p:ph type="title"/>
+          </p:nvPr>
+        </p:nvSpPr>
+        <p:spPr/>
+        <p:txBody>
+          <a:bodyPr/>
+          <a:lstStyle/>
+          <a:p>
+            <a:r>
+              <a:rPr lang="en-US" dirty="0"/>
+              <a:t>Survey Structure</a:t>
+            </a:r>
+          </a:p>
+        </p:txBody>
+      </p:sp>
+      <p:sp>
+        <p:nvSpPr>
+          <p:cNvPr id="3" name="Text Placeholder 2">
             <a:extLst>
               <a:ext uri="{FF2B5EF4-FFF2-40B4-BE49-F238E27FC236}">
-                <a16:creationId xmlns:a16="http://schemas.microsoft.com/office/drawing/2014/main" id="{452BEA85-2BF4-7CAD-6F71-2407F823AC52}"/>
+                <a16:creationId xmlns:a16="http://schemas.microsoft.com/office/drawing/2014/main" id="{D6603A3E-E126-8538-3EB4-C0A78620089F}"/>
               </a:ext>
             </a:extLst>
           </p:cNvPr>
-          <p:cNvPicPr>
-            <a:picLocks noChangeAspect="1"/>
-          </p:cNvPicPr>
-          <p:nvPr/>
-        </p:nvPicPr>
-        <p:blipFill>
-          <a:blip r:embed="rId3"/>
-          <a:stretch>
-            <a:fillRect/>
-          </a:stretch>
-        </p:blipFill>
-        <p:spPr>
-          <a:xfrm>
-            <a:off x="1172750" y="0"/>
-            <a:ext cx="9846499" cy="6858000"/>
-          </a:xfrm>
-          <a:prstGeom prst="rect">
-            <a:avLst/>
-          </a:prstGeom>
-        </p:spPr>
-      </p:pic>
+          <p:cNvSpPr>
+            <a:spLocks noGrp="1"/>
+          </p:cNvSpPr>
+          <p:nvPr>
+            <p:ph type="body" idx="1"/>
+          </p:nvPr>
+        </p:nvSpPr>
+        <p:spPr/>
+        <p:txBody>
+          <a:bodyPr/>
+          <a:lstStyle/>
+          <a:p>
+            <a:endParaRPr lang="en-US" dirty="0"/>
+          </a:p>
+        </p:txBody>
+      </p:sp>
     </p:spTree>
     <p:extLst>
       <p:ext uri="{BB962C8B-B14F-4D97-AF65-F5344CB8AC3E}">
-        <p14:creationId xmlns:p14="http://schemas.microsoft.com/office/powerpoint/2010/main" val="2165406834"/>
+        <p14:creationId xmlns:p14="http://schemas.microsoft.com/office/powerpoint/2010/main" val="2208573382"/>
       </p:ext>
     </p:extLst>
   </p:cSld>
@@ -5093,97 +6132,7 @@
 </p:sld>
 </file>
 
-<file path=ppt/slides/slide6.xml><?xml version="1.0" encoding="utf-8"?>
-<p:sld xmlns:a="http://schemas.openxmlformats.org/drawingml/2006/main" xmlns:r="http://schemas.openxmlformats.org/officeDocument/2006/relationships" xmlns:p="http://schemas.openxmlformats.org/presentationml/2006/main">
-  <p:cSld>
-    <p:spTree>
-      <p:nvGrpSpPr>
-        <p:cNvPr id="1" name=""/>
-        <p:cNvGrpSpPr/>
-        <p:nvPr/>
-      </p:nvGrpSpPr>
-      <p:grpSpPr>
-        <a:xfrm>
-          <a:off x="0" y="0"/>
-          <a:ext cx="0" cy="0"/>
-          <a:chOff x="0" y="0"/>
-          <a:chExt cx="0" cy="0"/>
-        </a:xfrm>
-      </p:grpSpPr>
-      <p:pic>
-        <p:nvPicPr>
-          <p:cNvPr id="7" name="Picture 6">
-            <a:extLst>
-              <a:ext uri="{FF2B5EF4-FFF2-40B4-BE49-F238E27FC236}">
-                <a16:creationId xmlns:a16="http://schemas.microsoft.com/office/drawing/2014/main" id="{D25A9EB0-11C2-CB6B-A1AD-507C5E4004BD}"/>
-              </a:ext>
-            </a:extLst>
-          </p:cNvPr>
-          <p:cNvPicPr>
-            <a:picLocks noChangeAspect="1"/>
-          </p:cNvPicPr>
-          <p:nvPr/>
-        </p:nvPicPr>
-        <p:blipFill>
-          <a:blip r:embed="rId2"/>
-          <a:stretch>
-            <a:fillRect/>
-          </a:stretch>
-        </p:blipFill>
-        <p:spPr>
-          <a:xfrm>
-            <a:off x="1172750" y="0"/>
-            <a:ext cx="9846499" cy="6858000"/>
-          </a:xfrm>
-          <a:prstGeom prst="rect">
-            <a:avLst/>
-          </a:prstGeom>
-        </p:spPr>
-      </p:pic>
-      <p:pic>
-        <p:nvPicPr>
-          <p:cNvPr id="3" name="Picture 2">
-            <a:extLst>
-              <a:ext uri="{FF2B5EF4-FFF2-40B4-BE49-F238E27FC236}">
-                <a16:creationId xmlns:a16="http://schemas.microsoft.com/office/drawing/2014/main" id="{E9F9D3DC-CAC3-62E8-478F-3806FBD185CF}"/>
-              </a:ext>
-            </a:extLst>
-          </p:cNvPr>
-          <p:cNvPicPr>
-            <a:picLocks noChangeAspect="1"/>
-          </p:cNvPicPr>
-          <p:nvPr/>
-        </p:nvPicPr>
-        <p:blipFill>
-          <a:blip r:embed="rId3"/>
-          <a:stretch>
-            <a:fillRect/>
-          </a:stretch>
-        </p:blipFill>
-        <p:spPr>
-          <a:xfrm>
-            <a:off x="1172750" y="0"/>
-            <a:ext cx="9846499" cy="6858000"/>
-          </a:xfrm>
-          <a:prstGeom prst="rect">
-            <a:avLst/>
-          </a:prstGeom>
-        </p:spPr>
-      </p:pic>
-    </p:spTree>
-    <p:extLst>
-      <p:ext uri="{BB962C8B-B14F-4D97-AF65-F5344CB8AC3E}">
-        <p14:creationId xmlns:p14="http://schemas.microsoft.com/office/powerpoint/2010/main" val="4084454768"/>
-      </p:ext>
-    </p:extLst>
-  </p:cSld>
-  <p:clrMapOvr>
-    <a:masterClrMapping/>
-  </p:clrMapOvr>
-</p:sld>
-</file>
-
-<file path=ppt/slides/slide7.xml><?xml version="1.0" encoding="utf-8"?>
+<file path=ppt/slides/slide20.xml><?xml version="1.0" encoding="utf-8"?>
 <p:sld xmlns:a="http://schemas.openxmlformats.org/drawingml/2006/main" xmlns:r="http://schemas.openxmlformats.org/officeDocument/2006/relationships" xmlns:p="http://schemas.openxmlformats.org/presentationml/2006/main">
   <p:cSld>
     <p:spTree>
@@ -5229,7 +6178,7 @@
           <a:p>
             <a:r>
               <a:rPr lang="en-US" dirty="0"/>
-              <a:t>Support for Capital Punishment</a:t>
+              <a:t>Capital Punishment</a:t>
             </a:r>
           </a:p>
         </p:txBody>
@@ -5255,7 +6204,17 @@
           <a:bodyPr/>
           <a:lstStyle/>
           <a:p>
-            <a:endParaRPr lang="en-US"/>
+            <a:r>
+              <a:rPr lang="en-US" b="0" i="0" dirty="0">
+                <a:solidFill>
+                  <a:srgbClr val="32363A"/>
+                </a:solidFill>
+                <a:effectLst/>
+                <a:latin typeface="72"/>
+              </a:rPr>
+              <a:t>"Capital Punishment (The Death Penalty) is necessary in America"</a:t>
+            </a:r>
+            <a:endParaRPr lang="en-US" dirty="0"/>
           </a:p>
         </p:txBody>
       </p:sp>
@@ -5272,7 +6231,73 @@
 </p:sld>
 </file>
 
-<file path=ppt/slides/slide8.xml><?xml version="1.0" encoding="utf-8"?>
+<file path=ppt/slides/slide21.xml><?xml version="1.0" encoding="utf-8"?>
+<p:sld xmlns:a="http://schemas.openxmlformats.org/drawingml/2006/main" xmlns:r="http://schemas.openxmlformats.org/officeDocument/2006/relationships" xmlns:p="http://schemas.openxmlformats.org/presentationml/2006/main">
+  <p:cSld>
+    <p:spTree>
+      <p:nvGrpSpPr>
+        <p:cNvPr id="1" name=""/>
+        <p:cNvGrpSpPr/>
+        <p:nvPr/>
+      </p:nvGrpSpPr>
+      <p:grpSpPr>
+        <a:xfrm>
+          <a:off x="0" y="0"/>
+          <a:ext cx="0" cy="0"/>
+          <a:chOff x="0" y="0"/>
+          <a:chExt cx="0" cy="0"/>
+        </a:xfrm>
+      </p:grpSpPr>
+      <p:pic>
+        <p:nvPicPr>
+          <p:cNvPr id="3" name="Picture 2" descr="A graph with a line of blue and green color&#10;&#10;AI-generated content may be incorrect.">
+            <a:extLst>
+              <a:ext uri="{FF2B5EF4-FFF2-40B4-BE49-F238E27FC236}">
+                <a16:creationId xmlns:a16="http://schemas.microsoft.com/office/drawing/2014/main" id="{4F1C8317-3747-0D88-C8D2-8BB9BDCD6476}"/>
+              </a:ext>
+            </a:extLst>
+          </p:cNvPr>
+          <p:cNvPicPr>
+            <a:picLocks noChangeAspect="1"/>
+          </p:cNvPicPr>
+          <p:nvPr/>
+        </p:nvPicPr>
+        <p:blipFill>
+          <a:blip r:embed="rId2">
+            <a:extLst>
+              <a:ext uri="{28A0092B-C50C-407E-A947-70E740481C1C}">
+                <a14:useLocalDpi xmlns:a14="http://schemas.microsoft.com/office/drawing/2010/main" val="0"/>
+              </a:ext>
+            </a:extLst>
+          </a:blip>
+          <a:stretch>
+            <a:fillRect/>
+          </a:stretch>
+        </p:blipFill>
+        <p:spPr>
+          <a:xfrm>
+            <a:off x="1177636" y="0"/>
+            <a:ext cx="9836727" cy="6858000"/>
+          </a:xfrm>
+          <a:prstGeom prst="rect">
+            <a:avLst/>
+          </a:prstGeom>
+        </p:spPr>
+      </p:pic>
+    </p:spTree>
+    <p:extLst>
+      <p:ext uri="{BB962C8B-B14F-4D97-AF65-F5344CB8AC3E}">
+        <p14:creationId xmlns:p14="http://schemas.microsoft.com/office/powerpoint/2010/main" val="3971652866"/>
+      </p:ext>
+    </p:extLst>
+  </p:cSld>
+  <p:clrMapOvr>
+    <a:masterClrMapping/>
+  </p:clrMapOvr>
+</p:sld>
+</file>
+
+<file path=ppt/slides/slide22.xml><?xml version="1.0" encoding="utf-8"?>
 <p:sld xmlns:a="http://schemas.openxmlformats.org/drawingml/2006/main" xmlns:r="http://schemas.openxmlformats.org/officeDocument/2006/relationships" xmlns:p="http://schemas.openxmlformats.org/presentationml/2006/main">
   <p:cSld>
     <p:spTree>
@@ -5337,7 +6362,220 @@
 </p:sld>
 </file>
 
-<file path=ppt/slides/slide9.xml><?xml version="1.0" encoding="utf-8"?>
+<file path=ppt/slides/slide23.xml><?xml version="1.0" encoding="utf-8"?>
+<p:sld xmlns:a="http://schemas.openxmlformats.org/drawingml/2006/main" xmlns:r="http://schemas.openxmlformats.org/officeDocument/2006/relationships" xmlns:p="http://schemas.openxmlformats.org/presentationml/2006/main">
+  <p:cSld>
+    <p:spTree>
+      <p:nvGrpSpPr>
+        <p:cNvPr id="1" name="">
+          <a:extLst>
+            <a:ext uri="{FF2B5EF4-FFF2-40B4-BE49-F238E27FC236}">
+              <a16:creationId xmlns:a16="http://schemas.microsoft.com/office/drawing/2014/main" id="{A32562BC-05BF-4DCE-0718-1EC7C7AF6BB2}"/>
+            </a:ext>
+          </a:extLst>
+        </p:cNvPr>
+        <p:cNvGrpSpPr/>
+        <p:nvPr/>
+      </p:nvGrpSpPr>
+      <p:grpSpPr>
+        <a:xfrm>
+          <a:off x="0" y="0"/>
+          <a:ext cx="0" cy="0"/>
+          <a:chOff x="0" y="0"/>
+          <a:chExt cx="0" cy="0"/>
+        </a:xfrm>
+      </p:grpSpPr>
+      <p:pic>
+        <p:nvPicPr>
+          <p:cNvPr id="4" name="Picture 3">
+            <a:extLst>
+              <a:ext uri="{FF2B5EF4-FFF2-40B4-BE49-F238E27FC236}">
+                <a16:creationId xmlns:a16="http://schemas.microsoft.com/office/drawing/2014/main" id="{83BABA13-C976-BC86-BE2E-695BD7DD8D1E}"/>
+              </a:ext>
+            </a:extLst>
+          </p:cNvPr>
+          <p:cNvPicPr>
+            <a:picLocks noChangeAspect="1"/>
+          </p:cNvPicPr>
+          <p:nvPr/>
+        </p:nvPicPr>
+        <p:blipFill>
+          <a:blip r:embed="rId3">
+            <a:extLst>
+              <a:ext uri="{28A0092B-C50C-407E-A947-70E740481C1C}">
+                <a14:useLocalDpi xmlns:a14="http://schemas.microsoft.com/office/drawing/2010/main" val="0"/>
+              </a:ext>
+            </a:extLst>
+          </a:blip>
+          <a:srcRect/>
+          <a:stretch/>
+        </p:blipFill>
+        <p:spPr>
+          <a:xfrm>
+            <a:off x="1639316" y="0"/>
+            <a:ext cx="8913365" cy="6858000"/>
+          </a:xfrm>
+          <a:prstGeom prst="rect">
+            <a:avLst/>
+          </a:prstGeom>
+        </p:spPr>
+      </p:pic>
+    </p:spTree>
+    <p:extLst>
+      <p:ext uri="{BB962C8B-B14F-4D97-AF65-F5344CB8AC3E}">
+        <p14:creationId xmlns:p14="http://schemas.microsoft.com/office/powerpoint/2010/main" val="123318256"/>
+      </p:ext>
+    </p:extLst>
+  </p:cSld>
+  <p:clrMapOvr>
+    <a:masterClrMapping/>
+  </p:clrMapOvr>
+</p:sld>
+</file>
+
+<file path=ppt/slides/slide24.xml><?xml version="1.0" encoding="utf-8"?>
+<p:sld xmlns:a="http://schemas.openxmlformats.org/drawingml/2006/main" xmlns:r="http://schemas.openxmlformats.org/officeDocument/2006/relationships" xmlns:p="http://schemas.openxmlformats.org/presentationml/2006/main">
+  <p:cSld>
+    <p:spTree>
+      <p:nvGrpSpPr>
+        <p:cNvPr id="1" name="">
+          <a:extLst>
+            <a:ext uri="{FF2B5EF4-FFF2-40B4-BE49-F238E27FC236}">
+              <a16:creationId xmlns:a16="http://schemas.microsoft.com/office/drawing/2014/main" id="{D6A05DCE-B78E-4C06-4414-D498BDAFAF06}"/>
+            </a:ext>
+          </a:extLst>
+        </p:cNvPr>
+        <p:cNvGrpSpPr/>
+        <p:nvPr/>
+      </p:nvGrpSpPr>
+      <p:grpSpPr>
+        <a:xfrm>
+          <a:off x="0" y="0"/>
+          <a:ext cx="0" cy="0"/>
+          <a:chOff x="0" y="0"/>
+          <a:chExt cx="0" cy="0"/>
+        </a:xfrm>
+      </p:grpSpPr>
+      <p:pic>
+        <p:nvPicPr>
+          <p:cNvPr id="4" name="Picture 3">
+            <a:extLst>
+              <a:ext uri="{FF2B5EF4-FFF2-40B4-BE49-F238E27FC236}">
+                <a16:creationId xmlns:a16="http://schemas.microsoft.com/office/drawing/2014/main" id="{73964561-E443-F5F0-8D54-483FED0E6CFD}"/>
+              </a:ext>
+            </a:extLst>
+          </p:cNvPr>
+          <p:cNvPicPr>
+            <a:picLocks noChangeAspect="1"/>
+          </p:cNvPicPr>
+          <p:nvPr/>
+        </p:nvPicPr>
+        <p:blipFill>
+          <a:blip r:embed="rId3">
+            <a:extLst>
+              <a:ext uri="{28A0092B-C50C-407E-A947-70E740481C1C}">
+                <a14:useLocalDpi xmlns:a14="http://schemas.microsoft.com/office/drawing/2010/main" val="0"/>
+              </a:ext>
+            </a:extLst>
+          </a:blip>
+          <a:srcRect/>
+          <a:stretch/>
+        </p:blipFill>
+        <p:spPr>
+          <a:xfrm>
+            <a:off x="1523999" y="568569"/>
+            <a:ext cx="9144000" cy="5720861"/>
+          </a:xfrm>
+          <a:prstGeom prst="rect">
+            <a:avLst/>
+          </a:prstGeom>
+        </p:spPr>
+      </p:pic>
+    </p:spTree>
+    <p:extLst>
+      <p:ext uri="{BB962C8B-B14F-4D97-AF65-F5344CB8AC3E}">
+        <p14:creationId xmlns:p14="http://schemas.microsoft.com/office/powerpoint/2010/main" val="3833886476"/>
+      </p:ext>
+    </p:extLst>
+  </p:cSld>
+  <p:clrMapOvr>
+    <a:masterClrMapping/>
+  </p:clrMapOvr>
+</p:sld>
+</file>
+
+<file path=ppt/slides/slide25.xml><?xml version="1.0" encoding="utf-8"?>
+<p:sld xmlns:a="http://schemas.openxmlformats.org/drawingml/2006/main" xmlns:r="http://schemas.openxmlformats.org/officeDocument/2006/relationships" xmlns:p="http://schemas.openxmlformats.org/presentationml/2006/main">
+  <p:cSld>
+    <p:spTree>
+      <p:nvGrpSpPr>
+        <p:cNvPr id="1" name="">
+          <a:extLst>
+            <a:ext uri="{FF2B5EF4-FFF2-40B4-BE49-F238E27FC236}">
+              <a16:creationId xmlns:a16="http://schemas.microsoft.com/office/drawing/2014/main" id="{F7161F48-F73F-B766-28F1-94DF98E61B6F}"/>
+            </a:ext>
+          </a:extLst>
+        </p:cNvPr>
+        <p:cNvGrpSpPr/>
+        <p:nvPr/>
+      </p:nvGrpSpPr>
+      <p:grpSpPr>
+        <a:xfrm>
+          <a:off x="0" y="0"/>
+          <a:ext cx="0" cy="0"/>
+          <a:chOff x="0" y="0"/>
+          <a:chExt cx="0" cy="0"/>
+        </a:xfrm>
+      </p:grpSpPr>
+      <p:pic>
+        <p:nvPicPr>
+          <p:cNvPr id="4" name="Picture 3">
+            <a:extLst>
+              <a:ext uri="{FF2B5EF4-FFF2-40B4-BE49-F238E27FC236}">
+                <a16:creationId xmlns:a16="http://schemas.microsoft.com/office/drawing/2014/main" id="{F3EFE60E-E46A-3C41-0C61-8A8122411DB2}"/>
+              </a:ext>
+            </a:extLst>
+          </p:cNvPr>
+          <p:cNvPicPr>
+            <a:picLocks noChangeAspect="1"/>
+          </p:cNvPicPr>
+          <p:nvPr/>
+        </p:nvPicPr>
+        <p:blipFill>
+          <a:blip r:embed="rId3">
+            <a:extLst>
+              <a:ext uri="{28A0092B-C50C-407E-A947-70E740481C1C}">
+                <a14:useLocalDpi xmlns:a14="http://schemas.microsoft.com/office/drawing/2010/main" val="0"/>
+              </a:ext>
+            </a:extLst>
+          </a:blip>
+          <a:srcRect/>
+          <a:stretch/>
+        </p:blipFill>
+        <p:spPr>
+          <a:xfrm>
+            <a:off x="2659967" y="568569"/>
+            <a:ext cx="6872063" cy="5720861"/>
+          </a:xfrm>
+          <a:prstGeom prst="rect">
+            <a:avLst/>
+          </a:prstGeom>
+        </p:spPr>
+      </p:pic>
+    </p:spTree>
+    <p:extLst>
+      <p:ext uri="{BB962C8B-B14F-4D97-AF65-F5344CB8AC3E}">
+        <p14:creationId xmlns:p14="http://schemas.microsoft.com/office/powerpoint/2010/main" val="2971793642"/>
+      </p:ext>
+    </p:extLst>
+  </p:cSld>
+  <p:clrMapOvr>
+    <a:masterClrMapping/>
+  </p:clrMapOvr>
+</p:sld>
+</file>
+
+<file path=ppt/slides/slide26.xml><?xml version="1.0" encoding="utf-8"?>
 <p:sld xmlns:a="http://schemas.openxmlformats.org/drawingml/2006/main" xmlns:r="http://schemas.openxmlformats.org/officeDocument/2006/relationships" xmlns:p="http://schemas.openxmlformats.org/presentationml/2006/main">
   <p:cSld>
     <p:spTree>
@@ -5356,10 +6594,10 @@
       </p:grpSpPr>
       <p:pic>
         <p:nvPicPr>
-          <p:cNvPr id="3" name="Picture 2">
+          <p:cNvPr id="3" name="Picture 2" descr="A graph of a graph showing a number of dots&#10;&#10;AI-generated content may be incorrect.">
             <a:extLst>
               <a:ext uri="{FF2B5EF4-FFF2-40B4-BE49-F238E27FC236}">
-                <a16:creationId xmlns:a16="http://schemas.microsoft.com/office/drawing/2014/main" id="{9398BB28-D9CD-3F09-B1D0-3138CD6EFC43}"/>
+                <a16:creationId xmlns:a16="http://schemas.microsoft.com/office/drawing/2014/main" id="{ED5DEF5F-745D-8B14-0B73-D19481E17908}"/>
               </a:ext>
             </a:extLst>
           </p:cNvPr>
@@ -5367,6 +6605,423 @@
             <a:picLocks noChangeAspect="1"/>
           </p:cNvPicPr>
           <p:nvPr/>
+        </p:nvPicPr>
+        <p:blipFill>
+          <a:blip r:embed="rId2">
+            <a:extLst>
+              <a:ext uri="{28A0092B-C50C-407E-A947-70E740481C1C}">
+                <a14:useLocalDpi xmlns:a14="http://schemas.microsoft.com/office/drawing/2010/main" val="0"/>
+              </a:ext>
+            </a:extLst>
+          </a:blip>
+          <a:stretch>
+            <a:fillRect/>
+          </a:stretch>
+        </p:blipFill>
+        <p:spPr>
+          <a:xfrm>
+            <a:off x="2285468" y="571101"/>
+            <a:ext cx="7621064" cy="5715798"/>
+          </a:xfrm>
+          <a:prstGeom prst="rect">
+            <a:avLst/>
+          </a:prstGeom>
+        </p:spPr>
+      </p:pic>
+    </p:spTree>
+    <p:extLst>
+      <p:ext uri="{BB962C8B-B14F-4D97-AF65-F5344CB8AC3E}">
+        <p14:creationId xmlns:p14="http://schemas.microsoft.com/office/powerpoint/2010/main" val="3042632924"/>
+      </p:ext>
+    </p:extLst>
+  </p:cSld>
+  <p:clrMapOvr>
+    <a:masterClrMapping/>
+  </p:clrMapOvr>
+</p:sld>
+</file>
+
+<file path=ppt/slides/slide27.xml><?xml version="1.0" encoding="utf-8"?>
+<p:sld xmlns:a="http://schemas.openxmlformats.org/drawingml/2006/main" xmlns:r="http://schemas.openxmlformats.org/officeDocument/2006/relationships" xmlns:p="http://schemas.openxmlformats.org/presentationml/2006/main">
+  <p:cSld>
+    <p:spTree>
+      <p:nvGrpSpPr>
+        <p:cNvPr id="1" name="">
+          <a:extLst>
+            <a:ext uri="{FF2B5EF4-FFF2-40B4-BE49-F238E27FC236}">
+              <a16:creationId xmlns:a16="http://schemas.microsoft.com/office/drawing/2014/main" id="{D3C9A42D-D98E-C85D-557E-2BCE10B5CE90}"/>
+            </a:ext>
+          </a:extLst>
+        </p:cNvPr>
+        <p:cNvGrpSpPr/>
+        <p:nvPr/>
+      </p:nvGrpSpPr>
+      <p:grpSpPr>
+        <a:xfrm>
+          <a:off x="0" y="0"/>
+          <a:ext cx="0" cy="0"/>
+          <a:chOff x="0" y="0"/>
+          <a:chExt cx="0" cy="0"/>
+        </a:xfrm>
+      </p:grpSpPr>
+      <p:sp>
+        <p:nvSpPr>
+          <p:cNvPr id="2" name="Title 1">
+            <a:extLst>
+              <a:ext uri="{FF2B5EF4-FFF2-40B4-BE49-F238E27FC236}">
+                <a16:creationId xmlns:a16="http://schemas.microsoft.com/office/drawing/2014/main" id="{6893F0A8-2333-7336-A0FE-37D3E342422E}"/>
+              </a:ext>
+            </a:extLst>
+          </p:cNvPr>
+          <p:cNvSpPr>
+            <a:spLocks noGrp="1"/>
+          </p:cNvSpPr>
+          <p:nvPr>
+            <p:ph type="title"/>
+          </p:nvPr>
+        </p:nvSpPr>
+        <p:spPr/>
+        <p:txBody>
+          <a:bodyPr/>
+          <a:lstStyle/>
+          <a:p>
+            <a:r>
+              <a:rPr lang="en-US" dirty="0"/>
+              <a:t>Usage of AI in the Workplace</a:t>
+            </a:r>
+          </a:p>
+        </p:txBody>
+      </p:sp>
+      <p:sp>
+        <p:nvSpPr>
+          <p:cNvPr id="3" name="Text Placeholder 2">
+            <a:extLst>
+              <a:ext uri="{FF2B5EF4-FFF2-40B4-BE49-F238E27FC236}">
+                <a16:creationId xmlns:a16="http://schemas.microsoft.com/office/drawing/2014/main" id="{94425E17-CF21-6BE9-68D6-8843F87968E5}"/>
+              </a:ext>
+            </a:extLst>
+          </p:cNvPr>
+          <p:cNvSpPr>
+            <a:spLocks noGrp="1"/>
+          </p:cNvSpPr>
+          <p:nvPr>
+            <p:ph type="body" idx="1"/>
+          </p:nvPr>
+        </p:nvSpPr>
+        <p:spPr/>
+        <p:txBody>
+          <a:bodyPr/>
+          <a:lstStyle/>
+          <a:p>
+            <a:r>
+              <a:rPr lang="en-US" b="0" i="0" dirty="0">
+                <a:solidFill>
+                  <a:srgbClr val="32363A"/>
+                </a:solidFill>
+                <a:effectLst/>
+                <a:latin typeface="72"/>
+              </a:rPr>
+              <a:t>"Americans should be able to use Artificial Intelligence (AI) for job applications"</a:t>
+            </a:r>
+            <a:endParaRPr lang="en-US" dirty="0"/>
+          </a:p>
+        </p:txBody>
+      </p:sp>
+    </p:spTree>
+    <p:extLst>
+      <p:ext uri="{BB962C8B-B14F-4D97-AF65-F5344CB8AC3E}">
+        <p14:creationId xmlns:p14="http://schemas.microsoft.com/office/powerpoint/2010/main" val="1842140826"/>
+      </p:ext>
+    </p:extLst>
+  </p:cSld>
+  <p:clrMapOvr>
+    <a:masterClrMapping/>
+  </p:clrMapOvr>
+</p:sld>
+</file>
+
+<file path=ppt/slides/slide28.xml><?xml version="1.0" encoding="utf-8"?>
+<p:sld xmlns:a="http://schemas.openxmlformats.org/drawingml/2006/main" xmlns:r="http://schemas.openxmlformats.org/officeDocument/2006/relationships" xmlns:p="http://schemas.openxmlformats.org/presentationml/2006/main">
+  <p:cSld>
+    <p:spTree>
+      <p:nvGrpSpPr>
+        <p:cNvPr id="1" name="">
+          <a:extLst>
+            <a:ext uri="{FF2B5EF4-FFF2-40B4-BE49-F238E27FC236}">
+              <a16:creationId xmlns:a16="http://schemas.microsoft.com/office/drawing/2014/main" id="{61992452-ED9E-A91C-9A5A-7203DCE61D7F}"/>
+            </a:ext>
+          </a:extLst>
+        </p:cNvPr>
+        <p:cNvGrpSpPr/>
+        <p:nvPr/>
+      </p:nvGrpSpPr>
+      <p:grpSpPr>
+        <a:xfrm>
+          <a:off x="0" y="0"/>
+          <a:ext cx="0" cy="0"/>
+          <a:chOff x="0" y="0"/>
+          <a:chExt cx="0" cy="0"/>
+        </a:xfrm>
+      </p:grpSpPr>
+      <p:pic>
+        <p:nvPicPr>
+          <p:cNvPr id="6" name="Picture 5" descr="A graph with blue and purple lines&#10;&#10;AI-generated content may be incorrect.">
+            <a:extLst>
+              <a:ext uri="{FF2B5EF4-FFF2-40B4-BE49-F238E27FC236}">
+                <a16:creationId xmlns:a16="http://schemas.microsoft.com/office/drawing/2014/main" id="{1D53A882-9ECF-77CF-6971-5E208558FB3D}"/>
+              </a:ext>
+            </a:extLst>
+          </p:cNvPr>
+          <p:cNvPicPr>
+            <a:picLocks noChangeAspect="1"/>
+          </p:cNvPicPr>
+          <p:nvPr/>
+        </p:nvPicPr>
+        <p:blipFill>
+          <a:blip r:embed="rId3">
+            <a:extLst>
+              <a:ext uri="{28A0092B-C50C-407E-A947-70E740481C1C}">
+                <a14:useLocalDpi xmlns:a14="http://schemas.microsoft.com/office/drawing/2010/main" val="0"/>
+              </a:ext>
+            </a:extLst>
+          </a:blip>
+          <a:stretch>
+            <a:fillRect/>
+          </a:stretch>
+        </p:blipFill>
+        <p:spPr>
+          <a:xfrm>
+            <a:off x="1177636" y="0"/>
+            <a:ext cx="9836727" cy="6858000"/>
+          </a:xfrm>
+          <a:prstGeom prst="rect">
+            <a:avLst/>
+          </a:prstGeom>
+        </p:spPr>
+      </p:pic>
+    </p:spTree>
+    <p:extLst>
+      <p:ext uri="{BB962C8B-B14F-4D97-AF65-F5344CB8AC3E}">
+        <p14:creationId xmlns:p14="http://schemas.microsoft.com/office/powerpoint/2010/main" val="287181200"/>
+      </p:ext>
+    </p:extLst>
+  </p:cSld>
+  <p:clrMapOvr>
+    <a:masterClrMapping/>
+  </p:clrMapOvr>
+</p:sld>
+</file>
+
+<file path=ppt/slides/slide29.xml><?xml version="1.0" encoding="utf-8"?>
+<p:sld xmlns:a="http://schemas.openxmlformats.org/drawingml/2006/main" xmlns:r="http://schemas.openxmlformats.org/officeDocument/2006/relationships" xmlns:p="http://schemas.openxmlformats.org/presentationml/2006/main">
+  <p:cSld>
+    <p:spTree>
+      <p:nvGrpSpPr>
+        <p:cNvPr id="1" name=""/>
+        <p:cNvGrpSpPr/>
+        <p:nvPr/>
+      </p:nvGrpSpPr>
+      <p:grpSpPr>
+        <a:xfrm>
+          <a:off x="0" y="0"/>
+          <a:ext cx="0" cy="0"/>
+          <a:chOff x="0" y="0"/>
+          <a:chExt cx="0" cy="0"/>
+        </a:xfrm>
+      </p:grpSpPr>
+      <p:pic>
+        <p:nvPicPr>
+          <p:cNvPr id="4" name="Picture 3">
+            <a:extLst>
+              <a:ext uri="{FF2B5EF4-FFF2-40B4-BE49-F238E27FC236}">
+                <a16:creationId xmlns:a16="http://schemas.microsoft.com/office/drawing/2014/main" id="{FA224250-4E44-991B-998C-E30E59D4D447}"/>
+              </a:ext>
+            </a:extLst>
+          </p:cNvPr>
+          <p:cNvPicPr>
+            <a:picLocks noChangeAspect="1"/>
+          </p:cNvPicPr>
+          <p:nvPr/>
+        </p:nvPicPr>
+        <p:blipFill>
+          <a:blip r:embed="rId2">
+            <a:extLst>
+              <a:ext uri="{28A0092B-C50C-407E-A947-70E740481C1C}">
+                <a14:useLocalDpi xmlns:a14="http://schemas.microsoft.com/office/drawing/2010/main" val="0"/>
+              </a:ext>
+            </a:extLst>
+          </a:blip>
+          <a:srcRect/>
+          <a:stretch/>
+        </p:blipFill>
+        <p:spPr>
+          <a:xfrm>
+            <a:off x="1523999" y="0"/>
+            <a:ext cx="9144000" cy="6858000"/>
+          </a:xfrm>
+          <a:prstGeom prst="rect">
+            <a:avLst/>
+          </a:prstGeom>
+        </p:spPr>
+      </p:pic>
+    </p:spTree>
+    <p:extLst>
+      <p:ext uri="{BB962C8B-B14F-4D97-AF65-F5344CB8AC3E}">
+        <p14:creationId xmlns:p14="http://schemas.microsoft.com/office/powerpoint/2010/main" val="3820399925"/>
+      </p:ext>
+    </p:extLst>
+  </p:cSld>
+  <p:clrMapOvr>
+    <a:masterClrMapping/>
+  </p:clrMapOvr>
+</p:sld>
+</file>
+
+<file path=ppt/slides/slide3.xml><?xml version="1.0" encoding="utf-8"?>
+<p:sld xmlns:a="http://schemas.openxmlformats.org/drawingml/2006/main" xmlns:r="http://schemas.openxmlformats.org/officeDocument/2006/relationships" xmlns:p="http://schemas.openxmlformats.org/presentationml/2006/main">
+  <p:cSld>
+    <p:spTree>
+      <p:nvGrpSpPr>
+        <p:cNvPr id="1" name=""/>
+        <p:cNvGrpSpPr/>
+        <p:nvPr/>
+      </p:nvGrpSpPr>
+      <p:grpSpPr>
+        <a:xfrm>
+          <a:off x="0" y="0"/>
+          <a:ext cx="0" cy="0"/>
+          <a:chOff x="0" y="0"/>
+          <a:chExt cx="0" cy="0"/>
+        </a:xfrm>
+      </p:grpSpPr>
+      <p:sp>
+        <p:nvSpPr>
+          <p:cNvPr id="2" name="Title 1">
+            <a:extLst>
+              <a:ext uri="{FF2B5EF4-FFF2-40B4-BE49-F238E27FC236}">
+                <a16:creationId xmlns:a16="http://schemas.microsoft.com/office/drawing/2014/main" id="{05E907D5-92F8-F228-1283-F12204841085}"/>
+              </a:ext>
+            </a:extLst>
+          </p:cNvPr>
+          <p:cNvSpPr>
+            <a:spLocks noGrp="1"/>
+          </p:cNvSpPr>
+          <p:nvPr>
+            <p:ph type="title"/>
+          </p:nvPr>
+        </p:nvSpPr>
+        <p:spPr/>
+        <p:txBody>
+          <a:bodyPr/>
+          <a:lstStyle/>
+          <a:p>
+            <a:r>
+              <a:rPr lang="en-US" dirty="0"/>
+              <a:t>Ethical Standards of Judgement Questionnaire (ESJQ)</a:t>
+            </a:r>
+          </a:p>
+        </p:txBody>
+      </p:sp>
+      <p:sp>
+        <p:nvSpPr>
+          <p:cNvPr id="3" name="Text Placeholder 2">
+            <a:extLst>
+              <a:ext uri="{FF2B5EF4-FFF2-40B4-BE49-F238E27FC236}">
+                <a16:creationId xmlns:a16="http://schemas.microsoft.com/office/drawing/2014/main" id="{907D61E5-5549-46D7-B995-C8849EBD17B4}"/>
+              </a:ext>
+            </a:extLst>
+          </p:cNvPr>
+          <p:cNvSpPr>
+            <a:spLocks noGrp="1"/>
+          </p:cNvSpPr>
+          <p:nvPr>
+            <p:ph type="body" idx="1"/>
+          </p:nvPr>
+        </p:nvSpPr>
+        <p:spPr/>
+        <p:txBody>
+          <a:bodyPr/>
+          <a:lstStyle/>
+          <a:p>
+            <a:r>
+              <a:rPr lang="en-US" dirty="0"/>
+              <a:t>Utilitarian Subscale</a:t>
+            </a:r>
+          </a:p>
+        </p:txBody>
+      </p:sp>
+      <p:sp>
+        <p:nvSpPr>
+          <p:cNvPr id="5" name="Text Placeholder 4">
+            <a:extLst>
+              <a:ext uri="{FF2B5EF4-FFF2-40B4-BE49-F238E27FC236}">
+                <a16:creationId xmlns:a16="http://schemas.microsoft.com/office/drawing/2014/main" id="{46A4A43B-AE60-DBDB-8AC2-1F67F769E8BD}"/>
+              </a:ext>
+            </a:extLst>
+          </p:cNvPr>
+          <p:cNvSpPr>
+            <a:spLocks noGrp="1"/>
+          </p:cNvSpPr>
+          <p:nvPr>
+            <p:ph type="body" sz="quarter" idx="3"/>
+          </p:nvPr>
+        </p:nvSpPr>
+        <p:spPr/>
+        <p:txBody>
+          <a:bodyPr/>
+          <a:lstStyle/>
+          <a:p>
+            <a:r>
+              <a:rPr lang="en-US" dirty="0"/>
+              <a:t>Deontological Subscale</a:t>
+            </a:r>
+          </a:p>
+        </p:txBody>
+      </p:sp>
+      <p:pic>
+        <p:nvPicPr>
+          <p:cNvPr id="7" name="Content Placeholder 5">
+            <a:extLst>
+              <a:ext uri="{FF2B5EF4-FFF2-40B4-BE49-F238E27FC236}">
+                <a16:creationId xmlns:a16="http://schemas.microsoft.com/office/drawing/2014/main" id="{581CED99-183B-1E6F-A9AE-7473C6C39369}"/>
+              </a:ext>
+            </a:extLst>
+          </p:cNvPr>
+          <p:cNvPicPr>
+            <a:picLocks noGrp="1" noChangeAspect="1"/>
+          </p:cNvPicPr>
+          <p:nvPr>
+            <p:ph sz="half" idx="2"/>
+          </p:nvPr>
+        </p:nvPicPr>
+        <p:blipFill>
+          <a:blip r:embed="rId2"/>
+          <a:stretch>
+            <a:fillRect/>
+          </a:stretch>
+        </p:blipFill>
+        <p:spPr>
+          <a:xfrm>
+            <a:off x="1896169" y="2508250"/>
+            <a:ext cx="3211713" cy="3663950"/>
+          </a:xfrm>
+        </p:spPr>
+      </p:pic>
+      <p:pic>
+        <p:nvPicPr>
+          <p:cNvPr id="8" name="Content Placeholder 7">
+            <a:extLst>
+              <a:ext uri="{FF2B5EF4-FFF2-40B4-BE49-F238E27FC236}">
+                <a16:creationId xmlns:a16="http://schemas.microsoft.com/office/drawing/2014/main" id="{522F12BD-E2EC-DBD2-1849-F85B3EFC1E9E}"/>
+              </a:ext>
+            </a:extLst>
+          </p:cNvPr>
+          <p:cNvPicPr>
+            <a:picLocks noGrp="1" noChangeAspect="1"/>
+          </p:cNvPicPr>
+          <p:nvPr>
+            <p:ph sz="quarter" idx="4"/>
+          </p:nvPr>
         </p:nvPicPr>
         <p:blipFill>
           <a:blip r:embed="rId3"/>
@@ -5376,20 +7031,124 @@
         </p:blipFill>
         <p:spPr>
           <a:xfrm>
-            <a:off x="1172750" y="0"/>
-            <a:ext cx="9846499" cy="6858000"/>
+            <a:off x="6248546" y="2445175"/>
+            <a:ext cx="3550945" cy="3663950"/>
+          </a:xfrm>
+        </p:spPr>
+      </p:pic>
+    </p:spTree>
+    <p:extLst>
+      <p:ext uri="{BB962C8B-B14F-4D97-AF65-F5344CB8AC3E}">
+        <p14:creationId xmlns:p14="http://schemas.microsoft.com/office/powerpoint/2010/main" val="3474516652"/>
+      </p:ext>
+    </p:extLst>
+  </p:cSld>
+  <p:clrMapOvr>
+    <a:masterClrMapping/>
+  </p:clrMapOvr>
+</p:sld>
+</file>
+
+<file path=ppt/slides/slide30.xml><?xml version="1.0" encoding="utf-8"?>
+<p:sld xmlns:a="http://schemas.openxmlformats.org/drawingml/2006/main" xmlns:r="http://schemas.openxmlformats.org/officeDocument/2006/relationships" xmlns:p="http://schemas.openxmlformats.org/presentationml/2006/main">
+  <p:cSld>
+    <p:spTree>
+      <p:nvGrpSpPr>
+        <p:cNvPr id="1" name="">
+          <a:extLst>
+            <a:ext uri="{FF2B5EF4-FFF2-40B4-BE49-F238E27FC236}">
+              <a16:creationId xmlns:a16="http://schemas.microsoft.com/office/drawing/2014/main" id="{52B2B13D-1B2E-9E45-B653-3D8B4632C36B}"/>
+            </a:ext>
+          </a:extLst>
+        </p:cNvPr>
+        <p:cNvGrpSpPr/>
+        <p:nvPr/>
+      </p:nvGrpSpPr>
+      <p:grpSpPr>
+        <a:xfrm>
+          <a:off x="0" y="0"/>
+          <a:ext cx="0" cy="0"/>
+          <a:chOff x="0" y="0"/>
+          <a:chExt cx="0" cy="0"/>
+        </a:xfrm>
+      </p:grpSpPr>
+      <p:pic>
+        <p:nvPicPr>
+          <p:cNvPr id="4" name="Picture 3">
+            <a:extLst>
+              <a:ext uri="{FF2B5EF4-FFF2-40B4-BE49-F238E27FC236}">
+                <a16:creationId xmlns:a16="http://schemas.microsoft.com/office/drawing/2014/main" id="{C89EF1B3-3DC2-FF04-917F-3C3CC7C344CB}"/>
+              </a:ext>
+            </a:extLst>
+          </p:cNvPr>
+          <p:cNvPicPr>
+            <a:picLocks noChangeAspect="1"/>
+          </p:cNvPicPr>
+          <p:nvPr/>
+        </p:nvPicPr>
+        <p:blipFill>
+          <a:blip r:embed="rId3">
+            <a:extLst>
+              <a:ext uri="{28A0092B-C50C-407E-A947-70E740481C1C}">
+                <a14:useLocalDpi xmlns:a14="http://schemas.microsoft.com/office/drawing/2010/main" val="0"/>
+              </a:ext>
+            </a:extLst>
+          </a:blip>
+          <a:srcRect/>
+          <a:stretch/>
+        </p:blipFill>
+        <p:spPr>
+          <a:xfrm>
+            <a:off x="1644688" y="0"/>
+            <a:ext cx="8902622" cy="6858000"/>
           </a:xfrm>
           <a:prstGeom prst="rect">
             <a:avLst/>
           </a:prstGeom>
         </p:spPr>
       </p:pic>
+    </p:spTree>
+    <p:extLst>
+      <p:ext uri="{BB962C8B-B14F-4D97-AF65-F5344CB8AC3E}">
+        <p14:creationId xmlns:p14="http://schemas.microsoft.com/office/powerpoint/2010/main" val="970129539"/>
+      </p:ext>
+    </p:extLst>
+  </p:cSld>
+  <p:clrMapOvr>
+    <a:masterClrMapping/>
+  </p:clrMapOvr>
+</p:sld>
+</file>
+
+<file path=ppt/slides/slide31.xml><?xml version="1.0" encoding="utf-8"?>
+<p:sld xmlns:a="http://schemas.openxmlformats.org/drawingml/2006/main" xmlns:r="http://schemas.openxmlformats.org/officeDocument/2006/relationships" xmlns:p="http://schemas.openxmlformats.org/presentationml/2006/main">
+  <p:cSld>
+    <p:spTree>
+      <p:nvGrpSpPr>
+        <p:cNvPr id="1" name="">
+          <a:extLst>
+            <a:ext uri="{FF2B5EF4-FFF2-40B4-BE49-F238E27FC236}">
+              <a16:creationId xmlns:a16="http://schemas.microsoft.com/office/drawing/2014/main" id="{CA05B3B2-F191-9140-56FA-E4EF156CF70F}"/>
+            </a:ext>
+          </a:extLst>
+        </p:cNvPr>
+        <p:cNvGrpSpPr/>
+        <p:nvPr/>
+      </p:nvGrpSpPr>
+      <p:grpSpPr>
+        <a:xfrm>
+          <a:off x="0" y="0"/>
+          <a:ext cx="0" cy="0"/>
+          <a:chOff x="0" y="0"/>
+          <a:chExt cx="0" cy="0"/>
+        </a:xfrm>
+      </p:grpSpPr>
       <p:pic>
         <p:nvPicPr>
           <p:cNvPr id="4" name="Picture 3">
             <a:extLst>
               <a:ext uri="{FF2B5EF4-FFF2-40B4-BE49-F238E27FC236}">
-                <a16:creationId xmlns:a16="http://schemas.microsoft.com/office/drawing/2014/main" id="{879CE540-F755-0CDC-60A2-F00BFD6E77C3}"/>
+                <a16:creationId xmlns:a16="http://schemas.microsoft.com/office/drawing/2014/main" id="{D86B516C-E2D1-BD6C-DC12-B20DC1E6FCA4}"/>
               </a:ext>
             </a:extLst>
           </p:cNvPr>
@@ -5397,6 +7156,874 @@
             <a:picLocks noChangeAspect="1"/>
           </p:cNvPicPr>
           <p:nvPr/>
+        </p:nvPicPr>
+        <p:blipFill>
+          <a:blip r:embed="rId3">
+            <a:extLst>
+              <a:ext uri="{28A0092B-C50C-407E-A947-70E740481C1C}">
+                <a14:useLocalDpi xmlns:a14="http://schemas.microsoft.com/office/drawing/2010/main" val="0"/>
+              </a:ext>
+            </a:extLst>
+          </a:blip>
+          <a:srcRect/>
+          <a:stretch/>
+        </p:blipFill>
+        <p:spPr>
+          <a:xfrm>
+            <a:off x="1523999" y="568569"/>
+            <a:ext cx="9144000" cy="5720861"/>
+          </a:xfrm>
+          <a:prstGeom prst="rect">
+            <a:avLst/>
+          </a:prstGeom>
+        </p:spPr>
+      </p:pic>
+    </p:spTree>
+    <p:extLst>
+      <p:ext uri="{BB962C8B-B14F-4D97-AF65-F5344CB8AC3E}">
+        <p14:creationId xmlns:p14="http://schemas.microsoft.com/office/powerpoint/2010/main" val="3691622849"/>
+      </p:ext>
+    </p:extLst>
+  </p:cSld>
+  <p:clrMapOvr>
+    <a:masterClrMapping/>
+  </p:clrMapOvr>
+</p:sld>
+</file>
+
+<file path=ppt/slides/slide32.xml><?xml version="1.0" encoding="utf-8"?>
+<p:sld xmlns:a="http://schemas.openxmlformats.org/drawingml/2006/main" xmlns:r="http://schemas.openxmlformats.org/officeDocument/2006/relationships" xmlns:p="http://schemas.openxmlformats.org/presentationml/2006/main">
+  <p:cSld>
+    <p:spTree>
+      <p:nvGrpSpPr>
+        <p:cNvPr id="1" name="">
+          <a:extLst>
+            <a:ext uri="{FF2B5EF4-FFF2-40B4-BE49-F238E27FC236}">
+              <a16:creationId xmlns:a16="http://schemas.microsoft.com/office/drawing/2014/main" id="{AA2CC54A-24F8-C4F4-255B-95D14002D7B8}"/>
+            </a:ext>
+          </a:extLst>
+        </p:cNvPr>
+        <p:cNvGrpSpPr/>
+        <p:nvPr/>
+      </p:nvGrpSpPr>
+      <p:grpSpPr>
+        <a:xfrm>
+          <a:off x="0" y="0"/>
+          <a:ext cx="0" cy="0"/>
+          <a:chOff x="0" y="0"/>
+          <a:chExt cx="0" cy="0"/>
+        </a:xfrm>
+      </p:grpSpPr>
+      <p:pic>
+        <p:nvPicPr>
+          <p:cNvPr id="4" name="Picture 3">
+            <a:extLst>
+              <a:ext uri="{FF2B5EF4-FFF2-40B4-BE49-F238E27FC236}">
+                <a16:creationId xmlns:a16="http://schemas.microsoft.com/office/drawing/2014/main" id="{21D587D9-B971-5995-C5F8-C38D4E4B7155}"/>
+              </a:ext>
+            </a:extLst>
+          </p:cNvPr>
+          <p:cNvPicPr>
+            <a:picLocks noChangeAspect="1"/>
+          </p:cNvPicPr>
+          <p:nvPr/>
+        </p:nvPicPr>
+        <p:blipFill>
+          <a:blip r:embed="rId3">
+            <a:extLst>
+              <a:ext uri="{28A0092B-C50C-407E-A947-70E740481C1C}">
+                <a14:useLocalDpi xmlns:a14="http://schemas.microsoft.com/office/drawing/2010/main" val="0"/>
+              </a:ext>
+            </a:extLst>
+          </a:blip>
+          <a:srcRect/>
+          <a:stretch/>
+        </p:blipFill>
+        <p:spPr>
+          <a:xfrm>
+            <a:off x="2659482" y="568569"/>
+            <a:ext cx="6873034" cy="5720861"/>
+          </a:xfrm>
+          <a:prstGeom prst="rect">
+            <a:avLst/>
+          </a:prstGeom>
+        </p:spPr>
+      </p:pic>
+    </p:spTree>
+    <p:extLst>
+      <p:ext uri="{BB962C8B-B14F-4D97-AF65-F5344CB8AC3E}">
+        <p14:creationId xmlns:p14="http://schemas.microsoft.com/office/powerpoint/2010/main" val="3468419492"/>
+      </p:ext>
+    </p:extLst>
+  </p:cSld>
+  <p:clrMapOvr>
+    <a:masterClrMapping/>
+  </p:clrMapOvr>
+</p:sld>
+</file>
+
+<file path=ppt/slides/slide33.xml><?xml version="1.0" encoding="utf-8"?>
+<p:sld xmlns:a="http://schemas.openxmlformats.org/drawingml/2006/main" xmlns:r="http://schemas.openxmlformats.org/officeDocument/2006/relationships" xmlns:p="http://schemas.openxmlformats.org/presentationml/2006/main">
+  <p:cSld>
+    <p:spTree>
+      <p:nvGrpSpPr>
+        <p:cNvPr id="1" name=""/>
+        <p:cNvGrpSpPr/>
+        <p:nvPr/>
+      </p:nvGrpSpPr>
+      <p:grpSpPr>
+        <a:xfrm>
+          <a:off x="0" y="0"/>
+          <a:ext cx="0" cy="0"/>
+          <a:chOff x="0" y="0"/>
+          <a:chExt cx="0" cy="0"/>
+        </a:xfrm>
+      </p:grpSpPr>
+      <p:pic>
+        <p:nvPicPr>
+          <p:cNvPr id="3" name="Picture 2" descr="A graph of dots and lines&#10;&#10;AI-generated content may be incorrect.">
+            <a:extLst>
+              <a:ext uri="{FF2B5EF4-FFF2-40B4-BE49-F238E27FC236}">
+                <a16:creationId xmlns:a16="http://schemas.microsoft.com/office/drawing/2014/main" id="{FBE6ED5C-EF5E-2F04-9AFE-57851E1DBA6F}"/>
+              </a:ext>
+            </a:extLst>
+          </p:cNvPr>
+          <p:cNvPicPr>
+            <a:picLocks noChangeAspect="1"/>
+          </p:cNvPicPr>
+          <p:nvPr/>
+        </p:nvPicPr>
+        <p:blipFill>
+          <a:blip r:embed="rId2">
+            <a:extLst>
+              <a:ext uri="{28A0092B-C50C-407E-A947-70E740481C1C}">
+                <a14:useLocalDpi xmlns:a14="http://schemas.microsoft.com/office/drawing/2010/main" val="0"/>
+              </a:ext>
+            </a:extLst>
+          </a:blip>
+          <a:stretch>
+            <a:fillRect/>
+          </a:stretch>
+        </p:blipFill>
+        <p:spPr>
+          <a:xfrm>
+            <a:off x="2285468" y="571101"/>
+            <a:ext cx="7621064" cy="5715798"/>
+          </a:xfrm>
+          <a:prstGeom prst="rect">
+            <a:avLst/>
+          </a:prstGeom>
+        </p:spPr>
+      </p:pic>
+    </p:spTree>
+    <p:extLst>
+      <p:ext uri="{BB962C8B-B14F-4D97-AF65-F5344CB8AC3E}">
+        <p14:creationId xmlns:p14="http://schemas.microsoft.com/office/powerpoint/2010/main" val="4032867905"/>
+      </p:ext>
+    </p:extLst>
+  </p:cSld>
+  <p:clrMapOvr>
+    <a:masterClrMapping/>
+  </p:clrMapOvr>
+</p:sld>
+</file>
+
+<file path=ppt/slides/slide34.xml><?xml version="1.0" encoding="utf-8"?>
+<p:sld xmlns:a="http://schemas.openxmlformats.org/drawingml/2006/main" xmlns:r="http://schemas.openxmlformats.org/officeDocument/2006/relationships" xmlns:p="http://schemas.openxmlformats.org/presentationml/2006/main">
+  <p:cSld>
+    <p:spTree>
+      <p:nvGrpSpPr>
+        <p:cNvPr id="1" name=""/>
+        <p:cNvGrpSpPr/>
+        <p:nvPr/>
+      </p:nvGrpSpPr>
+      <p:grpSpPr>
+        <a:xfrm>
+          <a:off x="0" y="0"/>
+          <a:ext cx="0" cy="0"/>
+          <a:chOff x="0" y="0"/>
+          <a:chExt cx="0" cy="0"/>
+        </a:xfrm>
+      </p:grpSpPr>
+      <p:sp>
+        <p:nvSpPr>
+          <p:cNvPr id="2" name="Title 1">
+            <a:extLst>
+              <a:ext uri="{FF2B5EF4-FFF2-40B4-BE49-F238E27FC236}">
+                <a16:creationId xmlns:a16="http://schemas.microsoft.com/office/drawing/2014/main" id="{8A6CD766-30DD-5D00-A0BD-155D6D8379F2}"/>
+              </a:ext>
+            </a:extLst>
+          </p:cNvPr>
+          <p:cNvSpPr>
+            <a:spLocks noGrp="1"/>
+          </p:cNvSpPr>
+          <p:nvPr>
+            <p:ph type="title"/>
+          </p:nvPr>
+        </p:nvSpPr>
+        <p:spPr/>
+        <p:txBody>
+          <a:bodyPr/>
+          <a:lstStyle/>
+          <a:p>
+            <a:r>
+              <a:rPr lang="en-US" dirty="0"/>
+              <a:t>Preliminary Results</a:t>
+            </a:r>
+          </a:p>
+        </p:txBody>
+      </p:sp>
+      <p:sp>
+        <p:nvSpPr>
+          <p:cNvPr id="3" name="Content Placeholder 2">
+            <a:extLst>
+              <a:ext uri="{FF2B5EF4-FFF2-40B4-BE49-F238E27FC236}">
+                <a16:creationId xmlns:a16="http://schemas.microsoft.com/office/drawing/2014/main" id="{9B258350-D688-95F8-1D74-FB89196DCACA}"/>
+              </a:ext>
+            </a:extLst>
+          </p:cNvPr>
+          <p:cNvSpPr>
+            <a:spLocks noGrp="1"/>
+          </p:cNvSpPr>
+          <p:nvPr>
+            <p:ph idx="1"/>
+          </p:nvPr>
+        </p:nvSpPr>
+        <p:spPr/>
+        <p:txBody>
+          <a:bodyPr/>
+          <a:lstStyle/>
+          <a:p>
+            <a:r>
+              <a:rPr lang="en-US" dirty="0"/>
+              <a:t>All our interventions did end up increasing support for all [Topics]</a:t>
+            </a:r>
+          </a:p>
+          <a:p>
+            <a:pPr lvl="1"/>
+            <a:r>
+              <a:rPr lang="en-US" dirty="0"/>
+              <a:t>However… none of our interventions were differentiated on their increase of support</a:t>
+            </a:r>
+          </a:p>
+          <a:p>
+            <a:pPr lvl="1"/>
+            <a:r>
+              <a:rPr lang="en-US" dirty="0"/>
+              <a:t>Notably – Low social consensus did NOT decrease support as in Study 1</a:t>
+            </a:r>
+          </a:p>
+          <a:p>
+            <a:r>
+              <a:rPr lang="en-US" dirty="0"/>
+              <a:t>Moral Conviction manipulation successful for UHC</a:t>
+            </a:r>
+          </a:p>
+          <a:p>
+            <a:pPr lvl="1"/>
+            <a:r>
+              <a:rPr lang="en-US" dirty="0"/>
+              <a:t>Not so much for Capital Punishment or AI</a:t>
+            </a:r>
+          </a:p>
+          <a:p>
+            <a:pPr lvl="1"/>
+            <a:r>
+              <a:rPr lang="en-US" dirty="0"/>
+              <a:t>Social consensus condition seemed to affect moral conviction for AI</a:t>
+            </a:r>
+          </a:p>
+          <a:p>
+            <a:pPr lvl="1"/>
+            <a:r>
+              <a:rPr lang="en-US" dirty="0"/>
+              <a:t>Moral conviction was associated with deontological and utilitarian orientation, in opposite ways</a:t>
+            </a:r>
+          </a:p>
+          <a:p>
+            <a:r>
+              <a:rPr lang="en-US" dirty="0"/>
+              <a:t>Significant baseline differences in Topic Familiarity, Openness to Belief Change, and Initial Moral Conviction</a:t>
+            </a:r>
+          </a:p>
+          <a:p>
+            <a:endParaRPr lang="en-US" dirty="0"/>
+          </a:p>
+        </p:txBody>
+      </p:sp>
+    </p:spTree>
+    <p:extLst>
+      <p:ext uri="{BB962C8B-B14F-4D97-AF65-F5344CB8AC3E}">
+        <p14:creationId xmlns:p14="http://schemas.microsoft.com/office/powerpoint/2010/main" val="3227814892"/>
+      </p:ext>
+    </p:extLst>
+  </p:cSld>
+  <p:clrMapOvr>
+    <a:masterClrMapping/>
+  </p:clrMapOvr>
+</p:sld>
+</file>
+
+<file path=ppt/slides/slide4.xml><?xml version="1.0" encoding="utf-8"?>
+<p:sld xmlns:a="http://schemas.openxmlformats.org/drawingml/2006/main" xmlns:r="http://schemas.openxmlformats.org/officeDocument/2006/relationships" xmlns:p="http://schemas.openxmlformats.org/presentationml/2006/main">
+  <p:cSld>
+    <p:spTree>
+      <p:nvGrpSpPr>
+        <p:cNvPr id="1" name=""/>
+        <p:cNvGrpSpPr/>
+        <p:nvPr/>
+      </p:nvGrpSpPr>
+      <p:grpSpPr>
+        <a:xfrm>
+          <a:off x="0" y="0"/>
+          <a:ext cx="0" cy="0"/>
+          <a:chOff x="0" y="0"/>
+          <a:chExt cx="0" cy="0"/>
+        </a:xfrm>
+      </p:grpSpPr>
+      <p:sp>
+        <p:nvSpPr>
+          <p:cNvPr id="2" name="Title 1">
+            <a:extLst>
+              <a:ext uri="{FF2B5EF4-FFF2-40B4-BE49-F238E27FC236}">
+                <a16:creationId xmlns:a16="http://schemas.microsoft.com/office/drawing/2014/main" id="{10A72571-5C19-4570-EB95-8A490300BCBD}"/>
+              </a:ext>
+            </a:extLst>
+          </p:cNvPr>
+          <p:cNvSpPr>
+            <a:spLocks noGrp="1"/>
+          </p:cNvSpPr>
+          <p:nvPr>
+            <p:ph type="title"/>
+          </p:nvPr>
+        </p:nvSpPr>
+        <p:spPr/>
+        <p:txBody>
+          <a:bodyPr/>
+          <a:lstStyle/>
+          <a:p>
+            <a:r>
+              <a:rPr lang="en-US" dirty="0"/>
+              <a:t>Initial Measures of [Topic]</a:t>
+            </a:r>
+          </a:p>
+        </p:txBody>
+      </p:sp>
+      <p:pic>
+        <p:nvPicPr>
+          <p:cNvPr id="6" name="Content Placeholder 5">
+            <a:extLst>
+              <a:ext uri="{FF2B5EF4-FFF2-40B4-BE49-F238E27FC236}">
+                <a16:creationId xmlns:a16="http://schemas.microsoft.com/office/drawing/2014/main" id="{5A4816A4-6991-E9F5-9522-B018085A5257}"/>
+              </a:ext>
+            </a:extLst>
+          </p:cNvPr>
+          <p:cNvPicPr>
+            <a:picLocks noGrp="1" noChangeAspect="1"/>
+          </p:cNvPicPr>
+          <p:nvPr>
+            <p:ph sz="half" idx="1"/>
+          </p:nvPr>
+        </p:nvPicPr>
+        <p:blipFill>
+          <a:blip r:embed="rId2"/>
+          <a:stretch>
+            <a:fillRect/>
+          </a:stretch>
+        </p:blipFill>
+        <p:spPr>
+          <a:xfrm>
+            <a:off x="1411023" y="1828800"/>
+            <a:ext cx="4182005" cy="4351338"/>
+          </a:xfrm>
+        </p:spPr>
+      </p:pic>
+      <p:pic>
+        <p:nvPicPr>
+          <p:cNvPr id="8" name="Content Placeholder 7">
+            <a:extLst>
+              <a:ext uri="{FF2B5EF4-FFF2-40B4-BE49-F238E27FC236}">
+                <a16:creationId xmlns:a16="http://schemas.microsoft.com/office/drawing/2014/main" id="{C6AAC5C8-DF34-D400-4205-4B798B5233E0}"/>
+              </a:ext>
+            </a:extLst>
+          </p:cNvPr>
+          <p:cNvPicPr>
+            <a:picLocks noGrp="1" noChangeAspect="1"/>
+          </p:cNvPicPr>
+          <p:nvPr>
+            <p:ph sz="half" idx="2"/>
+          </p:nvPr>
+        </p:nvPicPr>
+        <p:blipFill>
+          <a:blip r:embed="rId3"/>
+          <a:stretch>
+            <a:fillRect/>
+          </a:stretch>
+        </p:blipFill>
+        <p:spPr>
+          <a:xfrm>
+            <a:off x="6126163" y="1962825"/>
+            <a:ext cx="4481512" cy="4083287"/>
+          </a:xfrm>
+        </p:spPr>
+      </p:pic>
+    </p:spTree>
+    <p:extLst>
+      <p:ext uri="{BB962C8B-B14F-4D97-AF65-F5344CB8AC3E}">
+        <p14:creationId xmlns:p14="http://schemas.microsoft.com/office/powerpoint/2010/main" val="2269065878"/>
+      </p:ext>
+    </p:extLst>
+  </p:cSld>
+  <p:clrMapOvr>
+    <a:masterClrMapping/>
+  </p:clrMapOvr>
+</p:sld>
+</file>
+
+<file path=ppt/slides/slide5.xml><?xml version="1.0" encoding="utf-8"?>
+<p:sld xmlns:a="http://schemas.openxmlformats.org/drawingml/2006/main" xmlns:r="http://schemas.openxmlformats.org/officeDocument/2006/relationships" xmlns:p="http://schemas.openxmlformats.org/presentationml/2006/main">
+  <p:cSld>
+    <p:spTree>
+      <p:nvGrpSpPr>
+        <p:cNvPr id="1" name=""/>
+        <p:cNvGrpSpPr/>
+        <p:nvPr/>
+      </p:nvGrpSpPr>
+      <p:grpSpPr>
+        <a:xfrm>
+          <a:off x="0" y="0"/>
+          <a:ext cx="0" cy="0"/>
+          <a:chOff x="0" y="0"/>
+          <a:chExt cx="0" cy="0"/>
+        </a:xfrm>
+      </p:grpSpPr>
+      <p:sp>
+        <p:nvSpPr>
+          <p:cNvPr id="2" name="Title 1">
+            <a:extLst>
+              <a:ext uri="{FF2B5EF4-FFF2-40B4-BE49-F238E27FC236}">
+                <a16:creationId xmlns:a16="http://schemas.microsoft.com/office/drawing/2014/main" id="{24E157D8-7ED1-5002-A036-AC763A109366}"/>
+              </a:ext>
+            </a:extLst>
+          </p:cNvPr>
+          <p:cNvSpPr>
+            <a:spLocks noGrp="1"/>
+          </p:cNvSpPr>
+          <p:nvPr>
+            <p:ph type="title"/>
+          </p:nvPr>
+        </p:nvSpPr>
+        <p:spPr/>
+        <p:txBody>
+          <a:bodyPr/>
+          <a:lstStyle/>
+          <a:p>
+            <a:r>
+              <a:rPr lang="en-US" dirty="0"/>
+              <a:t>Moral Conviction Manipulation</a:t>
+            </a:r>
+          </a:p>
+        </p:txBody>
+      </p:sp>
+      <p:sp>
+        <p:nvSpPr>
+          <p:cNvPr id="3" name="Text Placeholder 2">
+            <a:extLst>
+              <a:ext uri="{FF2B5EF4-FFF2-40B4-BE49-F238E27FC236}">
+                <a16:creationId xmlns:a16="http://schemas.microsoft.com/office/drawing/2014/main" id="{7830AEC6-79B6-B055-CA2F-7103A85C8559}"/>
+              </a:ext>
+            </a:extLst>
+          </p:cNvPr>
+          <p:cNvSpPr>
+            <a:spLocks noGrp="1"/>
+          </p:cNvSpPr>
+          <p:nvPr>
+            <p:ph type="body" idx="1"/>
+          </p:nvPr>
+        </p:nvSpPr>
+        <p:spPr/>
+        <p:txBody>
+          <a:bodyPr/>
+          <a:lstStyle/>
+          <a:p>
+            <a:r>
+              <a:rPr lang="en-US" dirty="0"/>
+              <a:t>Low Moral Conviction (Practical/Pragmatic)</a:t>
+            </a:r>
+          </a:p>
+        </p:txBody>
+      </p:sp>
+      <p:pic>
+        <p:nvPicPr>
+          <p:cNvPr id="8" name="Content Placeholder 7">
+            <a:extLst>
+              <a:ext uri="{FF2B5EF4-FFF2-40B4-BE49-F238E27FC236}">
+                <a16:creationId xmlns:a16="http://schemas.microsoft.com/office/drawing/2014/main" id="{74F86CE8-B287-FDAF-A13F-B9A3CEE07570}"/>
+              </a:ext>
+            </a:extLst>
+          </p:cNvPr>
+          <p:cNvPicPr>
+            <a:picLocks noGrp="1" noChangeAspect="1"/>
+          </p:cNvPicPr>
+          <p:nvPr>
+            <p:ph sz="half" idx="2"/>
+          </p:nvPr>
+        </p:nvPicPr>
+        <p:blipFill>
+          <a:blip r:embed="rId2"/>
+          <a:stretch>
+            <a:fillRect/>
+          </a:stretch>
+        </p:blipFill>
+        <p:spPr>
+          <a:xfrm>
+            <a:off x="1360500" y="2508250"/>
+            <a:ext cx="4283050" cy="3663950"/>
+          </a:xfrm>
+        </p:spPr>
+      </p:pic>
+      <p:sp>
+        <p:nvSpPr>
+          <p:cNvPr id="5" name="Text Placeholder 4">
+            <a:extLst>
+              <a:ext uri="{FF2B5EF4-FFF2-40B4-BE49-F238E27FC236}">
+                <a16:creationId xmlns:a16="http://schemas.microsoft.com/office/drawing/2014/main" id="{35AC6890-A23A-9D37-7DF3-98279CC73402}"/>
+              </a:ext>
+            </a:extLst>
+          </p:cNvPr>
+          <p:cNvSpPr>
+            <a:spLocks noGrp="1"/>
+          </p:cNvSpPr>
+          <p:nvPr>
+            <p:ph type="body" sz="quarter" idx="3"/>
+          </p:nvPr>
+        </p:nvSpPr>
+        <p:spPr/>
+        <p:txBody>
+          <a:bodyPr/>
+          <a:lstStyle/>
+          <a:p>
+            <a:r>
+              <a:rPr lang="en-US" dirty="0"/>
+              <a:t>High Moral Conviction (Moral Responsibility)</a:t>
+            </a:r>
+          </a:p>
+        </p:txBody>
+      </p:sp>
+      <p:pic>
+        <p:nvPicPr>
+          <p:cNvPr id="10" name="Content Placeholder 9">
+            <a:extLst>
+              <a:ext uri="{FF2B5EF4-FFF2-40B4-BE49-F238E27FC236}">
+                <a16:creationId xmlns:a16="http://schemas.microsoft.com/office/drawing/2014/main" id="{847EA056-BA94-EA12-7304-7A9085D9E0AA}"/>
+              </a:ext>
+            </a:extLst>
+          </p:cNvPr>
+          <p:cNvPicPr>
+            <a:picLocks noGrp="1" noChangeAspect="1"/>
+          </p:cNvPicPr>
+          <p:nvPr>
+            <p:ph sz="quarter" idx="4"/>
+          </p:nvPr>
+        </p:nvPicPr>
+        <p:blipFill>
+          <a:blip r:embed="rId3"/>
+          <a:stretch>
+            <a:fillRect/>
+          </a:stretch>
+        </p:blipFill>
+        <p:spPr>
+          <a:xfrm>
+            <a:off x="6126163" y="2703319"/>
+            <a:ext cx="4481512" cy="3273812"/>
+          </a:xfrm>
+        </p:spPr>
+      </p:pic>
+    </p:spTree>
+    <p:extLst>
+      <p:ext uri="{BB962C8B-B14F-4D97-AF65-F5344CB8AC3E}">
+        <p14:creationId xmlns:p14="http://schemas.microsoft.com/office/powerpoint/2010/main" val="690064659"/>
+      </p:ext>
+    </p:extLst>
+  </p:cSld>
+  <p:clrMapOvr>
+    <a:masterClrMapping/>
+  </p:clrMapOvr>
+</p:sld>
+</file>
+
+<file path=ppt/slides/slide6.xml><?xml version="1.0" encoding="utf-8"?>
+<p:sld xmlns:a="http://schemas.openxmlformats.org/drawingml/2006/main" xmlns:r="http://schemas.openxmlformats.org/officeDocument/2006/relationships" xmlns:p="http://schemas.openxmlformats.org/presentationml/2006/main">
+  <p:cSld>
+    <p:spTree>
+      <p:nvGrpSpPr>
+        <p:cNvPr id="1" name="">
+          <a:extLst>
+            <a:ext uri="{FF2B5EF4-FFF2-40B4-BE49-F238E27FC236}">
+              <a16:creationId xmlns:a16="http://schemas.microsoft.com/office/drawing/2014/main" id="{95D2C7B0-1C9B-9204-E639-34FEE28668DC}"/>
+            </a:ext>
+          </a:extLst>
+        </p:cNvPr>
+        <p:cNvGrpSpPr/>
+        <p:nvPr/>
+      </p:nvGrpSpPr>
+      <p:grpSpPr>
+        <a:xfrm>
+          <a:off x="0" y="0"/>
+          <a:ext cx="0" cy="0"/>
+          <a:chOff x="0" y="0"/>
+          <a:chExt cx="0" cy="0"/>
+        </a:xfrm>
+      </p:grpSpPr>
+      <p:sp>
+        <p:nvSpPr>
+          <p:cNvPr id="2" name="Title 1">
+            <a:extLst>
+              <a:ext uri="{FF2B5EF4-FFF2-40B4-BE49-F238E27FC236}">
+                <a16:creationId xmlns:a16="http://schemas.microsoft.com/office/drawing/2014/main" id="{F9FF9A58-559E-7911-CEF4-FF1437677759}"/>
+              </a:ext>
+            </a:extLst>
+          </p:cNvPr>
+          <p:cNvSpPr>
+            <a:spLocks noGrp="1"/>
+          </p:cNvSpPr>
+          <p:nvPr>
+            <p:ph type="title"/>
+          </p:nvPr>
+        </p:nvSpPr>
+        <p:spPr/>
+        <p:txBody>
+          <a:bodyPr/>
+          <a:lstStyle/>
+          <a:p>
+            <a:r>
+              <a:rPr lang="en-US" dirty="0"/>
+              <a:t>Social Consensus Manipulation</a:t>
+            </a:r>
+          </a:p>
+        </p:txBody>
+      </p:sp>
+      <p:sp>
+        <p:nvSpPr>
+          <p:cNvPr id="3" name="Text Placeholder 2">
+            <a:extLst>
+              <a:ext uri="{FF2B5EF4-FFF2-40B4-BE49-F238E27FC236}">
+                <a16:creationId xmlns:a16="http://schemas.microsoft.com/office/drawing/2014/main" id="{705F7262-4C73-5D2D-12BF-9D377AA3A852}"/>
+              </a:ext>
+            </a:extLst>
+          </p:cNvPr>
+          <p:cNvSpPr>
+            <a:spLocks noGrp="1"/>
+          </p:cNvSpPr>
+          <p:nvPr>
+            <p:ph type="body" idx="1"/>
+          </p:nvPr>
+        </p:nvSpPr>
+        <p:spPr/>
+        <p:txBody>
+          <a:bodyPr/>
+          <a:lstStyle/>
+          <a:p>
+            <a:r>
+              <a:rPr lang="en-US" dirty="0"/>
+              <a:t>Low Social Consensus</a:t>
+            </a:r>
+          </a:p>
+        </p:txBody>
+      </p:sp>
+      <p:sp>
+        <p:nvSpPr>
+          <p:cNvPr id="5" name="Text Placeholder 4">
+            <a:extLst>
+              <a:ext uri="{FF2B5EF4-FFF2-40B4-BE49-F238E27FC236}">
+                <a16:creationId xmlns:a16="http://schemas.microsoft.com/office/drawing/2014/main" id="{5E4AB2FE-9825-D69D-F075-9E313558FDB5}"/>
+              </a:ext>
+            </a:extLst>
+          </p:cNvPr>
+          <p:cNvSpPr>
+            <a:spLocks noGrp="1"/>
+          </p:cNvSpPr>
+          <p:nvPr>
+            <p:ph type="body" sz="quarter" idx="3"/>
+          </p:nvPr>
+        </p:nvSpPr>
+        <p:spPr/>
+        <p:txBody>
+          <a:bodyPr/>
+          <a:lstStyle/>
+          <a:p>
+            <a:r>
+              <a:rPr lang="en-US" dirty="0"/>
+              <a:t>High Social Consensus</a:t>
+            </a:r>
+          </a:p>
+        </p:txBody>
+      </p:sp>
+      <p:pic>
+        <p:nvPicPr>
+          <p:cNvPr id="17" name="Content Placeholder 11">
+            <a:extLst>
+              <a:ext uri="{FF2B5EF4-FFF2-40B4-BE49-F238E27FC236}">
+                <a16:creationId xmlns:a16="http://schemas.microsoft.com/office/drawing/2014/main" id="{C98735F2-B2A4-2F1C-9403-16AA2265FAF3}"/>
+              </a:ext>
+            </a:extLst>
+          </p:cNvPr>
+          <p:cNvPicPr>
+            <a:picLocks noGrp="1" noChangeAspect="1"/>
+          </p:cNvPicPr>
+          <p:nvPr>
+            <p:ph sz="quarter" idx="4"/>
+          </p:nvPr>
+        </p:nvPicPr>
+        <p:blipFill>
+          <a:blip r:embed="rId2"/>
+          <a:stretch>
+            <a:fillRect/>
+          </a:stretch>
+        </p:blipFill>
+        <p:spPr>
+          <a:xfrm>
+            <a:off x="6126163" y="3608305"/>
+            <a:ext cx="4481512" cy="1463840"/>
+          </a:xfrm>
+        </p:spPr>
+      </p:pic>
+      <p:pic>
+        <p:nvPicPr>
+          <p:cNvPr id="21" name="Content Placeholder 20">
+            <a:extLst>
+              <a:ext uri="{FF2B5EF4-FFF2-40B4-BE49-F238E27FC236}">
+                <a16:creationId xmlns:a16="http://schemas.microsoft.com/office/drawing/2014/main" id="{02AD63F4-6B92-CE98-A7C1-E71B00B16222}"/>
+              </a:ext>
+            </a:extLst>
+          </p:cNvPr>
+          <p:cNvPicPr>
+            <a:picLocks noGrp="1" noChangeAspect="1"/>
+          </p:cNvPicPr>
+          <p:nvPr>
+            <p:ph sz="half" idx="2"/>
+          </p:nvPr>
+        </p:nvPicPr>
+        <p:blipFill>
+          <a:blip r:embed="rId3"/>
+          <a:stretch>
+            <a:fillRect/>
+          </a:stretch>
+        </p:blipFill>
+        <p:spPr>
+          <a:xfrm>
+            <a:off x="1262063" y="3601709"/>
+            <a:ext cx="4479925" cy="1477032"/>
+          </a:xfrm>
+        </p:spPr>
+      </p:pic>
+    </p:spTree>
+    <p:extLst>
+      <p:ext uri="{BB962C8B-B14F-4D97-AF65-F5344CB8AC3E}">
+        <p14:creationId xmlns:p14="http://schemas.microsoft.com/office/powerpoint/2010/main" val="3603429468"/>
+      </p:ext>
+    </p:extLst>
+  </p:cSld>
+  <p:clrMapOvr>
+    <a:masterClrMapping/>
+  </p:clrMapOvr>
+</p:sld>
+</file>
+
+<file path=ppt/slides/slide7.xml><?xml version="1.0" encoding="utf-8"?>
+<p:sld xmlns:a="http://schemas.openxmlformats.org/drawingml/2006/main" xmlns:r="http://schemas.openxmlformats.org/officeDocument/2006/relationships" xmlns:p="http://schemas.openxmlformats.org/presentationml/2006/main">
+  <p:cSld>
+    <p:spTree>
+      <p:nvGrpSpPr>
+        <p:cNvPr id="1" name="">
+          <a:extLst>
+            <a:ext uri="{FF2B5EF4-FFF2-40B4-BE49-F238E27FC236}">
+              <a16:creationId xmlns:a16="http://schemas.microsoft.com/office/drawing/2014/main" id="{CBE715F7-195C-2919-D6FC-15FE8BDEEDE7}"/>
+            </a:ext>
+          </a:extLst>
+        </p:cNvPr>
+        <p:cNvGrpSpPr/>
+        <p:nvPr/>
+      </p:nvGrpSpPr>
+      <p:grpSpPr>
+        <a:xfrm>
+          <a:off x="0" y="0"/>
+          <a:ext cx="0" cy="0"/>
+          <a:chOff x="0" y="0"/>
+          <a:chExt cx="0" cy="0"/>
+        </a:xfrm>
+      </p:grpSpPr>
+      <p:sp>
+        <p:nvSpPr>
+          <p:cNvPr id="2" name="Title 1">
+            <a:extLst>
+              <a:ext uri="{FF2B5EF4-FFF2-40B4-BE49-F238E27FC236}">
+                <a16:creationId xmlns:a16="http://schemas.microsoft.com/office/drawing/2014/main" id="{B8244B00-8A4C-5155-9086-B556F8C07374}"/>
+              </a:ext>
+            </a:extLst>
+          </p:cNvPr>
+          <p:cNvSpPr>
+            <a:spLocks noGrp="1"/>
+          </p:cNvSpPr>
+          <p:nvPr>
+            <p:ph type="title"/>
+          </p:nvPr>
+        </p:nvSpPr>
+        <p:spPr/>
+        <p:txBody>
+          <a:bodyPr/>
+          <a:lstStyle/>
+          <a:p>
+            <a:r>
+              <a:rPr lang="en-US" dirty="0"/>
+              <a:t>Final Measures of [Topic]</a:t>
+            </a:r>
+          </a:p>
+        </p:txBody>
+      </p:sp>
+      <p:pic>
+        <p:nvPicPr>
+          <p:cNvPr id="6" name="Content Placeholder 5">
+            <a:extLst>
+              <a:ext uri="{FF2B5EF4-FFF2-40B4-BE49-F238E27FC236}">
+                <a16:creationId xmlns:a16="http://schemas.microsoft.com/office/drawing/2014/main" id="{92E46CEB-1D70-0503-C975-BDB1289CFB4B}"/>
+              </a:ext>
+            </a:extLst>
+          </p:cNvPr>
+          <p:cNvPicPr>
+            <a:picLocks noGrp="1" noChangeAspect="1"/>
+          </p:cNvPicPr>
+          <p:nvPr>
+            <p:ph sz="half" idx="1"/>
+          </p:nvPr>
+        </p:nvPicPr>
+        <p:blipFill>
+          <a:blip r:embed="rId3"/>
+          <a:srcRect b="64830"/>
+          <a:stretch/>
+        </p:blipFill>
+        <p:spPr>
+          <a:xfrm>
+            <a:off x="976122" y="2978150"/>
+            <a:ext cx="4182005" cy="1530350"/>
+          </a:xfrm>
+        </p:spPr>
+      </p:pic>
+      <p:pic>
+        <p:nvPicPr>
+          <p:cNvPr id="8" name="Content Placeholder 7">
+            <a:extLst>
+              <a:ext uri="{FF2B5EF4-FFF2-40B4-BE49-F238E27FC236}">
+                <a16:creationId xmlns:a16="http://schemas.microsoft.com/office/drawing/2014/main" id="{C9020AFE-EF3A-B2A5-8498-9EBC0CA4B08E}"/>
+              </a:ext>
+            </a:extLst>
+          </p:cNvPr>
+          <p:cNvPicPr>
+            <a:picLocks noGrp="1" noChangeAspect="1"/>
+          </p:cNvPicPr>
+          <p:nvPr>
+            <p:ph sz="half" idx="2"/>
+          </p:nvPr>
         </p:nvPicPr>
         <p:blipFill>
           <a:blip r:embed="rId4"/>
@@ -5406,48 +8033,223 @@
         </p:blipFill>
         <p:spPr>
           <a:xfrm>
-            <a:off x="1172750" y="0"/>
-            <a:ext cx="9846499" cy="6858000"/>
+            <a:off x="5878513" y="2019975"/>
+            <a:ext cx="4481512" cy="4083287"/>
           </a:xfrm>
-          <a:prstGeom prst="rect">
-            <a:avLst/>
-          </a:prstGeom>
         </p:spPr>
       </p:pic>
+    </p:spTree>
+    <p:extLst>
+      <p:ext uri="{BB962C8B-B14F-4D97-AF65-F5344CB8AC3E}">
+        <p14:creationId xmlns:p14="http://schemas.microsoft.com/office/powerpoint/2010/main" val="132737247"/>
+      </p:ext>
+    </p:extLst>
+  </p:cSld>
+  <p:clrMapOvr>
+    <a:masterClrMapping/>
+  </p:clrMapOvr>
+</p:sld>
+</file>
+
+<file path=ppt/slides/slide8.xml><?xml version="1.0" encoding="utf-8"?>
+<p:sld xmlns:a="http://schemas.openxmlformats.org/drawingml/2006/main" xmlns:r="http://schemas.openxmlformats.org/officeDocument/2006/relationships" xmlns:p="http://schemas.openxmlformats.org/presentationml/2006/main">
+  <p:cSld>
+    <p:spTree>
+      <p:nvGrpSpPr>
+        <p:cNvPr id="1" name=""/>
+        <p:cNvGrpSpPr/>
+        <p:nvPr/>
+      </p:nvGrpSpPr>
+      <p:grpSpPr>
+        <a:xfrm>
+          <a:off x="0" y="0"/>
+          <a:ext cx="0" cy="0"/>
+          <a:chOff x="0" y="0"/>
+          <a:chExt cx="0" cy="0"/>
+        </a:xfrm>
+      </p:grpSpPr>
+      <p:sp>
+        <p:nvSpPr>
+          <p:cNvPr id="2" name="Title 1">
+            <a:extLst>
+              <a:ext uri="{FF2B5EF4-FFF2-40B4-BE49-F238E27FC236}">
+                <a16:creationId xmlns:a16="http://schemas.microsoft.com/office/drawing/2014/main" id="{B398A196-8FC5-66F4-AC58-630F7F28886D}"/>
+              </a:ext>
+            </a:extLst>
+          </p:cNvPr>
+          <p:cNvSpPr>
+            <a:spLocks noGrp="1"/>
+          </p:cNvSpPr>
+          <p:nvPr>
+            <p:ph type="title"/>
+          </p:nvPr>
+        </p:nvSpPr>
+        <p:spPr/>
+        <p:txBody>
+          <a:bodyPr/>
+          <a:lstStyle/>
+          <a:p>
+            <a:r>
+              <a:rPr lang="en-US" dirty="0"/>
+              <a:t>Free Response and Demographics</a:t>
+            </a:r>
+          </a:p>
+        </p:txBody>
+      </p:sp>
       <p:pic>
         <p:nvPicPr>
-          <p:cNvPr id="6" name="Picture 5">
+          <p:cNvPr id="6" name="Content Placeholder 5">
             <a:extLst>
               <a:ext uri="{FF2B5EF4-FFF2-40B4-BE49-F238E27FC236}">
-                <a16:creationId xmlns:a16="http://schemas.microsoft.com/office/drawing/2014/main" id="{355F6D50-A7C3-DCC7-3426-BBE413D1B34D}"/>
+                <a16:creationId xmlns:a16="http://schemas.microsoft.com/office/drawing/2014/main" id="{1C19E3B9-BE59-E329-BB3A-E95BD2D026C3}"/>
               </a:ext>
             </a:extLst>
           </p:cNvPr>
           <p:cNvPicPr>
-            <a:picLocks noChangeAspect="1"/>
+            <a:picLocks noGrp="1" noChangeAspect="1"/>
           </p:cNvPicPr>
-          <p:nvPr/>
+          <p:nvPr>
+            <p:ph sz="half" idx="1"/>
+          </p:nvPr>
         </p:nvPicPr>
         <p:blipFill>
-          <a:blip r:embed="rId5"/>
+          <a:blip r:embed="rId3"/>
           <a:stretch>
             <a:fillRect/>
           </a:stretch>
         </p:blipFill>
         <p:spPr>
           <a:xfrm>
-            <a:off x="1172750" y="0"/>
-            <a:ext cx="9846499" cy="6858000"/>
+            <a:off x="1262063" y="1979247"/>
+            <a:ext cx="4479925" cy="4050444"/>
           </a:xfrm>
-          <a:prstGeom prst="rect">
-            <a:avLst/>
-          </a:prstGeom>
+        </p:spPr>
+      </p:pic>
+      <p:pic>
+        <p:nvPicPr>
+          <p:cNvPr id="8" name="Content Placeholder 7">
+            <a:extLst>
+              <a:ext uri="{FF2B5EF4-FFF2-40B4-BE49-F238E27FC236}">
+                <a16:creationId xmlns:a16="http://schemas.microsoft.com/office/drawing/2014/main" id="{418B6E0F-7910-507E-526F-5D97DA03CF06}"/>
+              </a:ext>
+            </a:extLst>
+          </p:cNvPr>
+          <p:cNvPicPr>
+            <a:picLocks noGrp="1" noChangeAspect="1"/>
+          </p:cNvPicPr>
+          <p:nvPr>
+            <p:ph sz="half" idx="2"/>
+          </p:nvPr>
+        </p:nvPicPr>
+        <p:blipFill>
+          <a:blip r:embed="rId4"/>
+          <a:stretch>
+            <a:fillRect/>
+          </a:stretch>
+        </p:blipFill>
+        <p:spPr>
+          <a:xfrm>
+            <a:off x="6764699" y="1828800"/>
+            <a:ext cx="3204440" cy="4351338"/>
+          </a:xfrm>
         </p:spPr>
       </p:pic>
     </p:spTree>
     <p:extLst>
       <p:ext uri="{BB962C8B-B14F-4D97-AF65-F5344CB8AC3E}">
-        <p14:creationId xmlns:p14="http://schemas.microsoft.com/office/powerpoint/2010/main" val="3721028386"/>
+        <p14:creationId xmlns:p14="http://schemas.microsoft.com/office/powerpoint/2010/main" val="2111415057"/>
+      </p:ext>
+    </p:extLst>
+  </p:cSld>
+  <p:clrMapOvr>
+    <a:masterClrMapping/>
+  </p:clrMapOvr>
+</p:sld>
+</file>
+
+<file path=ppt/slides/slide9.xml><?xml version="1.0" encoding="utf-8"?>
+<p:sld xmlns:a="http://schemas.openxmlformats.org/drawingml/2006/main" xmlns:r="http://schemas.openxmlformats.org/officeDocument/2006/relationships" xmlns:p="http://schemas.openxmlformats.org/presentationml/2006/main">
+  <p:cSld>
+    <p:spTree>
+      <p:nvGrpSpPr>
+        <p:cNvPr id="1" name="">
+          <a:extLst>
+            <a:ext uri="{FF2B5EF4-FFF2-40B4-BE49-F238E27FC236}">
+              <a16:creationId xmlns:a16="http://schemas.microsoft.com/office/drawing/2014/main" id="{881C1B72-3AE1-8AB0-C7AE-1C2DB7A917D5}"/>
+            </a:ext>
+          </a:extLst>
+        </p:cNvPr>
+        <p:cNvGrpSpPr/>
+        <p:nvPr/>
+      </p:nvGrpSpPr>
+      <p:grpSpPr>
+        <a:xfrm>
+          <a:off x="0" y="0"/>
+          <a:ext cx="0" cy="0"/>
+          <a:chOff x="0" y="0"/>
+          <a:chExt cx="0" cy="0"/>
+        </a:xfrm>
+      </p:grpSpPr>
+      <p:sp>
+        <p:nvSpPr>
+          <p:cNvPr id="2" name="Title 1">
+            <a:extLst>
+              <a:ext uri="{FF2B5EF4-FFF2-40B4-BE49-F238E27FC236}">
+                <a16:creationId xmlns:a16="http://schemas.microsoft.com/office/drawing/2014/main" id="{717F227C-3620-5329-D082-166B1BC0F977}"/>
+              </a:ext>
+            </a:extLst>
+          </p:cNvPr>
+          <p:cNvSpPr>
+            <a:spLocks noGrp="1"/>
+          </p:cNvSpPr>
+          <p:nvPr>
+            <p:ph type="title"/>
+          </p:nvPr>
+        </p:nvSpPr>
+        <p:spPr/>
+        <p:txBody>
+          <a:bodyPr/>
+          <a:lstStyle/>
+          <a:p>
+            <a:r>
+              <a:rPr lang="en-US" dirty="0"/>
+              <a:t>Exploratory Analyses</a:t>
+            </a:r>
+          </a:p>
+        </p:txBody>
+      </p:sp>
+      <p:sp>
+        <p:nvSpPr>
+          <p:cNvPr id="3" name="Text Placeholder 2">
+            <a:extLst>
+              <a:ext uri="{FF2B5EF4-FFF2-40B4-BE49-F238E27FC236}">
+                <a16:creationId xmlns:a16="http://schemas.microsoft.com/office/drawing/2014/main" id="{8540805C-E7D4-2CE2-F685-1FAF2F07CE64}"/>
+              </a:ext>
+            </a:extLst>
+          </p:cNvPr>
+          <p:cNvSpPr>
+            <a:spLocks noGrp="1"/>
+          </p:cNvSpPr>
+          <p:nvPr>
+            <p:ph type="body" idx="1"/>
+          </p:nvPr>
+        </p:nvSpPr>
+        <p:spPr/>
+        <p:txBody>
+          <a:bodyPr/>
+          <a:lstStyle/>
+          <a:p>
+            <a:r>
+              <a:rPr lang="en-US" dirty="0"/>
+              <a:t>Baseline Differences in Initial Measures</a:t>
+            </a:r>
+          </a:p>
+        </p:txBody>
+      </p:sp>
+    </p:spTree>
+    <p:extLst>
+      <p:ext uri="{BB962C8B-B14F-4D97-AF65-F5344CB8AC3E}">
+        <p14:creationId xmlns:p14="http://schemas.microsoft.com/office/powerpoint/2010/main" val="161661190"/>
       </p:ext>
     </p:extLst>
   </p:cSld>

</xml_diff>